<commit_message>
- update lock - structuring presentations
</commit_message>
<xml_diff>
--- a/presentations/0-Welcome.pptx
+++ b/presentations/0-Welcome.pptx
@@ -10,11 +10,11 @@
   </p:notesMasterIdLst>
   <p:sldIdLst>
     <p:sldId id="284" r:id="rId3"/>
-    <p:sldId id="281" r:id="rId4"/>
-    <p:sldId id="282" r:id="rId5"/>
+    <p:sldId id="285" r:id="rId4"/>
+    <p:sldId id="286" r:id="rId5"/>
     <p:sldId id="279" r:id="rId6"/>
-    <p:sldId id="280" r:id="rId7"/>
-    <p:sldId id="283" r:id="rId8"/>
+    <p:sldId id="4584" r:id="rId7"/>
+    <p:sldId id="280" r:id="rId8"/>
     <p:sldId id="257" r:id="rId9"/>
   </p:sldIdLst>
   <p:sldSz cx="12192000" cy="6858000"/>
@@ -122,6 +122,3068 @@
 </p:presentation>
 </file>
 
+<file path=ppt/diagrams/colors1.xml><?xml version="1.0" encoding="utf-8"?>
+<dgm:colorsDef xmlns:dgm="http://schemas.openxmlformats.org/drawingml/2006/diagram" xmlns:a="http://schemas.openxmlformats.org/drawingml/2006/main" uniqueId="urn:microsoft.com/office/officeart/2018/5/colors/Iconchunking_neutralbg_colorful1">
+  <dgm:title val=""/>
+  <dgm:desc val=""/>
+  <dgm:catLst>
+    <dgm:cat type="colorful" pri="10100"/>
+  </dgm:catLst>
+  <dgm:styleLbl name="node0">
+    <dgm:fillClrLst meth="repeat">
+      <a:schemeClr val="accent1"/>
+    </dgm:fillClrLst>
+    <dgm:linClrLst meth="repeat">
+      <a:schemeClr val="lt1"/>
+    </dgm:linClrLst>
+    <dgm:effectClrLst/>
+    <dgm:txLinClrLst/>
+    <dgm:txFillClrLst/>
+    <dgm:txEffectClrLst/>
+  </dgm:styleLbl>
+  <dgm:styleLbl name="node1">
+    <dgm:fillClrLst meth="repeat">
+      <a:schemeClr val="accent2"/>
+      <a:schemeClr val="accent3"/>
+      <a:schemeClr val="accent4"/>
+      <a:schemeClr val="accent5"/>
+      <a:schemeClr val="accent6"/>
+    </dgm:fillClrLst>
+    <dgm:linClrLst meth="repeat">
+      <a:schemeClr val="lt1">
+        <a:alpha val="0"/>
+      </a:schemeClr>
+    </dgm:linClrLst>
+    <dgm:effectClrLst/>
+    <dgm:txLinClrLst/>
+    <dgm:txFillClrLst/>
+    <dgm:txEffectClrLst/>
+  </dgm:styleLbl>
+  <dgm:styleLbl name="alignNode1">
+    <dgm:fillClrLst meth="repeat">
+      <a:schemeClr val="accent2"/>
+      <a:schemeClr val="accent3"/>
+      <a:schemeClr val="accent4"/>
+      <a:schemeClr val="accent5"/>
+      <a:schemeClr val="accent6"/>
+    </dgm:fillClrLst>
+    <dgm:linClrLst meth="repeat">
+      <a:schemeClr val="accent2"/>
+      <a:schemeClr val="accent3"/>
+      <a:schemeClr val="accent4"/>
+      <a:schemeClr val="accent5"/>
+      <a:schemeClr val="accent6"/>
+    </dgm:linClrLst>
+    <dgm:effectClrLst/>
+    <dgm:txLinClrLst/>
+    <dgm:txFillClrLst/>
+    <dgm:txEffectClrLst/>
+  </dgm:styleLbl>
+  <dgm:styleLbl name="lnNode1">
+    <dgm:fillClrLst meth="repeat">
+      <a:schemeClr val="accent2"/>
+      <a:schemeClr val="accent3"/>
+      <a:schemeClr val="accent4"/>
+      <a:schemeClr val="accent5"/>
+      <a:schemeClr val="accent6"/>
+    </dgm:fillClrLst>
+    <dgm:linClrLst meth="repeat">
+      <a:schemeClr val="lt1"/>
+    </dgm:linClrLst>
+    <dgm:effectClrLst/>
+    <dgm:txLinClrLst/>
+    <dgm:txFillClrLst/>
+    <dgm:txEffectClrLst/>
+  </dgm:styleLbl>
+  <dgm:styleLbl name="vennNode1">
+    <dgm:fillClrLst meth="repeat">
+      <a:schemeClr val="accent2">
+        <a:alpha val="50000"/>
+      </a:schemeClr>
+      <a:schemeClr val="accent3">
+        <a:alpha val="50000"/>
+      </a:schemeClr>
+      <a:schemeClr val="accent4">
+        <a:alpha val="50000"/>
+      </a:schemeClr>
+      <a:schemeClr val="accent5">
+        <a:alpha val="50000"/>
+      </a:schemeClr>
+      <a:schemeClr val="accent6">
+        <a:alpha val="50000"/>
+      </a:schemeClr>
+    </dgm:fillClrLst>
+    <dgm:linClrLst meth="repeat">
+      <a:schemeClr val="lt1"/>
+    </dgm:linClrLst>
+    <dgm:effectClrLst/>
+    <dgm:txLinClrLst/>
+    <dgm:txFillClrLst/>
+    <dgm:txEffectClrLst/>
+  </dgm:styleLbl>
+  <dgm:styleLbl name="node2">
+    <dgm:fillClrLst>
+      <a:schemeClr val="accent2"/>
+    </dgm:fillClrLst>
+    <dgm:linClrLst meth="repeat">
+      <a:schemeClr val="lt1"/>
+    </dgm:linClrLst>
+    <dgm:effectClrLst/>
+    <dgm:txLinClrLst/>
+    <dgm:txFillClrLst/>
+    <dgm:txEffectClrLst/>
+  </dgm:styleLbl>
+  <dgm:styleLbl name="node3">
+    <dgm:fillClrLst>
+      <a:schemeClr val="accent3"/>
+    </dgm:fillClrLst>
+    <dgm:linClrLst meth="repeat">
+      <a:schemeClr val="lt1"/>
+    </dgm:linClrLst>
+    <dgm:effectClrLst/>
+    <dgm:txLinClrLst/>
+    <dgm:txFillClrLst/>
+    <dgm:txEffectClrLst/>
+  </dgm:styleLbl>
+  <dgm:styleLbl name="node4">
+    <dgm:fillClrLst>
+      <a:schemeClr val="accent4"/>
+    </dgm:fillClrLst>
+    <dgm:linClrLst meth="repeat">
+      <a:schemeClr val="lt1"/>
+    </dgm:linClrLst>
+    <dgm:effectClrLst/>
+    <dgm:txLinClrLst/>
+    <dgm:txFillClrLst/>
+    <dgm:txEffectClrLst/>
+  </dgm:styleLbl>
+  <dgm:styleLbl name="fgImgPlace1">
+    <dgm:fillClrLst meth="repeat">
+      <a:schemeClr val="accent2">
+        <a:tint val="50000"/>
+      </a:schemeClr>
+      <a:schemeClr val="accent3">
+        <a:tint val="50000"/>
+      </a:schemeClr>
+      <a:schemeClr val="accent4">
+        <a:tint val="50000"/>
+      </a:schemeClr>
+      <a:schemeClr val="accent5">
+        <a:tint val="50000"/>
+      </a:schemeClr>
+      <a:schemeClr val="accent6">
+        <a:tint val="50000"/>
+      </a:schemeClr>
+    </dgm:fillClrLst>
+    <dgm:linClrLst meth="repeat">
+      <a:schemeClr val="lt1"/>
+    </dgm:linClrLst>
+    <dgm:effectClrLst/>
+    <dgm:txLinClrLst/>
+    <dgm:txFillClrLst meth="repeat">
+      <a:schemeClr val="lt1"/>
+    </dgm:txFillClrLst>
+    <dgm:txEffectClrLst/>
+  </dgm:styleLbl>
+  <dgm:styleLbl name="alignImgPlace1">
+    <dgm:fillClrLst>
+      <a:schemeClr val="accent1">
+        <a:tint val="50000"/>
+      </a:schemeClr>
+      <a:schemeClr val="accent2">
+        <a:tint val="20000"/>
+      </a:schemeClr>
+    </dgm:fillClrLst>
+    <dgm:linClrLst meth="repeat">
+      <a:schemeClr val="lt1"/>
+    </dgm:linClrLst>
+    <dgm:effectClrLst/>
+    <dgm:txLinClrLst/>
+    <dgm:txFillClrLst meth="repeat">
+      <a:schemeClr val="lt1"/>
+    </dgm:txFillClrLst>
+    <dgm:txEffectClrLst/>
+  </dgm:styleLbl>
+  <dgm:styleLbl name="bgImgPlace1">
+    <dgm:fillClrLst>
+      <a:schemeClr val="accent1">
+        <a:tint val="50000"/>
+      </a:schemeClr>
+      <a:schemeClr val="accent2">
+        <a:tint val="20000"/>
+      </a:schemeClr>
+    </dgm:fillClrLst>
+    <dgm:linClrLst meth="repeat">
+      <a:schemeClr val="lt1"/>
+    </dgm:linClrLst>
+    <dgm:effectClrLst/>
+    <dgm:txLinClrLst/>
+    <dgm:txFillClrLst meth="repeat">
+      <a:schemeClr val="lt1"/>
+    </dgm:txFillClrLst>
+    <dgm:txEffectClrLst/>
+  </dgm:styleLbl>
+  <dgm:styleLbl name="sibTrans2D1">
+    <dgm:fillClrLst meth="repeat">
+      <a:schemeClr val="accent2"/>
+      <a:schemeClr val="accent3"/>
+      <a:schemeClr val="accent4"/>
+      <a:schemeClr val="accent5"/>
+      <a:schemeClr val="accent6"/>
+    </dgm:fillClrLst>
+    <dgm:linClrLst meth="cycle">
+      <a:schemeClr val="lt1"/>
+    </dgm:linClrLst>
+    <dgm:effectClrLst/>
+    <dgm:txLinClrLst/>
+    <dgm:txFillClrLst/>
+    <dgm:txEffectClrLst/>
+  </dgm:styleLbl>
+  <dgm:styleLbl name="fgSibTrans2D1">
+    <dgm:fillClrLst meth="repeat">
+      <a:schemeClr val="accent2"/>
+      <a:schemeClr val="accent3"/>
+      <a:schemeClr val="accent4"/>
+      <a:schemeClr val="accent5"/>
+      <a:schemeClr val="accent6"/>
+    </dgm:fillClrLst>
+    <dgm:linClrLst meth="cycle">
+      <a:schemeClr val="lt1"/>
+    </dgm:linClrLst>
+    <dgm:effectClrLst/>
+    <dgm:txLinClrLst/>
+    <dgm:txFillClrLst meth="repeat">
+      <a:schemeClr val="lt1"/>
+    </dgm:txFillClrLst>
+    <dgm:txEffectClrLst/>
+  </dgm:styleLbl>
+  <dgm:styleLbl name="bgSibTrans2D1">
+    <dgm:fillClrLst meth="repeat">
+      <a:schemeClr val="accent2"/>
+      <a:schemeClr val="accent3"/>
+      <a:schemeClr val="accent4"/>
+      <a:schemeClr val="accent5"/>
+      <a:schemeClr val="accent6"/>
+    </dgm:fillClrLst>
+    <dgm:linClrLst meth="cycle">
+      <a:schemeClr val="lt1"/>
+    </dgm:linClrLst>
+    <dgm:effectClrLst/>
+    <dgm:txLinClrLst/>
+    <dgm:txFillClrLst meth="repeat">
+      <a:schemeClr val="lt1"/>
+    </dgm:txFillClrLst>
+    <dgm:txEffectClrLst/>
+  </dgm:styleLbl>
+  <dgm:styleLbl name="sibTrans1D1">
+    <dgm:fillClrLst meth="repeat">
+      <a:schemeClr val="accent2"/>
+      <a:schemeClr val="accent3"/>
+      <a:schemeClr val="accent4"/>
+      <a:schemeClr val="accent5"/>
+      <a:schemeClr val="accent6"/>
+    </dgm:fillClrLst>
+    <dgm:linClrLst meth="repeat">
+      <a:schemeClr val="accent2"/>
+      <a:schemeClr val="accent3"/>
+      <a:schemeClr val="accent4"/>
+      <a:schemeClr val="accent5"/>
+      <a:schemeClr val="accent6"/>
+    </dgm:linClrLst>
+    <dgm:effectClrLst/>
+    <dgm:txLinClrLst/>
+    <dgm:txFillClrLst meth="repeat">
+      <a:schemeClr val="tx1"/>
+    </dgm:txFillClrLst>
+    <dgm:txEffectClrLst/>
+  </dgm:styleLbl>
+  <dgm:styleLbl name="callout">
+    <dgm:fillClrLst meth="repeat">
+      <a:schemeClr val="accent2"/>
+    </dgm:fillClrLst>
+    <dgm:linClrLst meth="repeat">
+      <a:schemeClr val="accent2">
+        <a:tint val="50000"/>
+      </a:schemeClr>
+    </dgm:linClrLst>
+    <dgm:effectClrLst/>
+    <dgm:txLinClrLst/>
+    <dgm:txFillClrLst meth="repeat">
+      <a:schemeClr val="tx1"/>
+    </dgm:txFillClrLst>
+    <dgm:txEffectClrLst/>
+  </dgm:styleLbl>
+  <dgm:styleLbl name="asst0">
+    <dgm:fillClrLst meth="repeat">
+      <a:schemeClr val="accent1"/>
+    </dgm:fillClrLst>
+    <dgm:linClrLst meth="repeat">
+      <a:schemeClr val="lt1"/>
+    </dgm:linClrLst>
+    <dgm:effectClrLst/>
+    <dgm:txLinClrLst/>
+    <dgm:txFillClrLst/>
+    <dgm:txEffectClrLst/>
+  </dgm:styleLbl>
+  <dgm:styleLbl name="asst1">
+    <dgm:fillClrLst meth="repeat">
+      <a:schemeClr val="accent2"/>
+    </dgm:fillClrLst>
+    <dgm:linClrLst meth="repeat">
+      <a:schemeClr val="lt1"/>
+    </dgm:linClrLst>
+    <dgm:effectClrLst/>
+    <dgm:txLinClrLst/>
+    <dgm:txFillClrLst/>
+    <dgm:txEffectClrLst/>
+  </dgm:styleLbl>
+  <dgm:styleLbl name="asst2">
+    <dgm:fillClrLst>
+      <a:schemeClr val="accent3"/>
+    </dgm:fillClrLst>
+    <dgm:linClrLst meth="repeat">
+      <a:schemeClr val="lt1"/>
+    </dgm:linClrLst>
+    <dgm:effectClrLst/>
+    <dgm:txLinClrLst/>
+    <dgm:txFillClrLst/>
+    <dgm:txEffectClrLst/>
+  </dgm:styleLbl>
+  <dgm:styleLbl name="asst3">
+    <dgm:fillClrLst>
+      <a:schemeClr val="accent4"/>
+    </dgm:fillClrLst>
+    <dgm:linClrLst meth="repeat">
+      <a:schemeClr val="lt1"/>
+    </dgm:linClrLst>
+    <dgm:effectClrLst/>
+    <dgm:txLinClrLst/>
+    <dgm:txFillClrLst/>
+    <dgm:txEffectClrLst/>
+  </dgm:styleLbl>
+  <dgm:styleLbl name="asst4">
+    <dgm:fillClrLst>
+      <a:schemeClr val="accent5"/>
+    </dgm:fillClrLst>
+    <dgm:linClrLst meth="repeat">
+      <a:schemeClr val="lt1"/>
+    </dgm:linClrLst>
+    <dgm:effectClrLst/>
+    <dgm:txLinClrLst/>
+    <dgm:txFillClrLst/>
+    <dgm:txEffectClrLst/>
+  </dgm:styleLbl>
+  <dgm:styleLbl name="parChTrans2D1">
+    <dgm:fillClrLst meth="repeat">
+      <a:schemeClr val="accent2"/>
+    </dgm:fillClrLst>
+    <dgm:linClrLst meth="repeat">
+      <a:schemeClr val="lt1"/>
+    </dgm:linClrLst>
+    <dgm:effectClrLst/>
+    <dgm:txLinClrLst/>
+    <dgm:txFillClrLst meth="repeat">
+      <a:schemeClr val="lt1"/>
+    </dgm:txFillClrLst>
+    <dgm:txEffectClrLst/>
+  </dgm:styleLbl>
+  <dgm:styleLbl name="parChTrans2D2">
+    <dgm:fillClrLst meth="repeat">
+      <a:schemeClr val="accent3"/>
+    </dgm:fillClrLst>
+    <dgm:linClrLst meth="repeat">
+      <a:schemeClr val="lt1"/>
+    </dgm:linClrLst>
+    <dgm:effectClrLst/>
+    <dgm:txLinClrLst/>
+    <dgm:txFillClrLst/>
+    <dgm:txEffectClrLst/>
+  </dgm:styleLbl>
+  <dgm:styleLbl name="parChTrans2D3">
+    <dgm:fillClrLst meth="repeat">
+      <a:schemeClr val="accent4"/>
+    </dgm:fillClrLst>
+    <dgm:linClrLst meth="repeat">
+      <a:schemeClr val="lt1"/>
+    </dgm:linClrLst>
+    <dgm:effectClrLst/>
+    <dgm:txLinClrLst/>
+    <dgm:txFillClrLst/>
+    <dgm:txEffectClrLst/>
+  </dgm:styleLbl>
+  <dgm:styleLbl name="parChTrans2D4">
+    <dgm:fillClrLst meth="repeat">
+      <a:schemeClr val="accent5"/>
+    </dgm:fillClrLst>
+    <dgm:linClrLst meth="repeat">
+      <a:schemeClr val="lt1"/>
+    </dgm:linClrLst>
+    <dgm:effectClrLst/>
+    <dgm:txLinClrLst/>
+    <dgm:txFillClrLst meth="repeat">
+      <a:schemeClr val="lt1"/>
+    </dgm:txFillClrLst>
+    <dgm:txEffectClrLst/>
+  </dgm:styleLbl>
+  <dgm:styleLbl name="parChTrans1D1">
+    <dgm:fillClrLst meth="repeat">
+      <a:schemeClr val="accent2"/>
+    </dgm:fillClrLst>
+    <dgm:linClrLst meth="repeat">
+      <a:schemeClr val="accent1"/>
+    </dgm:linClrLst>
+    <dgm:effectClrLst/>
+    <dgm:txLinClrLst/>
+    <dgm:txFillClrLst meth="repeat">
+      <a:schemeClr val="tx1"/>
+    </dgm:txFillClrLst>
+    <dgm:txEffectClrLst/>
+  </dgm:styleLbl>
+  <dgm:styleLbl name="parChTrans1D2">
+    <dgm:fillClrLst meth="repeat">
+      <a:schemeClr val="accent3">
+        <a:tint val="90000"/>
+      </a:schemeClr>
+    </dgm:fillClrLst>
+    <dgm:linClrLst meth="repeat">
+      <a:schemeClr val="accent2"/>
+    </dgm:linClrLst>
+    <dgm:effectClrLst/>
+    <dgm:txLinClrLst/>
+    <dgm:txFillClrLst meth="repeat">
+      <a:schemeClr val="tx1"/>
+    </dgm:txFillClrLst>
+    <dgm:txEffectClrLst/>
+  </dgm:styleLbl>
+  <dgm:styleLbl name="parChTrans1D3">
+    <dgm:fillClrLst meth="repeat">
+      <a:schemeClr val="accent4">
+        <a:tint val="70000"/>
+      </a:schemeClr>
+    </dgm:fillClrLst>
+    <dgm:linClrLst meth="repeat">
+      <a:schemeClr val="accent3"/>
+    </dgm:linClrLst>
+    <dgm:effectClrLst/>
+    <dgm:txLinClrLst/>
+    <dgm:txFillClrLst meth="repeat">
+      <a:schemeClr val="tx1"/>
+    </dgm:txFillClrLst>
+    <dgm:txEffectClrLst/>
+  </dgm:styleLbl>
+  <dgm:styleLbl name="parChTrans1D4">
+    <dgm:fillClrLst meth="repeat">
+      <a:schemeClr val="accent5">
+        <a:tint val="50000"/>
+      </a:schemeClr>
+    </dgm:fillClrLst>
+    <dgm:linClrLst meth="repeat">
+      <a:schemeClr val="accent4"/>
+    </dgm:linClrLst>
+    <dgm:effectClrLst/>
+    <dgm:txLinClrLst/>
+    <dgm:txFillClrLst meth="repeat">
+      <a:schemeClr val="tx1"/>
+    </dgm:txFillClrLst>
+    <dgm:txEffectClrLst/>
+  </dgm:styleLbl>
+  <dgm:styleLbl name="fgAcc1">
+    <dgm:fillClrLst meth="repeat">
+      <a:schemeClr val="lt1">
+        <a:alpha val="90000"/>
+      </a:schemeClr>
+    </dgm:fillClrLst>
+    <dgm:linClrLst meth="repeat">
+      <a:schemeClr val="accent2"/>
+      <a:schemeClr val="accent3"/>
+      <a:schemeClr val="accent4"/>
+      <a:schemeClr val="accent5"/>
+      <a:schemeClr val="accent6"/>
+    </dgm:linClrLst>
+    <dgm:effectClrLst/>
+    <dgm:txLinClrLst/>
+    <dgm:txFillClrLst meth="repeat">
+      <a:schemeClr val="dk1"/>
+    </dgm:txFillClrLst>
+    <dgm:txEffectClrLst/>
+  </dgm:styleLbl>
+  <dgm:styleLbl name="conFgAcc1">
+    <dgm:fillClrLst meth="repeat">
+      <a:schemeClr val="lt1">
+        <a:alpha val="90000"/>
+      </a:schemeClr>
+    </dgm:fillClrLst>
+    <dgm:linClrLst meth="repeat">
+      <a:schemeClr val="accent2"/>
+      <a:schemeClr val="accent3"/>
+      <a:schemeClr val="accent4"/>
+      <a:schemeClr val="accent5"/>
+      <a:schemeClr val="accent6"/>
+    </dgm:linClrLst>
+    <dgm:effectClrLst/>
+    <dgm:txLinClrLst/>
+    <dgm:txFillClrLst meth="repeat">
+      <a:schemeClr val="dk1"/>
+    </dgm:txFillClrLst>
+    <dgm:txEffectClrLst/>
+  </dgm:styleLbl>
+  <dgm:styleLbl name="alignAcc1">
+    <dgm:fillClrLst meth="repeat">
+      <a:schemeClr val="lt1">
+        <a:alpha val="90000"/>
+      </a:schemeClr>
+    </dgm:fillClrLst>
+    <dgm:linClrLst meth="repeat">
+      <a:schemeClr val="accent2"/>
+      <a:schemeClr val="accent3"/>
+      <a:schemeClr val="accent4"/>
+      <a:schemeClr val="accent5"/>
+      <a:schemeClr val="accent6"/>
+    </dgm:linClrLst>
+    <dgm:effectClrLst/>
+    <dgm:txLinClrLst/>
+    <dgm:txFillClrLst meth="repeat">
+      <a:schemeClr val="dk1"/>
+    </dgm:txFillClrLst>
+    <dgm:txEffectClrLst/>
+  </dgm:styleLbl>
+  <dgm:styleLbl name="trAlignAcc1">
+    <dgm:fillClrLst meth="repeat">
+      <a:schemeClr val="lt1">
+        <a:alpha val="40000"/>
+      </a:schemeClr>
+    </dgm:fillClrLst>
+    <dgm:linClrLst meth="repeat">
+      <a:schemeClr val="accent1"/>
+    </dgm:linClrLst>
+    <dgm:effectClrLst/>
+    <dgm:txLinClrLst/>
+    <dgm:txFillClrLst meth="repeat">
+      <a:schemeClr val="dk1"/>
+    </dgm:txFillClrLst>
+    <dgm:txEffectClrLst/>
+  </dgm:styleLbl>
+  <dgm:styleLbl name="bgAcc1">
+    <dgm:fillClrLst meth="repeat">
+      <a:schemeClr val="lt1">
+        <a:alpha val="90000"/>
+      </a:schemeClr>
+    </dgm:fillClrLst>
+    <dgm:linClrLst meth="repeat">
+      <a:schemeClr val="accent2"/>
+      <a:schemeClr val="accent3"/>
+      <a:schemeClr val="accent4"/>
+      <a:schemeClr val="accent5"/>
+      <a:schemeClr val="accent6"/>
+    </dgm:linClrLst>
+    <dgm:effectClrLst/>
+    <dgm:txLinClrLst/>
+    <dgm:txFillClrLst meth="repeat">
+      <a:schemeClr val="dk1"/>
+    </dgm:txFillClrLst>
+    <dgm:txEffectClrLst/>
+  </dgm:styleLbl>
+  <dgm:styleLbl name="solidFgAcc1">
+    <dgm:fillClrLst meth="repeat">
+      <a:schemeClr val="lt1"/>
+    </dgm:fillClrLst>
+    <dgm:linClrLst meth="repeat">
+      <a:schemeClr val="accent2"/>
+      <a:schemeClr val="accent3"/>
+      <a:schemeClr val="accent4"/>
+      <a:schemeClr val="accent5"/>
+      <a:schemeClr val="accent6"/>
+    </dgm:linClrLst>
+    <dgm:effectClrLst/>
+    <dgm:txLinClrLst/>
+    <dgm:txFillClrLst meth="repeat">
+      <a:schemeClr val="dk1"/>
+    </dgm:txFillClrLst>
+    <dgm:txEffectClrLst/>
+  </dgm:styleLbl>
+  <dgm:styleLbl name="solidAlignAcc1">
+    <dgm:fillClrLst meth="repeat">
+      <a:schemeClr val="lt1"/>
+    </dgm:fillClrLst>
+    <dgm:linClrLst meth="repeat">
+      <a:schemeClr val="accent2"/>
+      <a:schemeClr val="accent3"/>
+      <a:schemeClr val="accent4"/>
+      <a:schemeClr val="accent5"/>
+      <a:schemeClr val="accent6"/>
+    </dgm:linClrLst>
+    <dgm:effectClrLst/>
+    <dgm:txLinClrLst/>
+    <dgm:txFillClrLst meth="repeat">
+      <a:schemeClr val="dk1"/>
+    </dgm:txFillClrLst>
+    <dgm:txEffectClrLst/>
+  </dgm:styleLbl>
+  <dgm:styleLbl name="solidBgAcc1">
+    <dgm:fillClrLst meth="repeat">
+      <a:schemeClr val="lt1"/>
+    </dgm:fillClrLst>
+    <dgm:linClrLst meth="repeat">
+      <a:schemeClr val="accent2"/>
+      <a:schemeClr val="accent3"/>
+      <a:schemeClr val="accent4"/>
+      <a:schemeClr val="accent5"/>
+      <a:schemeClr val="accent6"/>
+    </dgm:linClrLst>
+    <dgm:effectClrLst/>
+    <dgm:txLinClrLst/>
+    <dgm:txFillClrLst meth="repeat">
+      <a:schemeClr val="dk1"/>
+    </dgm:txFillClrLst>
+    <dgm:txEffectClrLst/>
+  </dgm:styleLbl>
+  <dgm:styleLbl name="fgAccFollowNode1">
+    <dgm:fillClrLst meth="repeat">
+      <a:schemeClr val="accent2">
+        <a:tint val="40000"/>
+        <a:alpha val="90000"/>
+      </a:schemeClr>
+      <a:schemeClr val="accent3">
+        <a:tint val="40000"/>
+        <a:alpha val="90000"/>
+      </a:schemeClr>
+      <a:schemeClr val="accent4">
+        <a:tint val="40000"/>
+        <a:alpha val="90000"/>
+      </a:schemeClr>
+      <a:schemeClr val="accent5">
+        <a:tint val="40000"/>
+        <a:alpha val="90000"/>
+      </a:schemeClr>
+      <a:schemeClr val="accent6">
+        <a:tint val="40000"/>
+        <a:alpha val="90000"/>
+      </a:schemeClr>
+    </dgm:fillClrLst>
+    <dgm:linClrLst meth="repeat">
+      <a:schemeClr val="accent2">
+        <a:tint val="40000"/>
+        <a:alpha val="90000"/>
+      </a:schemeClr>
+      <a:schemeClr val="accent3">
+        <a:tint val="40000"/>
+        <a:alpha val="90000"/>
+      </a:schemeClr>
+      <a:schemeClr val="accent4">
+        <a:tint val="40000"/>
+        <a:alpha val="90000"/>
+      </a:schemeClr>
+      <a:schemeClr val="accent5">
+        <a:tint val="40000"/>
+        <a:alpha val="90000"/>
+      </a:schemeClr>
+      <a:schemeClr val="accent6">
+        <a:tint val="40000"/>
+        <a:alpha val="90000"/>
+      </a:schemeClr>
+    </dgm:linClrLst>
+    <dgm:effectClrLst/>
+    <dgm:txLinClrLst/>
+    <dgm:txFillClrLst meth="repeat">
+      <a:schemeClr val="dk1"/>
+    </dgm:txFillClrLst>
+    <dgm:txEffectClrLst/>
+  </dgm:styleLbl>
+  <dgm:styleLbl name="alignAccFollowNode1">
+    <dgm:fillClrLst meth="repeat">
+      <a:schemeClr val="accent2">
+        <a:tint val="40000"/>
+        <a:alpha val="90000"/>
+      </a:schemeClr>
+      <a:schemeClr val="accent3">
+        <a:tint val="40000"/>
+        <a:alpha val="90000"/>
+      </a:schemeClr>
+      <a:schemeClr val="accent4">
+        <a:tint val="40000"/>
+        <a:alpha val="90000"/>
+      </a:schemeClr>
+      <a:schemeClr val="accent5">
+        <a:tint val="40000"/>
+        <a:alpha val="90000"/>
+      </a:schemeClr>
+      <a:schemeClr val="accent6">
+        <a:tint val="40000"/>
+        <a:alpha val="90000"/>
+      </a:schemeClr>
+    </dgm:fillClrLst>
+    <dgm:linClrLst meth="repeat">
+      <a:schemeClr val="accent2">
+        <a:tint val="40000"/>
+        <a:alpha val="90000"/>
+      </a:schemeClr>
+      <a:schemeClr val="accent3">
+        <a:tint val="40000"/>
+        <a:alpha val="90000"/>
+      </a:schemeClr>
+      <a:schemeClr val="accent4">
+        <a:tint val="40000"/>
+        <a:alpha val="90000"/>
+      </a:schemeClr>
+      <a:schemeClr val="accent5">
+        <a:tint val="40000"/>
+        <a:alpha val="90000"/>
+      </a:schemeClr>
+      <a:schemeClr val="accent6">
+        <a:tint val="40000"/>
+        <a:alpha val="90000"/>
+      </a:schemeClr>
+    </dgm:linClrLst>
+    <dgm:effectClrLst/>
+    <dgm:txLinClrLst/>
+    <dgm:txFillClrLst meth="repeat">
+      <a:schemeClr val="dk1"/>
+    </dgm:txFillClrLst>
+    <dgm:txEffectClrLst/>
+  </dgm:styleLbl>
+  <dgm:styleLbl name="bgAccFollowNode1">
+    <dgm:fillClrLst meth="repeat">
+      <a:schemeClr val="accent2">
+        <a:tint val="40000"/>
+        <a:alpha val="90000"/>
+      </a:schemeClr>
+      <a:schemeClr val="accent3">
+        <a:tint val="40000"/>
+        <a:alpha val="90000"/>
+      </a:schemeClr>
+      <a:schemeClr val="accent4">
+        <a:tint val="40000"/>
+        <a:alpha val="90000"/>
+      </a:schemeClr>
+      <a:schemeClr val="accent5">
+        <a:tint val="40000"/>
+        <a:alpha val="90000"/>
+      </a:schemeClr>
+      <a:schemeClr val="accent6">
+        <a:tint val="40000"/>
+        <a:alpha val="90000"/>
+      </a:schemeClr>
+    </dgm:fillClrLst>
+    <dgm:linClrLst meth="repeat">
+      <a:schemeClr val="accent2">
+        <a:tint val="40000"/>
+        <a:alpha val="90000"/>
+      </a:schemeClr>
+      <a:schemeClr val="accent3">
+        <a:tint val="40000"/>
+        <a:alpha val="90000"/>
+      </a:schemeClr>
+      <a:schemeClr val="accent4">
+        <a:tint val="40000"/>
+        <a:alpha val="90000"/>
+      </a:schemeClr>
+      <a:schemeClr val="accent5">
+        <a:tint val="40000"/>
+        <a:alpha val="90000"/>
+      </a:schemeClr>
+      <a:schemeClr val="accent6">
+        <a:tint val="40000"/>
+        <a:alpha val="90000"/>
+      </a:schemeClr>
+    </dgm:linClrLst>
+    <dgm:effectClrLst/>
+    <dgm:txLinClrLst/>
+    <dgm:txFillClrLst meth="repeat">
+      <a:schemeClr val="dk1"/>
+    </dgm:txFillClrLst>
+    <dgm:txEffectClrLst/>
+  </dgm:styleLbl>
+  <dgm:styleLbl name="fgAcc0">
+    <dgm:fillClrLst meth="repeat">
+      <a:schemeClr val="lt1">
+        <a:alpha val="90000"/>
+      </a:schemeClr>
+    </dgm:fillClrLst>
+    <dgm:linClrLst>
+      <a:schemeClr val="accent1"/>
+    </dgm:linClrLst>
+    <dgm:effectClrLst/>
+    <dgm:txLinClrLst/>
+    <dgm:txFillClrLst meth="repeat">
+      <a:schemeClr val="dk1"/>
+    </dgm:txFillClrLst>
+    <dgm:txEffectClrLst/>
+  </dgm:styleLbl>
+  <dgm:styleLbl name="fgAcc2">
+    <dgm:fillClrLst meth="repeat">
+      <a:schemeClr val="lt1">
+        <a:alpha val="90000"/>
+      </a:schemeClr>
+    </dgm:fillClrLst>
+    <dgm:linClrLst>
+      <a:schemeClr val="accent2"/>
+    </dgm:linClrLst>
+    <dgm:effectClrLst/>
+    <dgm:txLinClrLst/>
+    <dgm:txFillClrLst meth="repeat">
+      <a:schemeClr val="dk1"/>
+    </dgm:txFillClrLst>
+    <dgm:txEffectClrLst/>
+  </dgm:styleLbl>
+  <dgm:styleLbl name="fgAcc3">
+    <dgm:fillClrLst meth="repeat">
+      <a:schemeClr val="lt1">
+        <a:alpha val="90000"/>
+      </a:schemeClr>
+    </dgm:fillClrLst>
+    <dgm:linClrLst>
+      <a:schemeClr val="accent3"/>
+    </dgm:linClrLst>
+    <dgm:effectClrLst/>
+    <dgm:txLinClrLst/>
+    <dgm:txFillClrLst meth="repeat">
+      <a:schemeClr val="dk1"/>
+    </dgm:txFillClrLst>
+    <dgm:txEffectClrLst/>
+  </dgm:styleLbl>
+  <dgm:styleLbl name="fgAcc4">
+    <dgm:fillClrLst meth="repeat">
+      <a:schemeClr val="lt1">
+        <a:alpha val="90000"/>
+      </a:schemeClr>
+    </dgm:fillClrLst>
+    <dgm:linClrLst>
+      <a:schemeClr val="accent4"/>
+    </dgm:linClrLst>
+    <dgm:effectClrLst/>
+    <dgm:txLinClrLst/>
+    <dgm:txFillClrLst meth="repeat">
+      <a:schemeClr val="dk1"/>
+    </dgm:txFillClrLst>
+    <dgm:txEffectClrLst/>
+  </dgm:styleLbl>
+  <dgm:styleLbl name="bgShp">
+    <dgm:fillClrLst meth="repeat">
+      <a:schemeClr val="bg1">
+        <a:lumMod val="95000"/>
+      </a:schemeClr>
+    </dgm:fillClrLst>
+    <dgm:linClrLst meth="repeat">
+      <a:schemeClr val="dk1"/>
+    </dgm:linClrLst>
+    <dgm:effectClrLst/>
+    <dgm:txLinClrLst/>
+    <dgm:txFillClrLst meth="repeat">
+      <a:schemeClr val="dk1"/>
+    </dgm:txFillClrLst>
+    <dgm:txEffectClrLst/>
+  </dgm:styleLbl>
+  <dgm:styleLbl name="dkBgShp">
+    <dgm:fillClrLst meth="repeat">
+      <a:schemeClr val="accent2">
+        <a:shade val="90000"/>
+      </a:schemeClr>
+    </dgm:fillClrLst>
+    <dgm:linClrLst meth="repeat">
+      <a:schemeClr val="dk1"/>
+    </dgm:linClrLst>
+    <dgm:effectClrLst/>
+    <dgm:txLinClrLst/>
+    <dgm:txFillClrLst meth="repeat">
+      <a:schemeClr val="lt1"/>
+    </dgm:txFillClrLst>
+    <dgm:txEffectClrLst/>
+  </dgm:styleLbl>
+  <dgm:styleLbl name="trBgShp">
+    <dgm:fillClrLst meth="repeat">
+      <a:schemeClr val="accent1">
+        <a:tint val="50000"/>
+        <a:alpha val="40000"/>
+      </a:schemeClr>
+    </dgm:fillClrLst>
+    <dgm:linClrLst meth="repeat">
+      <a:schemeClr val="accent2"/>
+    </dgm:linClrLst>
+    <dgm:effectClrLst/>
+    <dgm:txLinClrLst/>
+    <dgm:txFillClrLst meth="repeat">
+      <a:schemeClr val="lt1"/>
+    </dgm:txFillClrLst>
+    <dgm:txEffectClrLst/>
+  </dgm:styleLbl>
+  <dgm:styleLbl name="fgShp">
+    <dgm:fillClrLst meth="repeat">
+      <a:schemeClr val="accent2">
+        <a:tint val="40000"/>
+      </a:schemeClr>
+    </dgm:fillClrLst>
+    <dgm:linClrLst meth="repeat">
+      <a:schemeClr val="lt1"/>
+    </dgm:linClrLst>
+    <dgm:effectClrLst/>
+    <dgm:txLinClrLst/>
+    <dgm:txFillClrLst meth="repeat">
+      <a:schemeClr val="dk1"/>
+    </dgm:txFillClrLst>
+    <dgm:txEffectClrLst/>
+  </dgm:styleLbl>
+  <dgm:styleLbl name="revTx">
+    <dgm:fillClrLst meth="repeat">
+      <a:schemeClr val="lt1">
+        <a:alpha val="0"/>
+      </a:schemeClr>
+    </dgm:fillClrLst>
+    <dgm:linClrLst meth="repeat">
+      <a:schemeClr val="dk1">
+        <a:alpha val="0"/>
+      </a:schemeClr>
+    </dgm:linClrLst>
+    <dgm:effectClrLst/>
+    <dgm:txLinClrLst/>
+    <dgm:txFillClrLst meth="repeat">
+      <a:schemeClr val="tx1"/>
+    </dgm:txFillClrLst>
+    <dgm:txEffectClrLst/>
+  </dgm:styleLbl>
+</dgm:colorsDef>
+</file>
+
+<file path=ppt/diagrams/data1.xml><?xml version="1.0" encoding="utf-8"?>
+<dgm:dataModel xmlns:dgm="http://schemas.openxmlformats.org/drawingml/2006/diagram" xmlns:a="http://schemas.openxmlformats.org/drawingml/2006/main">
+  <dgm:ptLst>
+    <dgm:pt modelId="{6FBA3FD5-8DFF-47C2-B0EC-13A7AD8016D0}" type="doc">
+      <dgm:prSet loTypeId="urn:microsoft.com/office/officeart/2018/2/layout/IconVerticalSolidList" loCatId="icon" qsTypeId="urn:microsoft.com/office/officeart/2005/8/quickstyle/simple1" qsCatId="simple" csTypeId="urn:microsoft.com/office/officeart/2018/5/colors/Iconchunking_neutralbg_colorful1" csCatId="colorful" phldr="1"/>
+      <dgm:spPr/>
+      <dgm:t>
+        <a:bodyPr/>
+        <a:lstStyle/>
+        <a:p>
+          <a:endParaRPr lang="en-US"/>
+        </a:p>
+      </dgm:t>
+    </dgm:pt>
+    <dgm:pt modelId="{B85E06C4-0E6D-4785-BE90-4F16C20D05A0}">
+      <dgm:prSet/>
+      <dgm:spPr/>
+      <dgm:t>
+        <a:bodyPr/>
+        <a:lstStyle/>
+        <a:p>
+          <a:r>
+            <a:rPr lang="en-GB" dirty="0"/>
+            <a:t>Your badge serves as your ticket for lunch</a:t>
+          </a:r>
+          <a:endParaRPr lang="en-US" dirty="0"/>
+        </a:p>
+      </dgm:t>
+    </dgm:pt>
+    <dgm:pt modelId="{B1AD0D62-4874-479B-8C92-A1D0ABD01A2E}" type="parTrans" cxnId="{5B0833B8-F02C-481F-B35D-05C2B7D27D71}">
+      <dgm:prSet/>
+      <dgm:spPr/>
+      <dgm:t>
+        <a:bodyPr/>
+        <a:lstStyle/>
+        <a:p>
+          <a:endParaRPr lang="en-US"/>
+        </a:p>
+      </dgm:t>
+    </dgm:pt>
+    <dgm:pt modelId="{479509F6-198E-4651-95D4-DE509C5BE289}" type="sibTrans" cxnId="{5B0833B8-F02C-481F-B35D-05C2B7D27D71}">
+      <dgm:prSet/>
+      <dgm:spPr/>
+      <dgm:t>
+        <a:bodyPr/>
+        <a:lstStyle/>
+        <a:p>
+          <a:endParaRPr lang="en-US"/>
+        </a:p>
+      </dgm:t>
+    </dgm:pt>
+    <dgm:pt modelId="{990B369E-DD38-4BD4-A24C-ACFECB2AE5A5}">
+      <dgm:prSet/>
+      <dgm:spPr/>
+      <dgm:t>
+        <a:bodyPr/>
+        <a:lstStyle/>
+        <a:p>
+          <a:r>
+            <a:rPr lang="en-GB"/>
+            <a:t>Wi-Fi: Connect to the Eduroam network (password was sent via email)</a:t>
+          </a:r>
+          <a:endParaRPr lang="en-US"/>
+        </a:p>
+      </dgm:t>
+    </dgm:pt>
+    <dgm:pt modelId="{6529A42A-424F-4D1A-80FE-0EDA19E9E03C}" type="parTrans" cxnId="{F1C1B81E-D610-4D20-9DB2-7135186E9855}">
+      <dgm:prSet/>
+      <dgm:spPr/>
+      <dgm:t>
+        <a:bodyPr/>
+        <a:lstStyle/>
+        <a:p>
+          <a:endParaRPr lang="en-US"/>
+        </a:p>
+      </dgm:t>
+    </dgm:pt>
+    <dgm:pt modelId="{67F4D13D-05B9-4D83-9090-546E31B60294}" type="sibTrans" cxnId="{F1C1B81E-D610-4D20-9DB2-7135186E9855}">
+      <dgm:prSet/>
+      <dgm:spPr/>
+      <dgm:t>
+        <a:bodyPr/>
+        <a:lstStyle/>
+        <a:p>
+          <a:endParaRPr lang="en-US"/>
+        </a:p>
+      </dgm:t>
+    </dgm:pt>
+    <dgm:pt modelId="{F565A773-2BD1-40DB-89AE-900DF6598EA4}">
+      <dgm:prSet/>
+      <dgm:spPr/>
+      <dgm:t>
+        <a:bodyPr/>
+        <a:lstStyle/>
+        <a:p>
+          <a:r>
+            <a:rPr lang="en-GB" dirty="0"/>
+            <a:t>Please note, a photographer </a:t>
+          </a:r>
+          <a:r>
+            <a:rPr lang="en-GB" i="1" dirty="0"/>
+            <a:t>might</a:t>
+          </a:r>
+          <a:r>
+            <a:rPr lang="en-GB" dirty="0"/>
+            <a:t> be present</a:t>
+          </a:r>
+          <a:endParaRPr lang="en-US" dirty="0"/>
+        </a:p>
+      </dgm:t>
+    </dgm:pt>
+    <dgm:pt modelId="{DD3BBFFB-D4F9-4A44-95B7-C2DA3737912C}" type="parTrans" cxnId="{573BEEDD-C461-4F52-8A97-8267EB9C260E}">
+      <dgm:prSet/>
+      <dgm:spPr/>
+      <dgm:t>
+        <a:bodyPr/>
+        <a:lstStyle/>
+        <a:p>
+          <a:endParaRPr lang="en-US"/>
+        </a:p>
+      </dgm:t>
+    </dgm:pt>
+    <dgm:pt modelId="{89A19FCA-1A7F-46E7-B691-DAE9052F2B71}" type="sibTrans" cxnId="{573BEEDD-C461-4F52-8A97-8267EB9C260E}">
+      <dgm:prSet/>
+      <dgm:spPr/>
+      <dgm:t>
+        <a:bodyPr/>
+        <a:lstStyle/>
+        <a:p>
+          <a:endParaRPr lang="en-US"/>
+        </a:p>
+      </dgm:t>
+    </dgm:pt>
+    <dgm:pt modelId="{97595C2E-6DF0-44BC-B17A-0DC54C3AF23F}" type="pres">
+      <dgm:prSet presAssocID="{6FBA3FD5-8DFF-47C2-B0EC-13A7AD8016D0}" presName="root" presStyleCnt="0">
+        <dgm:presLayoutVars>
+          <dgm:dir/>
+          <dgm:resizeHandles val="exact"/>
+        </dgm:presLayoutVars>
+      </dgm:prSet>
+      <dgm:spPr/>
+    </dgm:pt>
+    <dgm:pt modelId="{8FC8F573-9431-4C36-B94F-20672F5B9C2F}" type="pres">
+      <dgm:prSet presAssocID="{B85E06C4-0E6D-4785-BE90-4F16C20D05A0}" presName="compNode" presStyleCnt="0"/>
+      <dgm:spPr/>
+    </dgm:pt>
+    <dgm:pt modelId="{B59DFBF0-797A-468B-9C55-3062028EED9C}" type="pres">
+      <dgm:prSet presAssocID="{B85E06C4-0E6D-4785-BE90-4F16C20D05A0}" presName="bgRect" presStyleLbl="bgShp" presStyleIdx="0" presStyleCnt="3" custLinFactNeighborY="2442"/>
+      <dgm:spPr/>
+    </dgm:pt>
+    <dgm:pt modelId="{84CA9DA3-12E2-4D23-861B-E375F349E2A4}" type="pres">
+      <dgm:prSet presAssocID="{B85E06C4-0E6D-4785-BE90-4F16C20D05A0}" presName="iconRect" presStyleLbl="node1" presStyleIdx="0" presStyleCnt="3"/>
+      <dgm:spPr>
+        <a:blipFill>
+          <a:blip xmlns:r="http://schemas.openxmlformats.org/officeDocument/2006/relationships" r:embed="rId1">
+            <a:extLst>
+              <a:ext uri="{28A0092B-C50C-407E-A947-70E740481C1C}">
+                <a14:useLocalDpi xmlns:a14="http://schemas.microsoft.com/office/drawing/2010/main" val="0"/>
+              </a:ext>
+              <a:ext uri="{96DAC541-7B7A-43D3-8B79-37D633B846F1}">
+                <asvg:svgBlip xmlns:asvg="http://schemas.microsoft.com/office/drawing/2016/SVG/main" r:embed="rId2"/>
+              </a:ext>
+            </a:extLst>
+          </a:blip>
+          <a:stretch>
+            <a:fillRect/>
+          </a:stretch>
+        </a:blipFill>
+        <a:ln>
+          <a:noFill/>
+        </a:ln>
+      </dgm:spPr>
+      <dgm:extLst>
+        <a:ext uri="{E40237B7-FDA0-4F09-8148-C483321AD2D9}">
+          <dgm14:cNvPr xmlns:dgm14="http://schemas.microsoft.com/office/drawing/2010/diagram" id="0" name="" descr="Employee Badge"/>
+        </a:ext>
+      </dgm:extLst>
+    </dgm:pt>
+    <dgm:pt modelId="{117AE54C-A92F-405A-9185-5D4EC58D9E4D}" type="pres">
+      <dgm:prSet presAssocID="{B85E06C4-0E6D-4785-BE90-4F16C20D05A0}" presName="spaceRect" presStyleCnt="0"/>
+      <dgm:spPr/>
+    </dgm:pt>
+    <dgm:pt modelId="{6C135539-CDAC-47F8-8BE1-319B096B426E}" type="pres">
+      <dgm:prSet presAssocID="{B85E06C4-0E6D-4785-BE90-4F16C20D05A0}" presName="parTx" presStyleLbl="revTx" presStyleIdx="0" presStyleCnt="3">
+        <dgm:presLayoutVars>
+          <dgm:chMax val="0"/>
+          <dgm:chPref val="0"/>
+        </dgm:presLayoutVars>
+      </dgm:prSet>
+      <dgm:spPr/>
+    </dgm:pt>
+    <dgm:pt modelId="{44A11DB3-51B3-4E12-A072-D7AC58ADD4F3}" type="pres">
+      <dgm:prSet presAssocID="{479509F6-198E-4651-95D4-DE509C5BE289}" presName="sibTrans" presStyleCnt="0"/>
+      <dgm:spPr/>
+    </dgm:pt>
+    <dgm:pt modelId="{9B209325-BB4D-4F77-B0D0-56AD197C590B}" type="pres">
+      <dgm:prSet presAssocID="{990B369E-DD38-4BD4-A24C-ACFECB2AE5A5}" presName="compNode" presStyleCnt="0"/>
+      <dgm:spPr/>
+    </dgm:pt>
+    <dgm:pt modelId="{A5FF0DC2-E35B-4997-A6C7-C29243436D9F}" type="pres">
+      <dgm:prSet presAssocID="{990B369E-DD38-4BD4-A24C-ACFECB2AE5A5}" presName="bgRect" presStyleLbl="bgShp" presStyleIdx="1" presStyleCnt="3"/>
+      <dgm:spPr/>
+    </dgm:pt>
+    <dgm:pt modelId="{96ED1ED7-DE09-49CE-B412-1D410CCF832B}" type="pres">
+      <dgm:prSet presAssocID="{990B369E-DD38-4BD4-A24C-ACFECB2AE5A5}" presName="iconRect" presStyleLbl="node1" presStyleIdx="1" presStyleCnt="3"/>
+      <dgm:spPr>
+        <a:blipFill>
+          <a:blip xmlns:r="http://schemas.openxmlformats.org/officeDocument/2006/relationships" r:embed="rId3">
+            <a:extLst>
+              <a:ext uri="{28A0092B-C50C-407E-A947-70E740481C1C}">
+                <a14:useLocalDpi xmlns:a14="http://schemas.microsoft.com/office/drawing/2010/main" val="0"/>
+              </a:ext>
+              <a:ext uri="{96DAC541-7B7A-43D3-8B79-37D633B846F1}">
+                <asvg:svgBlip xmlns:asvg="http://schemas.microsoft.com/office/drawing/2016/SVG/main" r:embed="rId4"/>
+              </a:ext>
+            </a:extLst>
+          </a:blip>
+          <a:stretch>
+            <a:fillRect/>
+          </a:stretch>
+        </a:blipFill>
+        <a:ln>
+          <a:noFill/>
+        </a:ln>
+      </dgm:spPr>
+      <dgm:extLst>
+        <a:ext uri="{E40237B7-FDA0-4F09-8148-C483321AD2D9}">
+          <dgm14:cNvPr xmlns:dgm14="http://schemas.microsoft.com/office/drawing/2010/diagram" id="0" name="" descr="Wireless router"/>
+        </a:ext>
+      </dgm:extLst>
+    </dgm:pt>
+    <dgm:pt modelId="{DF1CD725-CB39-44E1-8D3A-EF002383D62F}" type="pres">
+      <dgm:prSet presAssocID="{990B369E-DD38-4BD4-A24C-ACFECB2AE5A5}" presName="spaceRect" presStyleCnt="0"/>
+      <dgm:spPr/>
+    </dgm:pt>
+    <dgm:pt modelId="{BC23B0D7-2952-412C-B226-EBFB60AAFC72}" type="pres">
+      <dgm:prSet presAssocID="{990B369E-DD38-4BD4-A24C-ACFECB2AE5A5}" presName="parTx" presStyleLbl="revTx" presStyleIdx="1" presStyleCnt="3">
+        <dgm:presLayoutVars>
+          <dgm:chMax val="0"/>
+          <dgm:chPref val="0"/>
+        </dgm:presLayoutVars>
+      </dgm:prSet>
+      <dgm:spPr/>
+    </dgm:pt>
+    <dgm:pt modelId="{C9F2D232-BBBE-40AB-93A5-975E9CAF5D31}" type="pres">
+      <dgm:prSet presAssocID="{67F4D13D-05B9-4D83-9090-546E31B60294}" presName="sibTrans" presStyleCnt="0"/>
+      <dgm:spPr/>
+    </dgm:pt>
+    <dgm:pt modelId="{43596B42-A264-40B6-A093-AC55349CE38E}" type="pres">
+      <dgm:prSet presAssocID="{F565A773-2BD1-40DB-89AE-900DF6598EA4}" presName="compNode" presStyleCnt="0"/>
+      <dgm:spPr/>
+    </dgm:pt>
+    <dgm:pt modelId="{E946DF02-E35E-4458-AF4D-AFA14F485369}" type="pres">
+      <dgm:prSet presAssocID="{F565A773-2BD1-40DB-89AE-900DF6598EA4}" presName="bgRect" presStyleLbl="bgShp" presStyleIdx="2" presStyleCnt="3"/>
+      <dgm:spPr/>
+    </dgm:pt>
+    <dgm:pt modelId="{C5EF812E-9591-4D03-AA4D-926922BCEB39}" type="pres">
+      <dgm:prSet presAssocID="{F565A773-2BD1-40DB-89AE-900DF6598EA4}" presName="iconRect" presStyleLbl="node1" presStyleIdx="2" presStyleCnt="3"/>
+      <dgm:spPr>
+        <a:blipFill>
+          <a:blip xmlns:r="http://schemas.openxmlformats.org/officeDocument/2006/relationships" r:embed="rId5">
+            <a:extLst>
+              <a:ext uri="{28A0092B-C50C-407E-A947-70E740481C1C}">
+                <a14:useLocalDpi xmlns:a14="http://schemas.microsoft.com/office/drawing/2010/main" val="0"/>
+              </a:ext>
+              <a:ext uri="{96DAC541-7B7A-43D3-8B79-37D633B846F1}">
+                <asvg:svgBlip xmlns:asvg="http://schemas.microsoft.com/office/drawing/2016/SVG/main" r:embed="rId6"/>
+              </a:ext>
+            </a:extLst>
+          </a:blip>
+          <a:stretch>
+            <a:fillRect/>
+          </a:stretch>
+        </a:blipFill>
+        <a:ln>
+          <a:noFill/>
+        </a:ln>
+      </dgm:spPr>
+      <dgm:extLst>
+        <a:ext uri="{E40237B7-FDA0-4F09-8148-C483321AD2D9}">
+          <dgm14:cNvPr xmlns:dgm14="http://schemas.microsoft.com/office/drawing/2010/diagram" id="0" name="" descr="Image"/>
+        </a:ext>
+      </dgm:extLst>
+    </dgm:pt>
+    <dgm:pt modelId="{C84D46D0-ABD9-4BB7-9ECD-D88E22CD2265}" type="pres">
+      <dgm:prSet presAssocID="{F565A773-2BD1-40DB-89AE-900DF6598EA4}" presName="spaceRect" presStyleCnt="0"/>
+      <dgm:spPr/>
+    </dgm:pt>
+    <dgm:pt modelId="{DCF0F954-A0C0-42AD-8E12-74127D33796F}" type="pres">
+      <dgm:prSet presAssocID="{F565A773-2BD1-40DB-89AE-900DF6598EA4}" presName="parTx" presStyleLbl="revTx" presStyleIdx="2" presStyleCnt="3">
+        <dgm:presLayoutVars>
+          <dgm:chMax val="0"/>
+          <dgm:chPref val="0"/>
+        </dgm:presLayoutVars>
+      </dgm:prSet>
+      <dgm:spPr/>
+    </dgm:pt>
+  </dgm:ptLst>
+  <dgm:cxnLst>
+    <dgm:cxn modelId="{35A20516-920E-4465-9636-35AA16E8DEC6}" type="presOf" srcId="{6FBA3FD5-8DFF-47C2-B0EC-13A7AD8016D0}" destId="{97595C2E-6DF0-44BC-B17A-0DC54C3AF23F}" srcOrd="0" destOrd="0" presId="urn:microsoft.com/office/officeart/2018/2/layout/IconVerticalSolidList"/>
+    <dgm:cxn modelId="{F1C1B81E-D610-4D20-9DB2-7135186E9855}" srcId="{6FBA3FD5-8DFF-47C2-B0EC-13A7AD8016D0}" destId="{990B369E-DD38-4BD4-A24C-ACFECB2AE5A5}" srcOrd="1" destOrd="0" parTransId="{6529A42A-424F-4D1A-80FE-0EDA19E9E03C}" sibTransId="{67F4D13D-05B9-4D83-9090-546E31B60294}"/>
+    <dgm:cxn modelId="{FC0B6237-9751-472B-8F29-8D330863EB4E}" type="presOf" srcId="{B85E06C4-0E6D-4785-BE90-4F16C20D05A0}" destId="{6C135539-CDAC-47F8-8BE1-319B096B426E}" srcOrd="0" destOrd="0" presId="urn:microsoft.com/office/officeart/2018/2/layout/IconVerticalSolidList"/>
+    <dgm:cxn modelId="{D57BDB90-B876-41C9-88ED-7615722324FE}" type="presOf" srcId="{990B369E-DD38-4BD4-A24C-ACFECB2AE5A5}" destId="{BC23B0D7-2952-412C-B226-EBFB60AAFC72}" srcOrd="0" destOrd="0" presId="urn:microsoft.com/office/officeart/2018/2/layout/IconVerticalSolidList"/>
+    <dgm:cxn modelId="{4C5596A8-2AD4-4E42-97F4-E82704AD7426}" type="presOf" srcId="{F565A773-2BD1-40DB-89AE-900DF6598EA4}" destId="{DCF0F954-A0C0-42AD-8E12-74127D33796F}" srcOrd="0" destOrd="0" presId="urn:microsoft.com/office/officeart/2018/2/layout/IconVerticalSolidList"/>
+    <dgm:cxn modelId="{5B0833B8-F02C-481F-B35D-05C2B7D27D71}" srcId="{6FBA3FD5-8DFF-47C2-B0EC-13A7AD8016D0}" destId="{B85E06C4-0E6D-4785-BE90-4F16C20D05A0}" srcOrd="0" destOrd="0" parTransId="{B1AD0D62-4874-479B-8C92-A1D0ABD01A2E}" sibTransId="{479509F6-198E-4651-95D4-DE509C5BE289}"/>
+    <dgm:cxn modelId="{573BEEDD-C461-4F52-8A97-8267EB9C260E}" srcId="{6FBA3FD5-8DFF-47C2-B0EC-13A7AD8016D0}" destId="{F565A773-2BD1-40DB-89AE-900DF6598EA4}" srcOrd="2" destOrd="0" parTransId="{DD3BBFFB-D4F9-4A44-95B7-C2DA3737912C}" sibTransId="{89A19FCA-1A7F-46E7-B691-DAE9052F2B71}"/>
+    <dgm:cxn modelId="{E4BBF6B9-EA51-4498-8C91-631E4BFC3B61}" type="presParOf" srcId="{97595C2E-6DF0-44BC-B17A-0DC54C3AF23F}" destId="{8FC8F573-9431-4C36-B94F-20672F5B9C2F}" srcOrd="0" destOrd="0" presId="urn:microsoft.com/office/officeart/2018/2/layout/IconVerticalSolidList"/>
+    <dgm:cxn modelId="{13EEC292-9F47-4B57-BB5C-1A111C48229B}" type="presParOf" srcId="{8FC8F573-9431-4C36-B94F-20672F5B9C2F}" destId="{B59DFBF0-797A-468B-9C55-3062028EED9C}" srcOrd="0" destOrd="0" presId="urn:microsoft.com/office/officeart/2018/2/layout/IconVerticalSolidList"/>
+    <dgm:cxn modelId="{02A2CDDB-941C-475A-B59A-CAE639871CDD}" type="presParOf" srcId="{8FC8F573-9431-4C36-B94F-20672F5B9C2F}" destId="{84CA9DA3-12E2-4D23-861B-E375F349E2A4}" srcOrd="1" destOrd="0" presId="urn:microsoft.com/office/officeart/2018/2/layout/IconVerticalSolidList"/>
+    <dgm:cxn modelId="{8AED0B87-BFCE-4471-BD3E-604DAD41A5FF}" type="presParOf" srcId="{8FC8F573-9431-4C36-B94F-20672F5B9C2F}" destId="{117AE54C-A92F-405A-9185-5D4EC58D9E4D}" srcOrd="2" destOrd="0" presId="urn:microsoft.com/office/officeart/2018/2/layout/IconVerticalSolidList"/>
+    <dgm:cxn modelId="{B274384A-37FC-44B8-817A-874EC18ECBD1}" type="presParOf" srcId="{8FC8F573-9431-4C36-B94F-20672F5B9C2F}" destId="{6C135539-CDAC-47F8-8BE1-319B096B426E}" srcOrd="3" destOrd="0" presId="urn:microsoft.com/office/officeart/2018/2/layout/IconVerticalSolidList"/>
+    <dgm:cxn modelId="{EE4F6511-8EB7-4809-B1A0-9034AA02A0C8}" type="presParOf" srcId="{97595C2E-6DF0-44BC-B17A-0DC54C3AF23F}" destId="{44A11DB3-51B3-4E12-A072-D7AC58ADD4F3}" srcOrd="1" destOrd="0" presId="urn:microsoft.com/office/officeart/2018/2/layout/IconVerticalSolidList"/>
+    <dgm:cxn modelId="{5DD5E9D0-A65C-439F-BC30-C25CD05A5FE4}" type="presParOf" srcId="{97595C2E-6DF0-44BC-B17A-0DC54C3AF23F}" destId="{9B209325-BB4D-4F77-B0D0-56AD197C590B}" srcOrd="2" destOrd="0" presId="urn:microsoft.com/office/officeart/2018/2/layout/IconVerticalSolidList"/>
+    <dgm:cxn modelId="{A9819E11-0B0E-4288-A6BD-DB098B176AA6}" type="presParOf" srcId="{9B209325-BB4D-4F77-B0D0-56AD197C590B}" destId="{A5FF0DC2-E35B-4997-A6C7-C29243436D9F}" srcOrd="0" destOrd="0" presId="urn:microsoft.com/office/officeart/2018/2/layout/IconVerticalSolidList"/>
+    <dgm:cxn modelId="{6D949ABC-A910-4D49-AE70-50FD19A46A7A}" type="presParOf" srcId="{9B209325-BB4D-4F77-B0D0-56AD197C590B}" destId="{96ED1ED7-DE09-49CE-B412-1D410CCF832B}" srcOrd="1" destOrd="0" presId="urn:microsoft.com/office/officeart/2018/2/layout/IconVerticalSolidList"/>
+    <dgm:cxn modelId="{ABE7252E-92E2-49A9-B156-20AE7BFB1EDB}" type="presParOf" srcId="{9B209325-BB4D-4F77-B0D0-56AD197C590B}" destId="{DF1CD725-CB39-44E1-8D3A-EF002383D62F}" srcOrd="2" destOrd="0" presId="urn:microsoft.com/office/officeart/2018/2/layout/IconVerticalSolidList"/>
+    <dgm:cxn modelId="{0E4DC795-DC98-415B-A53E-7A1195B01EF6}" type="presParOf" srcId="{9B209325-BB4D-4F77-B0D0-56AD197C590B}" destId="{BC23B0D7-2952-412C-B226-EBFB60AAFC72}" srcOrd="3" destOrd="0" presId="urn:microsoft.com/office/officeart/2018/2/layout/IconVerticalSolidList"/>
+    <dgm:cxn modelId="{AA4E69D2-E595-41F3-8527-96CA46A8A78F}" type="presParOf" srcId="{97595C2E-6DF0-44BC-B17A-0DC54C3AF23F}" destId="{C9F2D232-BBBE-40AB-93A5-975E9CAF5D31}" srcOrd="3" destOrd="0" presId="urn:microsoft.com/office/officeart/2018/2/layout/IconVerticalSolidList"/>
+    <dgm:cxn modelId="{7977BCED-9FBB-4B41-B8AD-6147614E5D5E}" type="presParOf" srcId="{97595C2E-6DF0-44BC-B17A-0DC54C3AF23F}" destId="{43596B42-A264-40B6-A093-AC55349CE38E}" srcOrd="4" destOrd="0" presId="urn:microsoft.com/office/officeart/2018/2/layout/IconVerticalSolidList"/>
+    <dgm:cxn modelId="{D0BD00EC-D9DD-48C5-8720-ADD16C0EDCB0}" type="presParOf" srcId="{43596B42-A264-40B6-A093-AC55349CE38E}" destId="{E946DF02-E35E-4458-AF4D-AFA14F485369}" srcOrd="0" destOrd="0" presId="urn:microsoft.com/office/officeart/2018/2/layout/IconVerticalSolidList"/>
+    <dgm:cxn modelId="{F8465657-89C5-42E3-956F-B3403B838BF9}" type="presParOf" srcId="{43596B42-A264-40B6-A093-AC55349CE38E}" destId="{C5EF812E-9591-4D03-AA4D-926922BCEB39}" srcOrd="1" destOrd="0" presId="urn:microsoft.com/office/officeart/2018/2/layout/IconVerticalSolidList"/>
+    <dgm:cxn modelId="{422F1F4D-B2B7-420A-91AD-C58226C20AD4}" type="presParOf" srcId="{43596B42-A264-40B6-A093-AC55349CE38E}" destId="{C84D46D0-ABD9-4BB7-9ECD-D88E22CD2265}" srcOrd="2" destOrd="0" presId="urn:microsoft.com/office/officeart/2018/2/layout/IconVerticalSolidList"/>
+    <dgm:cxn modelId="{056B1046-C44D-424F-8CCB-D6E072A745E9}" type="presParOf" srcId="{43596B42-A264-40B6-A093-AC55349CE38E}" destId="{DCF0F954-A0C0-42AD-8E12-74127D33796F}" srcOrd="3" destOrd="0" presId="urn:microsoft.com/office/officeart/2018/2/layout/IconVerticalSolidList"/>
+  </dgm:cxnLst>
+  <dgm:bg/>
+  <dgm:whole/>
+  <dgm:extLst>
+    <a:ext uri="http://schemas.microsoft.com/office/drawing/2008/diagram">
+      <dsp:dataModelExt xmlns:dsp="http://schemas.microsoft.com/office/drawing/2008/diagram" relId="rId7" minVer="http://schemas.openxmlformats.org/drawingml/2006/diagram"/>
+    </a:ext>
+  </dgm:extLst>
+</dgm:dataModel>
+</file>
+
+<file path=ppt/diagrams/drawing1.xml><?xml version="1.0" encoding="utf-8"?>
+<dsp:drawing xmlns:dgm="http://schemas.openxmlformats.org/drawingml/2006/diagram" xmlns:dsp="http://schemas.microsoft.com/office/drawing/2008/diagram" xmlns:a="http://schemas.openxmlformats.org/drawingml/2006/main">
+  <dsp:spTree>
+    <dsp:nvGrpSpPr>
+      <dsp:cNvPr id="0" name=""/>
+      <dsp:cNvGrpSpPr/>
+    </dsp:nvGrpSpPr>
+    <dsp:grpSpPr/>
+    <dsp:sp modelId="{B59DFBF0-797A-468B-9C55-3062028EED9C}">
+      <dsp:nvSpPr>
+        <dsp:cNvPr id="0" name=""/>
+        <dsp:cNvSpPr/>
+      </dsp:nvSpPr>
+      <dsp:spPr>
+        <a:xfrm>
+          <a:off x="0" y="36730"/>
+          <a:ext cx="8841925" cy="1478257"/>
+        </a:xfrm>
+        <a:prstGeom prst="roundRect">
+          <a:avLst>
+            <a:gd name="adj" fmla="val 10000"/>
+          </a:avLst>
+        </a:prstGeom>
+        <a:solidFill>
+          <a:schemeClr val="bg1">
+            <a:lumMod val="95000"/>
+            <a:hueOff val="0"/>
+            <a:satOff val="0"/>
+            <a:lumOff val="0"/>
+            <a:alphaOff val="0"/>
+          </a:schemeClr>
+        </a:solidFill>
+        <a:ln>
+          <a:noFill/>
+        </a:ln>
+        <a:effectLst/>
+      </dsp:spPr>
+      <dsp:style>
+        <a:lnRef idx="0">
+          <a:scrgbClr r="0" g="0" b="0"/>
+        </a:lnRef>
+        <a:fillRef idx="1">
+          <a:scrgbClr r="0" g="0" b="0"/>
+        </a:fillRef>
+        <a:effectRef idx="0">
+          <a:scrgbClr r="0" g="0" b="0"/>
+        </a:effectRef>
+        <a:fontRef idx="minor"/>
+      </dsp:style>
+    </dsp:sp>
+    <dsp:sp modelId="{84CA9DA3-12E2-4D23-861B-E375F349E2A4}">
+      <dsp:nvSpPr>
+        <dsp:cNvPr id="0" name=""/>
+        <dsp:cNvSpPr/>
+      </dsp:nvSpPr>
+      <dsp:spPr>
+        <a:xfrm>
+          <a:off x="447173" y="333239"/>
+          <a:ext cx="813041" cy="813041"/>
+        </a:xfrm>
+        <a:prstGeom prst="rect">
+          <a:avLst/>
+        </a:prstGeom>
+        <a:blipFill>
+          <a:blip xmlns:r="http://schemas.openxmlformats.org/officeDocument/2006/relationships" r:embed="rId1">
+            <a:extLst>
+              <a:ext uri="{28A0092B-C50C-407E-A947-70E740481C1C}">
+                <a14:useLocalDpi xmlns:a14="http://schemas.microsoft.com/office/drawing/2010/main" val="0"/>
+              </a:ext>
+              <a:ext uri="{96DAC541-7B7A-43D3-8B79-37D633B846F1}">
+                <asvg:svgBlip xmlns:asvg="http://schemas.microsoft.com/office/drawing/2016/SVG/main" r:embed="rId2"/>
+              </a:ext>
+            </a:extLst>
+          </a:blip>
+          <a:stretch>
+            <a:fillRect/>
+          </a:stretch>
+        </a:blipFill>
+        <a:ln w="12700" cap="flat" cmpd="sng" algn="ctr">
+          <a:noFill/>
+          <a:prstDash val="solid"/>
+          <a:miter lim="800000"/>
+        </a:ln>
+        <a:effectLst/>
+      </dsp:spPr>
+      <dsp:style>
+        <a:lnRef idx="2">
+          <a:scrgbClr r="0" g="0" b="0"/>
+        </a:lnRef>
+        <a:fillRef idx="1">
+          <a:scrgbClr r="0" g="0" b="0"/>
+        </a:fillRef>
+        <a:effectRef idx="0">
+          <a:scrgbClr r="0" g="0" b="0"/>
+        </a:effectRef>
+        <a:fontRef idx="minor">
+          <a:schemeClr val="lt1"/>
+        </a:fontRef>
+      </dsp:style>
+    </dsp:sp>
+    <dsp:sp modelId="{6C135539-CDAC-47F8-8BE1-319B096B426E}">
+      <dsp:nvSpPr>
+        <dsp:cNvPr id="0" name=""/>
+        <dsp:cNvSpPr/>
+      </dsp:nvSpPr>
+      <dsp:spPr>
+        <a:xfrm>
+          <a:off x="1707387" y="631"/>
+          <a:ext cx="7134537" cy="1478257"/>
+        </a:xfrm>
+        <a:prstGeom prst="rect">
+          <a:avLst/>
+        </a:prstGeom>
+        <a:noFill/>
+        <a:ln>
+          <a:noFill/>
+        </a:ln>
+        <a:effectLst/>
+      </dsp:spPr>
+      <dsp:style>
+        <a:lnRef idx="0">
+          <a:scrgbClr r="0" g="0" b="0"/>
+        </a:lnRef>
+        <a:fillRef idx="0">
+          <a:scrgbClr r="0" g="0" b="0"/>
+        </a:fillRef>
+        <a:effectRef idx="0">
+          <a:scrgbClr r="0" g="0" b="0"/>
+        </a:effectRef>
+        <a:fontRef idx="minor"/>
+      </dsp:style>
+      <dsp:txBody>
+        <a:bodyPr spcFirstLastPara="0" vert="horz" wrap="square" lIns="156449" tIns="156449" rIns="156449" bIns="156449" numCol="1" spcCol="1270" anchor="ctr" anchorCtr="0">
+          <a:noAutofit/>
+        </a:bodyPr>
+        <a:lstStyle/>
+        <a:p>
+          <a:pPr marL="0" lvl="0" indent="0" algn="l" defTabSz="1111250">
+            <a:lnSpc>
+              <a:spcPct val="90000"/>
+            </a:lnSpc>
+            <a:spcBef>
+              <a:spcPct val="0"/>
+            </a:spcBef>
+            <a:spcAft>
+              <a:spcPct val="35000"/>
+            </a:spcAft>
+            <a:buNone/>
+          </a:pPr>
+          <a:r>
+            <a:rPr lang="en-GB" sz="2500" kern="1200" dirty="0"/>
+            <a:t>Your badge serves as your ticket for lunch</a:t>
+          </a:r>
+          <a:endParaRPr lang="en-US" sz="2500" kern="1200" dirty="0"/>
+        </a:p>
+      </dsp:txBody>
+      <dsp:txXfrm>
+        <a:off x="1707387" y="631"/>
+        <a:ext cx="7134537" cy="1478257"/>
+      </dsp:txXfrm>
+    </dsp:sp>
+    <dsp:sp modelId="{A5FF0DC2-E35B-4997-A6C7-C29243436D9F}">
+      <dsp:nvSpPr>
+        <dsp:cNvPr id="0" name=""/>
+        <dsp:cNvSpPr/>
+      </dsp:nvSpPr>
+      <dsp:spPr>
+        <a:xfrm>
+          <a:off x="0" y="1848454"/>
+          <a:ext cx="8841925" cy="1478257"/>
+        </a:xfrm>
+        <a:prstGeom prst="roundRect">
+          <a:avLst>
+            <a:gd name="adj" fmla="val 10000"/>
+          </a:avLst>
+        </a:prstGeom>
+        <a:solidFill>
+          <a:schemeClr val="bg1">
+            <a:lumMod val="95000"/>
+            <a:hueOff val="0"/>
+            <a:satOff val="0"/>
+            <a:lumOff val="0"/>
+            <a:alphaOff val="0"/>
+          </a:schemeClr>
+        </a:solidFill>
+        <a:ln>
+          <a:noFill/>
+        </a:ln>
+        <a:effectLst/>
+      </dsp:spPr>
+      <dsp:style>
+        <a:lnRef idx="0">
+          <a:scrgbClr r="0" g="0" b="0"/>
+        </a:lnRef>
+        <a:fillRef idx="1">
+          <a:scrgbClr r="0" g="0" b="0"/>
+        </a:fillRef>
+        <a:effectRef idx="0">
+          <a:scrgbClr r="0" g="0" b="0"/>
+        </a:effectRef>
+        <a:fontRef idx="minor"/>
+      </dsp:style>
+    </dsp:sp>
+    <dsp:sp modelId="{96ED1ED7-DE09-49CE-B412-1D410CCF832B}">
+      <dsp:nvSpPr>
+        <dsp:cNvPr id="0" name=""/>
+        <dsp:cNvSpPr/>
+      </dsp:nvSpPr>
+      <dsp:spPr>
+        <a:xfrm>
+          <a:off x="447173" y="2181062"/>
+          <a:ext cx="813041" cy="813041"/>
+        </a:xfrm>
+        <a:prstGeom prst="rect">
+          <a:avLst/>
+        </a:prstGeom>
+        <a:blipFill>
+          <a:blip xmlns:r="http://schemas.openxmlformats.org/officeDocument/2006/relationships" r:embed="rId3">
+            <a:extLst>
+              <a:ext uri="{28A0092B-C50C-407E-A947-70E740481C1C}">
+                <a14:useLocalDpi xmlns:a14="http://schemas.microsoft.com/office/drawing/2010/main" val="0"/>
+              </a:ext>
+              <a:ext uri="{96DAC541-7B7A-43D3-8B79-37D633B846F1}">
+                <asvg:svgBlip xmlns:asvg="http://schemas.microsoft.com/office/drawing/2016/SVG/main" r:embed="rId4"/>
+              </a:ext>
+            </a:extLst>
+          </a:blip>
+          <a:stretch>
+            <a:fillRect/>
+          </a:stretch>
+        </a:blipFill>
+        <a:ln w="12700" cap="flat" cmpd="sng" algn="ctr">
+          <a:noFill/>
+          <a:prstDash val="solid"/>
+          <a:miter lim="800000"/>
+        </a:ln>
+        <a:effectLst/>
+      </dsp:spPr>
+      <dsp:style>
+        <a:lnRef idx="2">
+          <a:scrgbClr r="0" g="0" b="0"/>
+        </a:lnRef>
+        <a:fillRef idx="1">
+          <a:scrgbClr r="0" g="0" b="0"/>
+        </a:fillRef>
+        <a:effectRef idx="0">
+          <a:scrgbClr r="0" g="0" b="0"/>
+        </a:effectRef>
+        <a:fontRef idx="minor">
+          <a:schemeClr val="lt1"/>
+        </a:fontRef>
+      </dsp:style>
+    </dsp:sp>
+    <dsp:sp modelId="{BC23B0D7-2952-412C-B226-EBFB60AAFC72}">
+      <dsp:nvSpPr>
+        <dsp:cNvPr id="0" name=""/>
+        <dsp:cNvSpPr/>
+      </dsp:nvSpPr>
+      <dsp:spPr>
+        <a:xfrm>
+          <a:off x="1707387" y="1848454"/>
+          <a:ext cx="7134537" cy="1478257"/>
+        </a:xfrm>
+        <a:prstGeom prst="rect">
+          <a:avLst/>
+        </a:prstGeom>
+        <a:noFill/>
+        <a:ln>
+          <a:noFill/>
+        </a:ln>
+        <a:effectLst/>
+      </dsp:spPr>
+      <dsp:style>
+        <a:lnRef idx="0">
+          <a:scrgbClr r="0" g="0" b="0"/>
+        </a:lnRef>
+        <a:fillRef idx="0">
+          <a:scrgbClr r="0" g="0" b="0"/>
+        </a:fillRef>
+        <a:effectRef idx="0">
+          <a:scrgbClr r="0" g="0" b="0"/>
+        </a:effectRef>
+        <a:fontRef idx="minor"/>
+      </dsp:style>
+      <dsp:txBody>
+        <a:bodyPr spcFirstLastPara="0" vert="horz" wrap="square" lIns="156449" tIns="156449" rIns="156449" bIns="156449" numCol="1" spcCol="1270" anchor="ctr" anchorCtr="0">
+          <a:noAutofit/>
+        </a:bodyPr>
+        <a:lstStyle/>
+        <a:p>
+          <a:pPr marL="0" lvl="0" indent="0" algn="l" defTabSz="1111250">
+            <a:lnSpc>
+              <a:spcPct val="90000"/>
+            </a:lnSpc>
+            <a:spcBef>
+              <a:spcPct val="0"/>
+            </a:spcBef>
+            <a:spcAft>
+              <a:spcPct val="35000"/>
+            </a:spcAft>
+            <a:buNone/>
+          </a:pPr>
+          <a:r>
+            <a:rPr lang="en-GB" sz="2500" kern="1200"/>
+            <a:t>Wi-Fi: Connect to the Eduroam network (password was sent via email)</a:t>
+          </a:r>
+          <a:endParaRPr lang="en-US" sz="2500" kern="1200"/>
+        </a:p>
+      </dsp:txBody>
+      <dsp:txXfrm>
+        <a:off x="1707387" y="1848454"/>
+        <a:ext cx="7134537" cy="1478257"/>
+      </dsp:txXfrm>
+    </dsp:sp>
+    <dsp:sp modelId="{E946DF02-E35E-4458-AF4D-AFA14F485369}">
+      <dsp:nvSpPr>
+        <dsp:cNvPr id="0" name=""/>
+        <dsp:cNvSpPr/>
+      </dsp:nvSpPr>
+      <dsp:spPr>
+        <a:xfrm>
+          <a:off x="0" y="3696276"/>
+          <a:ext cx="8841925" cy="1478257"/>
+        </a:xfrm>
+        <a:prstGeom prst="roundRect">
+          <a:avLst>
+            <a:gd name="adj" fmla="val 10000"/>
+          </a:avLst>
+        </a:prstGeom>
+        <a:solidFill>
+          <a:schemeClr val="bg1">
+            <a:lumMod val="95000"/>
+            <a:hueOff val="0"/>
+            <a:satOff val="0"/>
+            <a:lumOff val="0"/>
+            <a:alphaOff val="0"/>
+          </a:schemeClr>
+        </a:solidFill>
+        <a:ln>
+          <a:noFill/>
+        </a:ln>
+        <a:effectLst/>
+      </dsp:spPr>
+      <dsp:style>
+        <a:lnRef idx="0">
+          <a:scrgbClr r="0" g="0" b="0"/>
+        </a:lnRef>
+        <a:fillRef idx="1">
+          <a:scrgbClr r="0" g="0" b="0"/>
+        </a:fillRef>
+        <a:effectRef idx="0">
+          <a:scrgbClr r="0" g="0" b="0"/>
+        </a:effectRef>
+        <a:fontRef idx="minor"/>
+      </dsp:style>
+    </dsp:sp>
+    <dsp:sp modelId="{C5EF812E-9591-4D03-AA4D-926922BCEB39}">
+      <dsp:nvSpPr>
+        <dsp:cNvPr id="0" name=""/>
+        <dsp:cNvSpPr/>
+      </dsp:nvSpPr>
+      <dsp:spPr>
+        <a:xfrm>
+          <a:off x="447173" y="4028884"/>
+          <a:ext cx="813041" cy="813041"/>
+        </a:xfrm>
+        <a:prstGeom prst="rect">
+          <a:avLst/>
+        </a:prstGeom>
+        <a:blipFill>
+          <a:blip xmlns:r="http://schemas.openxmlformats.org/officeDocument/2006/relationships" r:embed="rId5">
+            <a:extLst>
+              <a:ext uri="{28A0092B-C50C-407E-A947-70E740481C1C}">
+                <a14:useLocalDpi xmlns:a14="http://schemas.microsoft.com/office/drawing/2010/main" val="0"/>
+              </a:ext>
+              <a:ext uri="{96DAC541-7B7A-43D3-8B79-37D633B846F1}">
+                <asvg:svgBlip xmlns:asvg="http://schemas.microsoft.com/office/drawing/2016/SVG/main" r:embed="rId6"/>
+              </a:ext>
+            </a:extLst>
+          </a:blip>
+          <a:stretch>
+            <a:fillRect/>
+          </a:stretch>
+        </a:blipFill>
+        <a:ln w="12700" cap="flat" cmpd="sng" algn="ctr">
+          <a:noFill/>
+          <a:prstDash val="solid"/>
+          <a:miter lim="800000"/>
+        </a:ln>
+        <a:effectLst/>
+      </dsp:spPr>
+      <dsp:style>
+        <a:lnRef idx="2">
+          <a:scrgbClr r="0" g="0" b="0"/>
+        </a:lnRef>
+        <a:fillRef idx="1">
+          <a:scrgbClr r="0" g="0" b="0"/>
+        </a:fillRef>
+        <a:effectRef idx="0">
+          <a:scrgbClr r="0" g="0" b="0"/>
+        </a:effectRef>
+        <a:fontRef idx="minor">
+          <a:schemeClr val="lt1"/>
+        </a:fontRef>
+      </dsp:style>
+    </dsp:sp>
+    <dsp:sp modelId="{DCF0F954-A0C0-42AD-8E12-74127D33796F}">
+      <dsp:nvSpPr>
+        <dsp:cNvPr id="0" name=""/>
+        <dsp:cNvSpPr/>
+      </dsp:nvSpPr>
+      <dsp:spPr>
+        <a:xfrm>
+          <a:off x="1707387" y="3696276"/>
+          <a:ext cx="7134537" cy="1478257"/>
+        </a:xfrm>
+        <a:prstGeom prst="rect">
+          <a:avLst/>
+        </a:prstGeom>
+        <a:noFill/>
+        <a:ln>
+          <a:noFill/>
+        </a:ln>
+        <a:effectLst/>
+      </dsp:spPr>
+      <dsp:style>
+        <a:lnRef idx="0">
+          <a:scrgbClr r="0" g="0" b="0"/>
+        </a:lnRef>
+        <a:fillRef idx="0">
+          <a:scrgbClr r="0" g="0" b="0"/>
+        </a:fillRef>
+        <a:effectRef idx="0">
+          <a:scrgbClr r="0" g="0" b="0"/>
+        </a:effectRef>
+        <a:fontRef idx="minor"/>
+      </dsp:style>
+      <dsp:txBody>
+        <a:bodyPr spcFirstLastPara="0" vert="horz" wrap="square" lIns="156449" tIns="156449" rIns="156449" bIns="156449" numCol="1" spcCol="1270" anchor="ctr" anchorCtr="0">
+          <a:noAutofit/>
+        </a:bodyPr>
+        <a:lstStyle/>
+        <a:p>
+          <a:pPr marL="0" lvl="0" indent="0" algn="l" defTabSz="1111250">
+            <a:lnSpc>
+              <a:spcPct val="90000"/>
+            </a:lnSpc>
+            <a:spcBef>
+              <a:spcPct val="0"/>
+            </a:spcBef>
+            <a:spcAft>
+              <a:spcPct val="35000"/>
+            </a:spcAft>
+            <a:buNone/>
+          </a:pPr>
+          <a:r>
+            <a:rPr lang="en-GB" sz="2500" kern="1200" dirty="0"/>
+            <a:t>Please note, a photographer </a:t>
+          </a:r>
+          <a:r>
+            <a:rPr lang="en-GB" sz="2500" i="1" kern="1200" dirty="0"/>
+            <a:t>might</a:t>
+          </a:r>
+          <a:r>
+            <a:rPr lang="en-GB" sz="2500" kern="1200" dirty="0"/>
+            <a:t> be present</a:t>
+          </a:r>
+          <a:endParaRPr lang="en-US" sz="2500" kern="1200" dirty="0"/>
+        </a:p>
+      </dsp:txBody>
+      <dsp:txXfrm>
+        <a:off x="1707387" y="3696276"/>
+        <a:ext cx="7134537" cy="1478257"/>
+      </dsp:txXfrm>
+    </dsp:sp>
+  </dsp:spTree>
+</dsp:drawing>
+</file>
+
+<file path=ppt/diagrams/layout1.xml><?xml version="1.0" encoding="utf-8"?>
+<dgm:layoutDef xmlns:dgm="http://schemas.openxmlformats.org/drawingml/2006/diagram" xmlns:a="http://schemas.openxmlformats.org/drawingml/2006/main" uniqueId="urn:microsoft.com/office/officeart/2018/2/layout/IconVerticalSolidList">
+  <dgm:title val="Icon Vertical Solid List"/>
+  <dgm:desc val="Use to show a series of visuals from top to bottom with Level 1 or Level 1 and Level 2 text grouped in a shape. Works best with icons or small pictures with lengthier descriptions."/>
+  <dgm:catLst>
+    <dgm:cat type="icon" pri="500"/>
+  </dgm:catLst>
+  <dgm:sampData useDef="1">
+    <dgm:dataModel>
+      <dgm:ptLst/>
+      <dgm:bg/>
+      <dgm:whole/>
+    </dgm:dataModel>
+  </dgm:sampData>
+  <dgm:styleData useDef="1">
+    <dgm:dataModel>
+      <dgm:ptLst/>
+      <dgm:bg/>
+      <dgm:whole/>
+    </dgm:dataModel>
+  </dgm:styleData>
+  <dgm:clrData useDef="1">
+    <dgm:dataModel>
+      <dgm:ptLst/>
+      <dgm:bg/>
+      <dgm:whole/>
+    </dgm:dataModel>
+  </dgm:clrData>
+  <dgm:layoutNode name="root">
+    <dgm:varLst>
+      <dgm:dir/>
+      <dgm:resizeHandles val="exact"/>
+    </dgm:varLst>
+    <dgm:choose name="Name0">
+      <dgm:if name="Name1" axis="self" func="var" arg="dir" op="equ" val="norm">
+        <dgm:alg type="lin">
+          <dgm:param type="linDir" val="fromT"/>
+          <dgm:param type="nodeHorzAlign" val="l"/>
+        </dgm:alg>
+      </dgm:if>
+      <dgm:else name="Name2">
+        <dgm:alg type="lin">
+          <dgm:param type="linDir" val="fromT"/>
+          <dgm:param type="nodeHorzAlign" val="r"/>
+        </dgm:alg>
+      </dgm:else>
+    </dgm:choose>
+    <dgm:shape xmlns:r="http://schemas.openxmlformats.org/officeDocument/2006/relationships" r:blip="">
+      <dgm:adjLst/>
+    </dgm:shape>
+    <dgm:presOf/>
+    <dgm:choose name="Name3">
+      <dgm:if name="Name4" axis="ch" ptType="node" func="cnt" op="lte" val="3">
+        <dgm:constrLst>
+          <dgm:constr type="h" for="ch" forName="compNode" refType="h" fact="0.3"/>
+          <dgm:constr type="w" for="ch" forName="compNode" refType="w"/>
+          <dgm:constr type="h" for="ch" forName="sibTrans" refType="h" refFor="ch" refForName="compNode" fact="0.25"/>
+          <dgm:constr type="primFontSz" for="des" forName="parTx" val="25"/>
+          <dgm:constr type="primFontSz" for="des" forName="desTx" refType="primFontSz" refFor="des" refForName="parTx" op="lte" fact="0.75"/>
+          <dgm:constr type="h" for="des" forName="compNode" op="equ"/>
+          <dgm:constr type="h" for="des" forName="bgRect" op="equ"/>
+          <dgm:constr type="h" for="des" forName="iconRect" op="equ"/>
+          <dgm:constr type="w" for="des" forName="iconRect" op="equ"/>
+          <dgm:constr type="h" for="des" forName="spaceRect" op="equ"/>
+          <dgm:constr type="h" for="des" forName="parTx" op="equ"/>
+          <dgm:constr type="h" for="des" forName="desTx" op="equ"/>
+        </dgm:constrLst>
+      </dgm:if>
+      <dgm:if name="Name5" axis="ch" ptType="node" func="cnt" op="lte" val="4">
+        <dgm:constrLst>
+          <dgm:constr type="h" for="ch" forName="compNode" refType="h" fact="0.3"/>
+          <dgm:constr type="w" for="ch" forName="compNode" refType="w"/>
+          <dgm:constr type="h" for="ch" forName="sibTrans" refType="h" refFor="ch" refForName="compNode" fact="0.25"/>
+          <dgm:constr type="primFontSz" for="des" forName="parTx" val="22"/>
+          <dgm:constr type="primFontSz" for="des" forName="desTx" refType="primFontSz" refFor="des" refForName="parTx" op="lte" fact="0.75"/>
+          <dgm:constr type="h" for="des" forName="compNode" op="equ"/>
+          <dgm:constr type="h" for="des" forName="bgRect" op="equ"/>
+          <dgm:constr type="h" for="des" forName="iconRect" op="equ"/>
+          <dgm:constr type="w" for="des" forName="iconRect" op="equ"/>
+          <dgm:constr type="h" for="des" forName="spaceRect" op="equ"/>
+          <dgm:constr type="h" for="des" forName="parTx" op="equ"/>
+          <dgm:constr type="h" for="des" forName="desTx" op="equ"/>
+        </dgm:constrLst>
+      </dgm:if>
+      <dgm:if name="Name6" axis="ch" ptType="node" func="cnt" op="lte" val="6">
+        <dgm:constrLst>
+          <dgm:constr type="h" for="ch" forName="compNode" refType="h" fact="0.3"/>
+          <dgm:constr type="w" for="ch" forName="compNode" refType="w"/>
+          <dgm:constr type="h" for="ch" forName="sibTrans" refType="h" refFor="ch" refForName="compNode" fact="0.25"/>
+          <dgm:constr type="primFontSz" for="des" forName="parTx" val="19"/>
+          <dgm:constr type="primFontSz" for="des" forName="desTx" refType="primFontSz" refFor="des" refForName="parTx" op="lte" fact="0.75"/>
+          <dgm:constr type="h" for="des" forName="compNode" op="equ"/>
+          <dgm:constr type="h" for="des" forName="bgRect" op="equ"/>
+          <dgm:constr type="h" for="des" forName="iconRect" op="equ"/>
+          <dgm:constr type="w" for="des" forName="iconRect" op="equ"/>
+          <dgm:constr type="h" for="des" forName="spaceRect" op="equ"/>
+          <dgm:constr type="h" for="des" forName="parTx" op="equ"/>
+          <dgm:constr type="h" for="des" forName="desTx" op="equ"/>
+        </dgm:constrLst>
+      </dgm:if>
+      <dgm:else name="Name7">
+        <dgm:constrLst>
+          <dgm:constr type="h" for="ch" forName="compNode" refType="h" fact="0.3"/>
+          <dgm:constr type="w" for="ch" forName="compNode" refType="w"/>
+          <dgm:constr type="h" for="ch" forName="sibTrans" refType="h" refFor="ch" refForName="compNode" fact="0.25"/>
+          <dgm:constr type="primFontSz" for="des" forName="parTx" val="16"/>
+          <dgm:constr type="primFontSz" for="des" forName="desTx" refType="primFontSz" refFor="des" refForName="parTx" op="lte" fact="0.75"/>
+          <dgm:constr type="h" for="des" forName="compNode" op="equ"/>
+          <dgm:constr type="h" for="des" forName="bgRect" op="equ"/>
+          <dgm:constr type="h" for="des" forName="iconRect" op="equ"/>
+          <dgm:constr type="w" for="des" forName="iconRect" op="equ"/>
+          <dgm:constr type="h" for="des" forName="spaceRect" op="equ"/>
+          <dgm:constr type="h" for="des" forName="parTx" op="equ"/>
+          <dgm:constr type="h" for="des" forName="desTx" op="equ"/>
+        </dgm:constrLst>
+      </dgm:else>
+    </dgm:choose>
+    <dgm:ruleLst>
+      <dgm:rule type="h" for="ch" forName="compNode" val="0" fact="NaN" max="NaN"/>
+    </dgm:ruleLst>
+    <dgm:forEach name="Name8" axis="ch" ptType="node">
+      <dgm:layoutNode name="compNode">
+        <dgm:alg type="composite"/>
+        <dgm:shape xmlns:r="http://schemas.openxmlformats.org/officeDocument/2006/relationships" r:blip="">
+          <dgm:adjLst/>
+        </dgm:shape>
+        <dgm:presOf axis="self"/>
+        <dgm:choose name="Name9">
+          <dgm:if name="Name10" axis="ch" ptType="node" func="cnt" op="gte" val="1">
+            <dgm:constrLst>
+              <dgm:constr type="w" for="ch" forName="bgRect" refType="w"/>
+              <dgm:constr type="h" for="ch" forName="bgRect" refType="h"/>
+              <dgm:constr type="l" for="ch" forName="bgRect"/>
+              <dgm:constr type="t" for="ch" forName="bgRect"/>
+              <dgm:constr type="h" for="ch" forName="iconRect" refType="h" fact="0.55"/>
+              <dgm:constr type="w" for="ch" forName="iconRect" refType="h" refFor="ch" refForName="iconRect"/>
+              <dgm:constr type="l" for="ch" forName="iconRect" refType="h" refFor="ch" refForName="iconRect" fact="0.55"/>
+              <dgm:constr type="ctrY" for="ch" forName="iconRect" refType="ctrY" refFor="ch" refForName="bgRect"/>
+              <dgm:constr type="w" for="ch" forName="spaceRect" refType="l" refFor="ch" refForName="iconRect"/>
+              <dgm:constr type="h" for="ch" forName="spaceRect" refType="h"/>
+              <dgm:constr type="l" for="ch" forName="spaceRect" refType="r" refFor="ch" refForName="iconRect"/>
+              <dgm:constr type="t" for="ch" forName="spaceRect"/>
+              <dgm:constr type="w" for="ch" forName="parTx" refType="w" fact="0.45"/>
+              <dgm:constr type="h" for="ch" forName="parTx" refType="h"/>
+              <dgm:constr type="l" for="ch" forName="parTx" refType="r" refFor="ch" refForName="spaceRect"/>
+              <dgm:constr type="t" for="ch" forName="parTx"/>
+              <dgm:constr type="h" for="ch" forName="desTx" refType="h"/>
+              <dgm:constr type="l" for="ch" forName="desTx" refType="r" refFor="ch" refForName="parTx"/>
+              <dgm:constr type="t" for="ch" forName="desTx"/>
+            </dgm:constrLst>
+          </dgm:if>
+          <dgm:else name="Name11">
+            <dgm:constrLst>
+              <dgm:constr type="w" for="ch" forName="bgRect" refType="w"/>
+              <dgm:constr type="h" for="ch" forName="bgRect" refType="h"/>
+              <dgm:constr type="l" for="ch" forName="bgRect"/>
+              <dgm:constr type="t" for="ch" forName="bgRect"/>
+              <dgm:constr type="h" for="ch" forName="iconRect" refType="h" fact="0.55"/>
+              <dgm:constr type="w" for="ch" forName="iconRect" refType="h" refFor="ch" refForName="iconRect"/>
+              <dgm:constr type="l" for="ch" forName="iconRect" refType="h" refFor="ch" refForName="iconRect" fact="0.55"/>
+              <dgm:constr type="ctrY" for="ch" forName="iconRect" refType="ctrY" refFor="ch" refForName="bgRect"/>
+              <dgm:constr type="w" for="ch" forName="spaceRect" refType="l" refFor="ch" refForName="iconRect"/>
+              <dgm:constr type="h" for="ch" forName="spaceRect" refType="h"/>
+              <dgm:constr type="l" for="ch" forName="spaceRect" refType="r" refFor="ch" refForName="iconRect"/>
+              <dgm:constr type="t" for="ch" forName="spaceRect"/>
+              <dgm:constr type="h" for="ch" forName="parTx" refType="h"/>
+              <dgm:constr type="l" for="ch" forName="parTx" refType="r" refFor="ch" refForName="spaceRect"/>
+              <dgm:constr type="t" for="ch" forName="parTx"/>
+            </dgm:constrLst>
+          </dgm:else>
+        </dgm:choose>
+        <dgm:ruleLst>
+          <dgm:rule type="h" val="INF" fact="NaN" max="NaN"/>
+        </dgm:ruleLst>
+        <dgm:layoutNode name="bgRect" styleLbl="bgShp">
+          <dgm:alg type="sp"/>
+          <dgm:shape xmlns:r="http://schemas.openxmlformats.org/officeDocument/2006/relationships" type="roundRect" r:blip="">
+            <dgm:adjLst>
+              <dgm:adj idx="1" val="0.1"/>
+            </dgm:adjLst>
+          </dgm:shape>
+          <dgm:presOf/>
+          <dgm:constrLst/>
+          <dgm:ruleLst/>
+        </dgm:layoutNode>
+        <dgm:layoutNode name="iconRect" styleLbl="node1">
+          <dgm:alg type="sp"/>
+          <dgm:shape xmlns:r="http://schemas.openxmlformats.org/officeDocument/2006/relationships" type="rect" r:blip="" blipPhldr="1">
+            <dgm:adjLst/>
+          </dgm:shape>
+          <dgm:presOf/>
+          <dgm:constrLst/>
+          <dgm:ruleLst/>
+        </dgm:layoutNode>
+        <dgm:layoutNode name="spaceRect">
+          <dgm:alg type="sp"/>
+          <dgm:shape xmlns:r="http://schemas.openxmlformats.org/officeDocument/2006/relationships" r:blip="">
+            <dgm:adjLst/>
+          </dgm:shape>
+          <dgm:presOf/>
+          <dgm:constrLst/>
+          <dgm:ruleLst/>
+        </dgm:layoutNode>
+        <dgm:layoutNode name="parTx" styleLbl="revTx">
+          <dgm:varLst>
+            <dgm:chMax val="0"/>
+            <dgm:chPref val="0"/>
+          </dgm:varLst>
+          <dgm:alg type="tx">
+            <dgm:param type="txAnchorVert" val="mid"/>
+            <dgm:param type="parTxLTRAlign" val="l"/>
+            <dgm:param type="shpTxLTRAlignCh" val="l"/>
+            <dgm:param type="parTxRTLAlign" val="r"/>
+            <dgm:param type="shpTxRTLAlignCh" val="r"/>
+          </dgm:alg>
+          <dgm:shape xmlns:r="http://schemas.openxmlformats.org/officeDocument/2006/relationships" type="rect" r:blip="">
+            <dgm:adjLst/>
+          </dgm:shape>
+          <dgm:presOf axis="self" ptType="node"/>
+          <dgm:constrLst>
+            <dgm:constr type="lMarg" refType="h" fact="0.3"/>
+            <dgm:constr type="rMarg" refType="h" fact="0.3"/>
+            <dgm:constr type="tMarg" refType="h" fact="0.3"/>
+            <dgm:constr type="bMarg" refType="h" fact="0.3"/>
+          </dgm:constrLst>
+          <dgm:ruleLst>
+            <dgm:rule type="primFontSz" val="14" fact="NaN" max="NaN"/>
+            <dgm:rule type="h" val="INF" fact="NaN" max="NaN"/>
+          </dgm:ruleLst>
+        </dgm:layoutNode>
+        <dgm:choose name="Name12">
+          <dgm:if name="Name13" axis="ch" ptType="node" func="cnt" op="gte" val="1">
+            <dgm:layoutNode name="desTx" styleLbl="revTx">
+              <dgm:varLst/>
+              <dgm:alg type="tx">
+                <dgm:param type="txAnchorVertCh" val="mid"/>
+                <dgm:param type="parTxLTRAlign" val="l"/>
+                <dgm:param type="shpTxLTRAlignCh" val="l"/>
+                <dgm:param type="parTxRTLAlign" val="r"/>
+                <dgm:param type="shpTxRTLAlignCh" val="r"/>
+                <dgm:param type="stBulletLvl" val="0"/>
+              </dgm:alg>
+              <dgm:shape xmlns:r="http://schemas.openxmlformats.org/officeDocument/2006/relationships" type="rect" r:blip="">
+                <dgm:adjLst/>
+              </dgm:shape>
+              <dgm:presOf axis="des" ptType="node"/>
+              <dgm:constrLst>
+                <dgm:constr type="primFontSz" val="18"/>
+                <dgm:constr type="secFontSz" refType="primFontSz"/>
+                <dgm:constr type="lMarg" refType="h" fact="0.3"/>
+                <dgm:constr type="rMarg" refType="h" fact="0.3"/>
+                <dgm:constr type="tMarg" refType="h" fact="0.3"/>
+                <dgm:constr type="bMarg" refType="h" fact="0.3"/>
+              </dgm:constrLst>
+              <dgm:ruleLst>
+                <dgm:rule type="primFontSz" val="11" fact="NaN" max="NaN"/>
+              </dgm:ruleLst>
+            </dgm:layoutNode>
+          </dgm:if>
+          <dgm:else name="Name14"/>
+        </dgm:choose>
+      </dgm:layoutNode>
+      <dgm:forEach name="Name15" axis="followSib" ptType="sibTrans" cnt="1">
+        <dgm:layoutNode name="sibTrans">
+          <dgm:alg type="sp"/>
+          <dgm:shape xmlns:r="http://schemas.openxmlformats.org/officeDocument/2006/relationships" r:blip="">
+            <dgm:adjLst/>
+          </dgm:shape>
+          <dgm:presOf axis="self"/>
+          <dgm:constrLst/>
+          <dgm:ruleLst/>
+        </dgm:layoutNode>
+      </dgm:forEach>
+    </dgm:forEach>
+  </dgm:layoutNode>
+  <dgm:extLst>
+    <a:ext uri="{68A01E43-0DF5-4B5B-8FA6-DAF915123BFB}">
+      <dgm1612:lstStyle xmlns:dgm1612="http://schemas.microsoft.com/office/drawing/2016/12/diagram">
+        <a:lvl1pPr>
+          <a:lnSpc>
+            <a:spcPct val="100000"/>
+          </a:lnSpc>
+        </a:lvl1pPr>
+        <a:lvl2pPr>
+          <a:lnSpc>
+            <a:spcPct val="100000"/>
+          </a:lnSpc>
+        </a:lvl2pPr>
+      </dgm1612:lstStyle>
+    </a:ext>
+  </dgm:extLst>
+</dgm:layoutDef>
+</file>
+
+<file path=ppt/diagrams/quickStyle1.xml><?xml version="1.0" encoding="utf-8"?>
+<dgm:styleDef xmlns:dgm="http://schemas.openxmlformats.org/drawingml/2006/diagram" xmlns:a="http://schemas.openxmlformats.org/drawingml/2006/main" uniqueId="urn:microsoft.com/office/officeart/2005/8/quickstyle/simple1">
+  <dgm:title val=""/>
+  <dgm:desc val=""/>
+  <dgm:catLst>
+    <dgm:cat type="simple" pri="10100"/>
+  </dgm:catLst>
+  <dgm:scene3d>
+    <a:camera prst="orthographicFront"/>
+    <a:lightRig rig="threePt" dir="t"/>
+  </dgm:scene3d>
+  <dgm:styleLbl name="node0">
+    <dgm:scene3d>
+      <a:camera prst="orthographicFront"/>
+      <a:lightRig rig="threePt" dir="t"/>
+    </dgm:scene3d>
+    <dgm:sp3d/>
+    <dgm:txPr/>
+    <dgm:style>
+      <a:lnRef idx="2">
+        <a:scrgbClr r="0" g="0" b="0"/>
+      </a:lnRef>
+      <a:fillRef idx="1">
+        <a:scrgbClr r="0" g="0" b="0"/>
+      </a:fillRef>
+      <a:effectRef idx="0">
+        <a:scrgbClr r="0" g="0" b="0"/>
+      </a:effectRef>
+      <a:fontRef idx="minor">
+        <a:schemeClr val="lt1"/>
+      </a:fontRef>
+    </dgm:style>
+  </dgm:styleLbl>
+  <dgm:styleLbl name="lnNode1">
+    <dgm:scene3d>
+      <a:camera prst="orthographicFront"/>
+      <a:lightRig rig="threePt" dir="t"/>
+    </dgm:scene3d>
+    <dgm:sp3d/>
+    <dgm:txPr/>
+    <dgm:style>
+      <a:lnRef idx="2">
+        <a:scrgbClr r="0" g="0" b="0"/>
+      </a:lnRef>
+      <a:fillRef idx="1">
+        <a:scrgbClr r="0" g="0" b="0"/>
+      </a:fillRef>
+      <a:effectRef idx="0">
+        <a:scrgbClr r="0" g="0" b="0"/>
+      </a:effectRef>
+      <a:fontRef idx="minor">
+        <a:schemeClr val="lt1"/>
+      </a:fontRef>
+    </dgm:style>
+  </dgm:styleLbl>
+  <dgm:styleLbl name="vennNode1">
+    <dgm:scene3d>
+      <a:camera prst="orthographicFront"/>
+      <a:lightRig rig="threePt" dir="t"/>
+    </dgm:scene3d>
+    <dgm:sp3d/>
+    <dgm:txPr/>
+    <dgm:style>
+      <a:lnRef idx="2">
+        <a:scrgbClr r="0" g="0" b="0"/>
+      </a:lnRef>
+      <a:fillRef idx="1">
+        <a:scrgbClr r="0" g="0" b="0"/>
+      </a:fillRef>
+      <a:effectRef idx="0">
+        <a:scrgbClr r="0" g="0" b="0"/>
+      </a:effectRef>
+      <a:fontRef idx="minor">
+        <a:schemeClr val="tx1"/>
+      </a:fontRef>
+    </dgm:style>
+  </dgm:styleLbl>
+  <dgm:styleLbl name="alignNode1">
+    <dgm:scene3d>
+      <a:camera prst="orthographicFront"/>
+      <a:lightRig rig="threePt" dir="t"/>
+    </dgm:scene3d>
+    <dgm:sp3d/>
+    <dgm:txPr/>
+    <dgm:style>
+      <a:lnRef idx="2">
+        <a:scrgbClr r="0" g="0" b="0"/>
+      </a:lnRef>
+      <a:fillRef idx="1">
+        <a:scrgbClr r="0" g="0" b="0"/>
+      </a:fillRef>
+      <a:effectRef idx="0">
+        <a:scrgbClr r="0" g="0" b="0"/>
+      </a:effectRef>
+      <a:fontRef idx="minor">
+        <a:schemeClr val="lt1"/>
+      </a:fontRef>
+    </dgm:style>
+  </dgm:styleLbl>
+  <dgm:styleLbl name="node1">
+    <dgm:scene3d>
+      <a:camera prst="orthographicFront"/>
+      <a:lightRig rig="threePt" dir="t"/>
+    </dgm:scene3d>
+    <dgm:sp3d/>
+    <dgm:txPr/>
+    <dgm:style>
+      <a:lnRef idx="2">
+        <a:scrgbClr r="0" g="0" b="0"/>
+      </a:lnRef>
+      <a:fillRef idx="1">
+        <a:scrgbClr r="0" g="0" b="0"/>
+      </a:fillRef>
+      <a:effectRef idx="0">
+        <a:scrgbClr r="0" g="0" b="0"/>
+      </a:effectRef>
+      <a:fontRef idx="minor">
+        <a:schemeClr val="lt1"/>
+      </a:fontRef>
+    </dgm:style>
+  </dgm:styleLbl>
+  <dgm:styleLbl name="node2">
+    <dgm:scene3d>
+      <a:camera prst="orthographicFront"/>
+      <a:lightRig rig="threePt" dir="t"/>
+    </dgm:scene3d>
+    <dgm:sp3d/>
+    <dgm:txPr/>
+    <dgm:style>
+      <a:lnRef idx="2">
+        <a:scrgbClr r="0" g="0" b="0"/>
+      </a:lnRef>
+      <a:fillRef idx="1">
+        <a:scrgbClr r="0" g="0" b="0"/>
+      </a:fillRef>
+      <a:effectRef idx="0">
+        <a:scrgbClr r="0" g="0" b="0"/>
+      </a:effectRef>
+      <a:fontRef idx="minor">
+        <a:schemeClr val="lt1"/>
+      </a:fontRef>
+    </dgm:style>
+  </dgm:styleLbl>
+  <dgm:styleLbl name="node3">
+    <dgm:scene3d>
+      <a:camera prst="orthographicFront"/>
+      <a:lightRig rig="threePt" dir="t"/>
+    </dgm:scene3d>
+    <dgm:sp3d/>
+    <dgm:txPr/>
+    <dgm:style>
+      <a:lnRef idx="2">
+        <a:scrgbClr r="0" g="0" b="0"/>
+      </a:lnRef>
+      <a:fillRef idx="1">
+        <a:scrgbClr r="0" g="0" b="0"/>
+      </a:fillRef>
+      <a:effectRef idx="0">
+        <a:scrgbClr r="0" g="0" b="0"/>
+      </a:effectRef>
+      <a:fontRef idx="minor">
+        <a:schemeClr val="lt1"/>
+      </a:fontRef>
+    </dgm:style>
+  </dgm:styleLbl>
+  <dgm:styleLbl name="node4">
+    <dgm:scene3d>
+      <a:camera prst="orthographicFront"/>
+      <a:lightRig rig="threePt" dir="t"/>
+    </dgm:scene3d>
+    <dgm:sp3d/>
+    <dgm:txPr/>
+    <dgm:style>
+      <a:lnRef idx="2">
+        <a:scrgbClr r="0" g="0" b="0"/>
+      </a:lnRef>
+      <a:fillRef idx="1">
+        <a:scrgbClr r="0" g="0" b="0"/>
+      </a:fillRef>
+      <a:effectRef idx="0">
+        <a:scrgbClr r="0" g="0" b="0"/>
+      </a:effectRef>
+      <a:fontRef idx="minor">
+        <a:schemeClr val="lt1"/>
+      </a:fontRef>
+    </dgm:style>
+  </dgm:styleLbl>
+  <dgm:styleLbl name="fgImgPlace1">
+    <dgm:scene3d>
+      <a:camera prst="orthographicFront"/>
+      <a:lightRig rig="threePt" dir="t"/>
+    </dgm:scene3d>
+    <dgm:sp3d/>
+    <dgm:txPr/>
+    <dgm:style>
+      <a:lnRef idx="2">
+        <a:scrgbClr r="0" g="0" b="0"/>
+      </a:lnRef>
+      <a:fillRef idx="1">
+        <a:scrgbClr r="0" g="0" b="0"/>
+      </a:fillRef>
+      <a:effectRef idx="0">
+        <a:scrgbClr r="0" g="0" b="0"/>
+      </a:effectRef>
+      <a:fontRef idx="minor"/>
+    </dgm:style>
+  </dgm:styleLbl>
+  <dgm:styleLbl name="alignImgPlace1">
+    <dgm:scene3d>
+      <a:camera prst="orthographicFront"/>
+      <a:lightRig rig="threePt" dir="t"/>
+    </dgm:scene3d>
+    <dgm:sp3d/>
+    <dgm:txPr/>
+    <dgm:style>
+      <a:lnRef idx="2">
+        <a:scrgbClr r="0" g="0" b="0"/>
+      </a:lnRef>
+      <a:fillRef idx="1">
+        <a:scrgbClr r="0" g="0" b="0"/>
+      </a:fillRef>
+      <a:effectRef idx="0">
+        <a:scrgbClr r="0" g="0" b="0"/>
+      </a:effectRef>
+      <a:fontRef idx="minor"/>
+    </dgm:style>
+  </dgm:styleLbl>
+  <dgm:styleLbl name="bgImgPlace1">
+    <dgm:scene3d>
+      <a:camera prst="orthographicFront"/>
+      <a:lightRig rig="threePt" dir="t"/>
+    </dgm:scene3d>
+    <dgm:sp3d/>
+    <dgm:txPr/>
+    <dgm:style>
+      <a:lnRef idx="2">
+        <a:scrgbClr r="0" g="0" b="0"/>
+      </a:lnRef>
+      <a:fillRef idx="1">
+        <a:scrgbClr r="0" g="0" b="0"/>
+      </a:fillRef>
+      <a:effectRef idx="0">
+        <a:scrgbClr r="0" g="0" b="0"/>
+      </a:effectRef>
+      <a:fontRef idx="minor"/>
+    </dgm:style>
+  </dgm:styleLbl>
+  <dgm:styleLbl name="sibTrans2D1">
+    <dgm:scene3d>
+      <a:camera prst="orthographicFront"/>
+      <a:lightRig rig="threePt" dir="t"/>
+    </dgm:scene3d>
+    <dgm:sp3d/>
+    <dgm:txPr/>
+    <dgm:style>
+      <a:lnRef idx="0">
+        <a:scrgbClr r="0" g="0" b="0"/>
+      </a:lnRef>
+      <a:fillRef idx="1">
+        <a:scrgbClr r="0" g="0" b="0"/>
+      </a:fillRef>
+      <a:effectRef idx="0">
+        <a:scrgbClr r="0" g="0" b="0"/>
+      </a:effectRef>
+      <a:fontRef idx="minor">
+        <a:schemeClr val="lt1"/>
+      </a:fontRef>
+    </dgm:style>
+  </dgm:styleLbl>
+  <dgm:styleLbl name="fgSibTrans2D1">
+    <dgm:scene3d>
+      <a:camera prst="orthographicFront"/>
+      <a:lightRig rig="threePt" dir="t"/>
+    </dgm:scene3d>
+    <dgm:sp3d/>
+    <dgm:txPr/>
+    <dgm:style>
+      <a:lnRef idx="0">
+        <a:scrgbClr r="0" g="0" b="0"/>
+      </a:lnRef>
+      <a:fillRef idx="1">
+        <a:scrgbClr r="0" g="0" b="0"/>
+      </a:fillRef>
+      <a:effectRef idx="0">
+        <a:scrgbClr r="0" g="0" b="0"/>
+      </a:effectRef>
+      <a:fontRef idx="minor">
+        <a:schemeClr val="lt1"/>
+      </a:fontRef>
+    </dgm:style>
+  </dgm:styleLbl>
+  <dgm:styleLbl name="bgSibTrans2D1">
+    <dgm:scene3d>
+      <a:camera prst="orthographicFront"/>
+      <a:lightRig rig="threePt" dir="t"/>
+    </dgm:scene3d>
+    <dgm:sp3d/>
+    <dgm:txPr/>
+    <dgm:style>
+      <a:lnRef idx="0">
+        <a:scrgbClr r="0" g="0" b="0"/>
+      </a:lnRef>
+      <a:fillRef idx="1">
+        <a:scrgbClr r="0" g="0" b="0"/>
+      </a:fillRef>
+      <a:effectRef idx="0">
+        <a:scrgbClr r="0" g="0" b="0"/>
+      </a:effectRef>
+      <a:fontRef idx="minor">
+        <a:schemeClr val="lt1"/>
+      </a:fontRef>
+    </dgm:style>
+  </dgm:styleLbl>
+  <dgm:styleLbl name="sibTrans1D1">
+    <dgm:scene3d>
+      <a:camera prst="orthographicFront"/>
+      <a:lightRig rig="threePt" dir="t"/>
+    </dgm:scene3d>
+    <dgm:sp3d/>
+    <dgm:txPr/>
+    <dgm:style>
+      <a:lnRef idx="1">
+        <a:scrgbClr r="0" g="0" b="0"/>
+      </a:lnRef>
+      <a:fillRef idx="0">
+        <a:scrgbClr r="0" g="0" b="0"/>
+      </a:fillRef>
+      <a:effectRef idx="0">
+        <a:scrgbClr r="0" g="0" b="0"/>
+      </a:effectRef>
+      <a:fontRef idx="minor"/>
+    </dgm:style>
+  </dgm:styleLbl>
+  <dgm:styleLbl name="callout">
+    <dgm:scene3d>
+      <a:camera prst="orthographicFront"/>
+      <a:lightRig rig="threePt" dir="t"/>
+    </dgm:scene3d>
+    <dgm:sp3d/>
+    <dgm:txPr/>
+    <dgm:style>
+      <a:lnRef idx="2">
+        <a:scrgbClr r="0" g="0" b="0"/>
+      </a:lnRef>
+      <a:fillRef idx="1">
+        <a:scrgbClr r="0" g="0" b="0"/>
+      </a:fillRef>
+      <a:effectRef idx="0">
+        <a:scrgbClr r="0" g="0" b="0"/>
+      </a:effectRef>
+      <a:fontRef idx="minor"/>
+    </dgm:style>
+  </dgm:styleLbl>
+  <dgm:styleLbl name="asst0">
+    <dgm:scene3d>
+      <a:camera prst="orthographicFront"/>
+      <a:lightRig rig="threePt" dir="t"/>
+    </dgm:scene3d>
+    <dgm:sp3d/>
+    <dgm:txPr/>
+    <dgm:style>
+      <a:lnRef idx="2">
+        <a:scrgbClr r="0" g="0" b="0"/>
+      </a:lnRef>
+      <a:fillRef idx="1">
+        <a:scrgbClr r="0" g="0" b="0"/>
+      </a:fillRef>
+      <a:effectRef idx="0">
+        <a:scrgbClr r="0" g="0" b="0"/>
+      </a:effectRef>
+      <a:fontRef idx="minor">
+        <a:schemeClr val="lt1"/>
+      </a:fontRef>
+    </dgm:style>
+  </dgm:styleLbl>
+  <dgm:styleLbl name="asst1">
+    <dgm:scene3d>
+      <a:camera prst="orthographicFront"/>
+      <a:lightRig rig="threePt" dir="t"/>
+    </dgm:scene3d>
+    <dgm:sp3d/>
+    <dgm:txPr/>
+    <dgm:style>
+      <a:lnRef idx="2">
+        <a:scrgbClr r="0" g="0" b="0"/>
+      </a:lnRef>
+      <a:fillRef idx="1">
+        <a:scrgbClr r="0" g="0" b="0"/>
+      </a:fillRef>
+      <a:effectRef idx="0">
+        <a:scrgbClr r="0" g="0" b="0"/>
+      </a:effectRef>
+      <a:fontRef idx="minor">
+        <a:schemeClr val="lt1"/>
+      </a:fontRef>
+    </dgm:style>
+  </dgm:styleLbl>
+  <dgm:styleLbl name="asst2">
+    <dgm:scene3d>
+      <a:camera prst="orthographicFront"/>
+      <a:lightRig rig="threePt" dir="t"/>
+    </dgm:scene3d>
+    <dgm:sp3d/>
+    <dgm:txPr/>
+    <dgm:style>
+      <a:lnRef idx="2">
+        <a:scrgbClr r="0" g="0" b="0"/>
+      </a:lnRef>
+      <a:fillRef idx="1">
+        <a:scrgbClr r="0" g="0" b="0"/>
+      </a:fillRef>
+      <a:effectRef idx="0">
+        <a:scrgbClr r="0" g="0" b="0"/>
+      </a:effectRef>
+      <a:fontRef idx="minor">
+        <a:schemeClr val="lt1"/>
+      </a:fontRef>
+    </dgm:style>
+  </dgm:styleLbl>
+  <dgm:styleLbl name="asst3">
+    <dgm:scene3d>
+      <a:camera prst="orthographicFront"/>
+      <a:lightRig rig="threePt" dir="t"/>
+    </dgm:scene3d>
+    <dgm:sp3d/>
+    <dgm:txPr/>
+    <dgm:style>
+      <a:lnRef idx="2">
+        <a:scrgbClr r="0" g="0" b="0"/>
+      </a:lnRef>
+      <a:fillRef idx="1">
+        <a:scrgbClr r="0" g="0" b="0"/>
+      </a:fillRef>
+      <a:effectRef idx="0">
+        <a:scrgbClr r="0" g="0" b="0"/>
+      </a:effectRef>
+      <a:fontRef idx="minor">
+        <a:schemeClr val="lt1"/>
+      </a:fontRef>
+    </dgm:style>
+  </dgm:styleLbl>
+  <dgm:styleLbl name="asst4">
+    <dgm:scene3d>
+      <a:camera prst="orthographicFront"/>
+      <a:lightRig rig="threePt" dir="t"/>
+    </dgm:scene3d>
+    <dgm:sp3d/>
+    <dgm:txPr/>
+    <dgm:style>
+      <a:lnRef idx="2">
+        <a:scrgbClr r="0" g="0" b="0"/>
+      </a:lnRef>
+      <a:fillRef idx="1">
+        <a:scrgbClr r="0" g="0" b="0"/>
+      </a:fillRef>
+      <a:effectRef idx="0">
+        <a:scrgbClr r="0" g="0" b="0"/>
+      </a:effectRef>
+      <a:fontRef idx="minor">
+        <a:schemeClr val="lt1"/>
+      </a:fontRef>
+    </dgm:style>
+  </dgm:styleLbl>
+  <dgm:styleLbl name="parChTrans2D1">
+    <dgm:scene3d>
+      <a:camera prst="orthographicFront"/>
+      <a:lightRig rig="threePt" dir="t"/>
+    </dgm:scene3d>
+    <dgm:sp3d/>
+    <dgm:txPr/>
+    <dgm:style>
+      <a:lnRef idx="2">
+        <a:scrgbClr r="0" g="0" b="0"/>
+      </a:lnRef>
+      <a:fillRef idx="1">
+        <a:scrgbClr r="0" g="0" b="0"/>
+      </a:fillRef>
+      <a:effectRef idx="0">
+        <a:scrgbClr r="0" g="0" b="0"/>
+      </a:effectRef>
+      <a:fontRef idx="minor">
+        <a:schemeClr val="lt1"/>
+      </a:fontRef>
+    </dgm:style>
+  </dgm:styleLbl>
+  <dgm:styleLbl name="parChTrans2D2">
+    <dgm:scene3d>
+      <a:camera prst="orthographicFront"/>
+      <a:lightRig rig="threePt" dir="t"/>
+    </dgm:scene3d>
+    <dgm:sp3d/>
+    <dgm:txPr/>
+    <dgm:style>
+      <a:lnRef idx="2">
+        <a:scrgbClr r="0" g="0" b="0"/>
+      </a:lnRef>
+      <a:fillRef idx="1">
+        <a:scrgbClr r="0" g="0" b="0"/>
+      </a:fillRef>
+      <a:effectRef idx="0">
+        <a:scrgbClr r="0" g="0" b="0"/>
+      </a:effectRef>
+      <a:fontRef idx="minor">
+        <a:schemeClr val="lt1"/>
+      </a:fontRef>
+    </dgm:style>
+  </dgm:styleLbl>
+  <dgm:styleLbl name="parChTrans2D3">
+    <dgm:scene3d>
+      <a:camera prst="orthographicFront"/>
+      <a:lightRig rig="threePt" dir="t"/>
+    </dgm:scene3d>
+    <dgm:sp3d/>
+    <dgm:txPr/>
+    <dgm:style>
+      <a:lnRef idx="2">
+        <a:scrgbClr r="0" g="0" b="0"/>
+      </a:lnRef>
+      <a:fillRef idx="1">
+        <a:scrgbClr r="0" g="0" b="0"/>
+      </a:fillRef>
+      <a:effectRef idx="0">
+        <a:scrgbClr r="0" g="0" b="0"/>
+      </a:effectRef>
+      <a:fontRef idx="minor">
+        <a:schemeClr val="lt1"/>
+      </a:fontRef>
+    </dgm:style>
+  </dgm:styleLbl>
+  <dgm:styleLbl name="parChTrans2D4">
+    <dgm:scene3d>
+      <a:camera prst="orthographicFront"/>
+      <a:lightRig rig="threePt" dir="t"/>
+    </dgm:scene3d>
+    <dgm:sp3d/>
+    <dgm:txPr/>
+    <dgm:style>
+      <a:lnRef idx="2">
+        <a:scrgbClr r="0" g="0" b="0"/>
+      </a:lnRef>
+      <a:fillRef idx="1">
+        <a:scrgbClr r="0" g="0" b="0"/>
+      </a:fillRef>
+      <a:effectRef idx="0">
+        <a:scrgbClr r="0" g="0" b="0"/>
+      </a:effectRef>
+      <a:fontRef idx="minor">
+        <a:schemeClr val="lt1"/>
+      </a:fontRef>
+    </dgm:style>
+  </dgm:styleLbl>
+  <dgm:styleLbl name="parChTrans1D1">
+    <dgm:scene3d>
+      <a:camera prst="orthographicFront"/>
+      <a:lightRig rig="threePt" dir="t"/>
+    </dgm:scene3d>
+    <dgm:sp3d/>
+    <dgm:txPr/>
+    <dgm:style>
+      <a:lnRef idx="2">
+        <a:scrgbClr r="0" g="0" b="0"/>
+      </a:lnRef>
+      <a:fillRef idx="0">
+        <a:scrgbClr r="0" g="0" b="0"/>
+      </a:fillRef>
+      <a:effectRef idx="0">
+        <a:scrgbClr r="0" g="0" b="0"/>
+      </a:effectRef>
+      <a:fontRef idx="minor"/>
+    </dgm:style>
+  </dgm:styleLbl>
+  <dgm:styleLbl name="parChTrans1D2">
+    <dgm:scene3d>
+      <a:camera prst="orthographicFront"/>
+      <a:lightRig rig="threePt" dir="t"/>
+    </dgm:scene3d>
+    <dgm:sp3d/>
+    <dgm:txPr/>
+    <dgm:style>
+      <a:lnRef idx="2">
+        <a:scrgbClr r="0" g="0" b="0"/>
+      </a:lnRef>
+      <a:fillRef idx="0">
+        <a:scrgbClr r="0" g="0" b="0"/>
+      </a:fillRef>
+      <a:effectRef idx="0">
+        <a:scrgbClr r="0" g="0" b="0"/>
+      </a:effectRef>
+      <a:fontRef idx="minor"/>
+    </dgm:style>
+  </dgm:styleLbl>
+  <dgm:styleLbl name="parChTrans1D3">
+    <dgm:scene3d>
+      <a:camera prst="orthographicFront"/>
+      <a:lightRig rig="threePt" dir="t"/>
+    </dgm:scene3d>
+    <dgm:sp3d/>
+    <dgm:txPr/>
+    <dgm:style>
+      <a:lnRef idx="2">
+        <a:scrgbClr r="0" g="0" b="0"/>
+      </a:lnRef>
+      <a:fillRef idx="0">
+        <a:scrgbClr r="0" g="0" b="0"/>
+      </a:fillRef>
+      <a:effectRef idx="0">
+        <a:scrgbClr r="0" g="0" b="0"/>
+      </a:effectRef>
+      <a:fontRef idx="minor"/>
+    </dgm:style>
+  </dgm:styleLbl>
+  <dgm:styleLbl name="parChTrans1D4">
+    <dgm:scene3d>
+      <a:camera prst="orthographicFront"/>
+      <a:lightRig rig="threePt" dir="t"/>
+    </dgm:scene3d>
+    <dgm:sp3d/>
+    <dgm:txPr/>
+    <dgm:style>
+      <a:lnRef idx="2">
+        <a:scrgbClr r="0" g="0" b="0"/>
+      </a:lnRef>
+      <a:fillRef idx="0">
+        <a:scrgbClr r="0" g="0" b="0"/>
+      </a:fillRef>
+      <a:effectRef idx="0">
+        <a:scrgbClr r="0" g="0" b="0"/>
+      </a:effectRef>
+      <a:fontRef idx="minor"/>
+    </dgm:style>
+  </dgm:styleLbl>
+  <dgm:styleLbl name="fgAcc1">
+    <dgm:scene3d>
+      <a:camera prst="orthographicFront"/>
+      <a:lightRig rig="threePt" dir="t"/>
+    </dgm:scene3d>
+    <dgm:sp3d/>
+    <dgm:txPr/>
+    <dgm:style>
+      <a:lnRef idx="2">
+        <a:scrgbClr r="0" g="0" b="0"/>
+      </a:lnRef>
+      <a:fillRef idx="1">
+        <a:scrgbClr r="0" g="0" b="0"/>
+      </a:fillRef>
+      <a:effectRef idx="0">
+        <a:scrgbClr r="0" g="0" b="0"/>
+      </a:effectRef>
+      <a:fontRef idx="minor"/>
+    </dgm:style>
+  </dgm:styleLbl>
+  <dgm:styleLbl name="conFgAcc1">
+    <dgm:scene3d>
+      <a:camera prst="orthographicFront"/>
+      <a:lightRig rig="threePt" dir="t"/>
+    </dgm:scene3d>
+    <dgm:sp3d/>
+    <dgm:txPr/>
+    <dgm:style>
+      <a:lnRef idx="2">
+        <a:scrgbClr r="0" g="0" b="0"/>
+      </a:lnRef>
+      <a:fillRef idx="1">
+        <a:scrgbClr r="0" g="0" b="0"/>
+      </a:fillRef>
+      <a:effectRef idx="0">
+        <a:scrgbClr r="0" g="0" b="0"/>
+      </a:effectRef>
+      <a:fontRef idx="minor"/>
+    </dgm:style>
+  </dgm:styleLbl>
+  <dgm:styleLbl name="alignAcc1">
+    <dgm:scene3d>
+      <a:camera prst="orthographicFront"/>
+      <a:lightRig rig="threePt" dir="t"/>
+    </dgm:scene3d>
+    <dgm:sp3d/>
+    <dgm:txPr/>
+    <dgm:style>
+      <a:lnRef idx="2">
+        <a:scrgbClr r="0" g="0" b="0"/>
+      </a:lnRef>
+      <a:fillRef idx="1">
+        <a:scrgbClr r="0" g="0" b="0"/>
+      </a:fillRef>
+      <a:effectRef idx="0">
+        <a:scrgbClr r="0" g="0" b="0"/>
+      </a:effectRef>
+      <a:fontRef idx="minor"/>
+    </dgm:style>
+  </dgm:styleLbl>
+  <dgm:styleLbl name="trAlignAcc1">
+    <dgm:scene3d>
+      <a:camera prst="orthographicFront"/>
+      <a:lightRig rig="threePt" dir="t"/>
+    </dgm:scene3d>
+    <dgm:sp3d/>
+    <dgm:txPr/>
+    <dgm:style>
+      <a:lnRef idx="1">
+        <a:scrgbClr r="0" g="0" b="0"/>
+      </a:lnRef>
+      <a:fillRef idx="1">
+        <a:scrgbClr r="0" g="0" b="0"/>
+      </a:fillRef>
+      <a:effectRef idx="0">
+        <a:scrgbClr r="0" g="0" b="0"/>
+      </a:effectRef>
+      <a:fontRef idx="minor"/>
+    </dgm:style>
+  </dgm:styleLbl>
+  <dgm:styleLbl name="bgAcc1">
+    <dgm:scene3d>
+      <a:camera prst="orthographicFront"/>
+      <a:lightRig rig="threePt" dir="t"/>
+    </dgm:scene3d>
+    <dgm:sp3d/>
+    <dgm:txPr/>
+    <dgm:style>
+      <a:lnRef idx="2">
+        <a:scrgbClr r="0" g="0" b="0"/>
+      </a:lnRef>
+      <a:fillRef idx="1">
+        <a:scrgbClr r="0" g="0" b="0"/>
+      </a:fillRef>
+      <a:effectRef idx="0">
+        <a:scrgbClr r="0" g="0" b="0"/>
+      </a:effectRef>
+      <a:fontRef idx="minor"/>
+    </dgm:style>
+  </dgm:styleLbl>
+  <dgm:styleLbl name="solidFgAcc1">
+    <dgm:scene3d>
+      <a:camera prst="orthographicFront"/>
+      <a:lightRig rig="threePt" dir="t"/>
+    </dgm:scene3d>
+    <dgm:sp3d/>
+    <dgm:txPr/>
+    <dgm:style>
+      <a:lnRef idx="2">
+        <a:scrgbClr r="0" g="0" b="0"/>
+      </a:lnRef>
+      <a:fillRef idx="1">
+        <a:scrgbClr r="0" g="0" b="0"/>
+      </a:fillRef>
+      <a:effectRef idx="0">
+        <a:scrgbClr r="0" g="0" b="0"/>
+      </a:effectRef>
+      <a:fontRef idx="minor"/>
+    </dgm:style>
+  </dgm:styleLbl>
+  <dgm:styleLbl name="solidAlignAcc1">
+    <dgm:scene3d>
+      <a:camera prst="orthographicFront"/>
+      <a:lightRig rig="threePt" dir="t"/>
+    </dgm:scene3d>
+    <dgm:sp3d/>
+    <dgm:txPr/>
+    <dgm:style>
+      <a:lnRef idx="2">
+        <a:scrgbClr r="0" g="0" b="0"/>
+      </a:lnRef>
+      <a:fillRef idx="1">
+        <a:scrgbClr r="0" g="0" b="0"/>
+      </a:fillRef>
+      <a:effectRef idx="0">
+        <a:scrgbClr r="0" g="0" b="0"/>
+      </a:effectRef>
+      <a:fontRef idx="minor"/>
+    </dgm:style>
+  </dgm:styleLbl>
+  <dgm:styleLbl name="solidBgAcc1">
+    <dgm:scene3d>
+      <a:camera prst="orthographicFront"/>
+      <a:lightRig rig="threePt" dir="t"/>
+    </dgm:scene3d>
+    <dgm:sp3d/>
+    <dgm:txPr/>
+    <dgm:style>
+      <a:lnRef idx="2">
+        <a:scrgbClr r="0" g="0" b="0"/>
+      </a:lnRef>
+      <a:fillRef idx="1">
+        <a:scrgbClr r="0" g="0" b="0"/>
+      </a:fillRef>
+      <a:effectRef idx="0">
+        <a:scrgbClr r="0" g="0" b="0"/>
+      </a:effectRef>
+      <a:fontRef idx="minor"/>
+    </dgm:style>
+  </dgm:styleLbl>
+  <dgm:styleLbl name="fgAccFollowNode1">
+    <dgm:scene3d>
+      <a:camera prst="orthographicFront"/>
+      <a:lightRig rig="threePt" dir="t"/>
+    </dgm:scene3d>
+    <dgm:sp3d/>
+    <dgm:txPr/>
+    <dgm:style>
+      <a:lnRef idx="2">
+        <a:scrgbClr r="0" g="0" b="0"/>
+      </a:lnRef>
+      <a:fillRef idx="1">
+        <a:scrgbClr r="0" g="0" b="0"/>
+      </a:fillRef>
+      <a:effectRef idx="0">
+        <a:scrgbClr r="0" g="0" b="0"/>
+      </a:effectRef>
+      <a:fontRef idx="minor"/>
+    </dgm:style>
+  </dgm:styleLbl>
+  <dgm:styleLbl name="alignAccFollowNode1">
+    <dgm:scene3d>
+      <a:camera prst="orthographicFront"/>
+      <a:lightRig rig="threePt" dir="t"/>
+    </dgm:scene3d>
+    <dgm:sp3d/>
+    <dgm:txPr/>
+    <dgm:style>
+      <a:lnRef idx="2">
+        <a:scrgbClr r="0" g="0" b="0"/>
+      </a:lnRef>
+      <a:fillRef idx="1">
+        <a:scrgbClr r="0" g="0" b="0"/>
+      </a:fillRef>
+      <a:effectRef idx="0">
+        <a:scrgbClr r="0" g="0" b="0"/>
+      </a:effectRef>
+      <a:fontRef idx="minor"/>
+    </dgm:style>
+  </dgm:styleLbl>
+  <dgm:styleLbl name="bgAccFollowNode1">
+    <dgm:scene3d>
+      <a:camera prst="orthographicFront"/>
+      <a:lightRig rig="threePt" dir="t"/>
+    </dgm:scene3d>
+    <dgm:sp3d/>
+    <dgm:txPr/>
+    <dgm:style>
+      <a:lnRef idx="2">
+        <a:scrgbClr r="0" g="0" b="0"/>
+      </a:lnRef>
+      <a:fillRef idx="1">
+        <a:scrgbClr r="0" g="0" b="0"/>
+      </a:fillRef>
+      <a:effectRef idx="0">
+        <a:scrgbClr r="0" g="0" b="0"/>
+      </a:effectRef>
+      <a:fontRef idx="minor"/>
+    </dgm:style>
+  </dgm:styleLbl>
+  <dgm:styleLbl name="fgAcc0">
+    <dgm:scene3d>
+      <a:camera prst="orthographicFront"/>
+      <a:lightRig rig="threePt" dir="t"/>
+    </dgm:scene3d>
+    <dgm:sp3d/>
+    <dgm:txPr/>
+    <dgm:style>
+      <a:lnRef idx="2">
+        <a:scrgbClr r="0" g="0" b="0"/>
+      </a:lnRef>
+      <a:fillRef idx="1">
+        <a:scrgbClr r="0" g="0" b="0"/>
+      </a:fillRef>
+      <a:effectRef idx="0">
+        <a:scrgbClr r="0" g="0" b="0"/>
+      </a:effectRef>
+      <a:fontRef idx="minor"/>
+    </dgm:style>
+  </dgm:styleLbl>
+  <dgm:styleLbl name="fgAcc2">
+    <dgm:scene3d>
+      <a:camera prst="orthographicFront"/>
+      <a:lightRig rig="threePt" dir="t"/>
+    </dgm:scene3d>
+    <dgm:sp3d/>
+    <dgm:txPr/>
+    <dgm:style>
+      <a:lnRef idx="2">
+        <a:scrgbClr r="0" g="0" b="0"/>
+      </a:lnRef>
+      <a:fillRef idx="1">
+        <a:scrgbClr r="0" g="0" b="0"/>
+      </a:fillRef>
+      <a:effectRef idx="0">
+        <a:scrgbClr r="0" g="0" b="0"/>
+      </a:effectRef>
+      <a:fontRef idx="minor"/>
+    </dgm:style>
+  </dgm:styleLbl>
+  <dgm:styleLbl name="fgAcc3">
+    <dgm:scene3d>
+      <a:camera prst="orthographicFront"/>
+      <a:lightRig rig="threePt" dir="t"/>
+    </dgm:scene3d>
+    <dgm:sp3d/>
+    <dgm:txPr/>
+    <dgm:style>
+      <a:lnRef idx="2">
+        <a:scrgbClr r="0" g="0" b="0"/>
+      </a:lnRef>
+      <a:fillRef idx="1">
+        <a:scrgbClr r="0" g="0" b="0"/>
+      </a:fillRef>
+      <a:effectRef idx="0">
+        <a:scrgbClr r="0" g="0" b="0"/>
+      </a:effectRef>
+      <a:fontRef idx="minor"/>
+    </dgm:style>
+  </dgm:styleLbl>
+  <dgm:styleLbl name="fgAcc4">
+    <dgm:scene3d>
+      <a:camera prst="orthographicFront"/>
+      <a:lightRig rig="threePt" dir="t"/>
+    </dgm:scene3d>
+    <dgm:sp3d/>
+    <dgm:txPr/>
+    <dgm:style>
+      <a:lnRef idx="2">
+        <a:scrgbClr r="0" g="0" b="0"/>
+      </a:lnRef>
+      <a:fillRef idx="1">
+        <a:scrgbClr r="0" g="0" b="0"/>
+      </a:fillRef>
+      <a:effectRef idx="0">
+        <a:scrgbClr r="0" g="0" b="0"/>
+      </a:effectRef>
+      <a:fontRef idx="minor"/>
+    </dgm:style>
+  </dgm:styleLbl>
+  <dgm:styleLbl name="bgShp">
+    <dgm:scene3d>
+      <a:camera prst="orthographicFront"/>
+      <a:lightRig rig="threePt" dir="t"/>
+    </dgm:scene3d>
+    <dgm:sp3d/>
+    <dgm:txPr/>
+    <dgm:style>
+      <a:lnRef idx="0">
+        <a:scrgbClr r="0" g="0" b="0"/>
+      </a:lnRef>
+      <a:fillRef idx="1">
+        <a:scrgbClr r="0" g="0" b="0"/>
+      </a:fillRef>
+      <a:effectRef idx="0">
+        <a:scrgbClr r="0" g="0" b="0"/>
+      </a:effectRef>
+      <a:fontRef idx="minor"/>
+    </dgm:style>
+  </dgm:styleLbl>
+  <dgm:styleLbl name="dkBgShp">
+    <dgm:scene3d>
+      <a:camera prst="orthographicFront"/>
+      <a:lightRig rig="threePt" dir="t"/>
+    </dgm:scene3d>
+    <dgm:sp3d/>
+    <dgm:txPr/>
+    <dgm:style>
+      <a:lnRef idx="0">
+        <a:scrgbClr r="0" g="0" b="0"/>
+      </a:lnRef>
+      <a:fillRef idx="1">
+        <a:scrgbClr r="0" g="0" b="0"/>
+      </a:fillRef>
+      <a:effectRef idx="0">
+        <a:scrgbClr r="0" g="0" b="0"/>
+      </a:effectRef>
+      <a:fontRef idx="minor"/>
+    </dgm:style>
+  </dgm:styleLbl>
+  <dgm:styleLbl name="trBgShp">
+    <dgm:scene3d>
+      <a:camera prst="orthographicFront"/>
+      <a:lightRig rig="threePt" dir="t"/>
+    </dgm:scene3d>
+    <dgm:sp3d/>
+    <dgm:txPr/>
+    <dgm:style>
+      <a:lnRef idx="0">
+        <a:scrgbClr r="0" g="0" b="0"/>
+      </a:lnRef>
+      <a:fillRef idx="1">
+        <a:scrgbClr r="0" g="0" b="0"/>
+      </a:fillRef>
+      <a:effectRef idx="0">
+        <a:scrgbClr r="0" g="0" b="0"/>
+      </a:effectRef>
+      <a:fontRef idx="minor"/>
+    </dgm:style>
+  </dgm:styleLbl>
+  <dgm:styleLbl name="fgShp">
+    <dgm:scene3d>
+      <a:camera prst="orthographicFront"/>
+      <a:lightRig rig="threePt" dir="t"/>
+    </dgm:scene3d>
+    <dgm:sp3d/>
+    <dgm:txPr/>
+    <dgm:style>
+      <a:lnRef idx="2">
+        <a:scrgbClr r="0" g="0" b="0"/>
+      </a:lnRef>
+      <a:fillRef idx="1">
+        <a:scrgbClr r="0" g="0" b="0"/>
+      </a:fillRef>
+      <a:effectRef idx="0">
+        <a:scrgbClr r="0" g="0" b="0"/>
+      </a:effectRef>
+      <a:fontRef idx="minor"/>
+    </dgm:style>
+  </dgm:styleLbl>
+  <dgm:styleLbl name="revTx">
+    <dgm:scene3d>
+      <a:camera prst="orthographicFront"/>
+      <a:lightRig rig="threePt" dir="t"/>
+    </dgm:scene3d>
+    <dgm:sp3d/>
+    <dgm:txPr/>
+    <dgm:style>
+      <a:lnRef idx="0">
+        <a:scrgbClr r="0" g="0" b="0"/>
+      </a:lnRef>
+      <a:fillRef idx="0">
+        <a:scrgbClr r="0" g="0" b="0"/>
+      </a:fillRef>
+      <a:effectRef idx="0">
+        <a:scrgbClr r="0" g="0" b="0"/>
+      </a:effectRef>
+      <a:fontRef idx="minor"/>
+    </dgm:style>
+  </dgm:styleLbl>
+</dgm:styleDef>
+</file>
+
 <file path=ppt/notesMasters/notesMaster1.xml><?xml version="1.0" encoding="utf-8"?>
 <p:notesMaster xmlns:a="http://schemas.openxmlformats.org/drawingml/2006/main" xmlns:r="http://schemas.openxmlformats.org/officeDocument/2006/relationships" xmlns:p="http://schemas.openxmlformats.org/presentationml/2006/main">
   <p:cSld>
@@ -204,7 +3266,7 @@
           <a:p>
             <a:fld id="{7AFDEBC5-B985-4DBD-971A-DE566E1C50A2}" type="datetimeFigureOut">
               <a:rPr lang="nl-NL" smtClean="0"/>
-              <a:t>5-11-2025</a:t>
+              <a:t>13-11-2025</a:t>
             </a:fld>
             <a:endParaRPr lang="nl-NL"/>
           </a:p>
@@ -660,6 +3722,243 @@
           <a:bodyPr/>
           <a:lstStyle/>
           <a:p>
+            <a:endParaRPr lang="nl-NL" dirty="0"/>
+          </a:p>
+        </p:txBody>
+      </p:sp>
+      <p:sp>
+        <p:nvSpPr>
+          <p:cNvPr id="4" name="Slide Number Placeholder 3"/>
+          <p:cNvSpPr>
+            <a:spLocks noGrp="1"/>
+          </p:cNvSpPr>
+          <p:nvPr>
+            <p:ph type="sldNum" sz="quarter" idx="5"/>
+          </p:nvPr>
+        </p:nvSpPr>
+        <p:spPr/>
+        <p:txBody>
+          <a:bodyPr/>
+          <a:lstStyle/>
+          <a:p>
+            <a:fld id="{22AE3956-8282-4F35-BBF9-4A117B2EA080}" type="slidenum">
+              <a:rPr lang="nl-NL" smtClean="0"/>
+              <a:t>2</a:t>
+            </a:fld>
+            <a:endParaRPr lang="nl-NL"/>
+          </a:p>
+        </p:txBody>
+      </p:sp>
+    </p:spTree>
+    <p:extLst>
+      <p:ext uri="{BB962C8B-B14F-4D97-AF65-F5344CB8AC3E}">
+        <p14:creationId xmlns:p14="http://schemas.microsoft.com/office/powerpoint/2010/main" val="3900431771"/>
+      </p:ext>
+    </p:extLst>
+  </p:cSld>
+  <p:clrMapOvr>
+    <a:masterClrMapping/>
+  </p:clrMapOvr>
+</p:notes>
+</file>
+
+<file path=ppt/notesSlides/notesSlide3.xml><?xml version="1.0" encoding="utf-8"?>
+<p:notes xmlns:a="http://schemas.openxmlformats.org/drawingml/2006/main" xmlns:r="http://schemas.openxmlformats.org/officeDocument/2006/relationships" xmlns:p="http://schemas.openxmlformats.org/presentationml/2006/main">
+  <p:cSld>
+    <p:spTree>
+      <p:nvGrpSpPr>
+        <p:cNvPr id="1" name=""/>
+        <p:cNvGrpSpPr/>
+        <p:nvPr/>
+      </p:nvGrpSpPr>
+      <p:grpSpPr>
+        <a:xfrm>
+          <a:off x="0" y="0"/>
+          <a:ext cx="0" cy="0"/>
+          <a:chOff x="0" y="0"/>
+          <a:chExt cx="0" cy="0"/>
+        </a:xfrm>
+      </p:grpSpPr>
+      <p:sp>
+        <p:nvSpPr>
+          <p:cNvPr id="2" name="Slide Image Placeholder 1"/>
+          <p:cNvSpPr>
+            <a:spLocks noGrp="1" noRot="1" noChangeAspect="1"/>
+          </p:cNvSpPr>
+          <p:nvPr>
+            <p:ph type="sldImg"/>
+          </p:nvPr>
+        </p:nvSpPr>
+        <p:spPr/>
+      </p:sp>
+      <p:sp>
+        <p:nvSpPr>
+          <p:cNvPr id="3" name="Notes Placeholder 2"/>
+          <p:cNvSpPr>
+            <a:spLocks noGrp="1"/>
+          </p:cNvSpPr>
+          <p:nvPr>
+            <p:ph type="body" idx="1"/>
+          </p:nvPr>
+        </p:nvSpPr>
+        <p:spPr/>
+        <p:txBody>
+          <a:bodyPr/>
+          <a:lstStyle/>
+          <a:p>
+            <a:r>
+              <a:rPr lang="en-US" dirty="0"/>
+              <a:t>Has everyone picked up their badge or have it made?</a:t>
+            </a:r>
+          </a:p>
+          <a:p>
+            <a:r>
+              <a:rPr lang="en-US" dirty="0"/>
+              <a:t>That's your ticket for lunch!</a:t>
+            </a:r>
+          </a:p>
+          <a:p>
+            <a:endParaRPr lang="en-US" dirty="0"/>
+          </a:p>
+          <a:p>
+            <a:r>
+              <a:rPr lang="en-US" dirty="0"/>
+              <a:t>An internet connection has been arranged for you on the campus in Delft. This account is for a limited period of time and personal. You should have received a email with your personal </a:t>
+            </a:r>
+            <a:r>
+              <a:rPr lang="en-US" dirty="0" err="1"/>
+              <a:t>Eduroam</a:t>
+            </a:r>
+            <a:r>
+              <a:rPr lang="en-US" dirty="0"/>
+              <a:t> </a:t>
+            </a:r>
+            <a:r>
+              <a:rPr lang="en-US" dirty="0" err="1"/>
+              <a:t>WiFi</a:t>
+            </a:r>
+            <a:r>
+              <a:rPr lang="en-US" dirty="0"/>
+              <a:t> account. If not, you can still arrange it at the Information Desk later today.</a:t>
+            </a:r>
+          </a:p>
+          <a:p>
+            <a:endParaRPr lang="en-US" dirty="0"/>
+          </a:p>
+          <a:p>
+            <a:r>
+              <a:rPr lang="en-US" dirty="0"/>
+              <a:t>Photographer present -&gt; report to the Information Desk if you object to publication online.</a:t>
+            </a:r>
+            <a:endParaRPr lang="en-GB" dirty="0"/>
+          </a:p>
+        </p:txBody>
+      </p:sp>
+      <p:sp>
+        <p:nvSpPr>
+          <p:cNvPr id="4" name="Date Placeholder 3"/>
+          <p:cNvSpPr>
+            <a:spLocks noGrp="1"/>
+          </p:cNvSpPr>
+          <p:nvPr>
+            <p:ph type="dt" idx="10"/>
+          </p:nvPr>
+        </p:nvSpPr>
+        <p:spPr/>
+        <p:txBody>
+          <a:bodyPr/>
+          <a:lstStyle/>
+          <a:p>
+            <a:fld id="{D87936C7-6A70-449E-955C-4D17B497A807}" type="datetime4">
+              <a:rPr lang="nl-NL" smtClean="0"/>
+              <a:pPr/>
+              <a:t>13 november 2025</a:t>
+            </a:fld>
+            <a:endParaRPr lang="nl-NL"/>
+          </a:p>
+        </p:txBody>
+      </p:sp>
+      <p:sp>
+        <p:nvSpPr>
+          <p:cNvPr id="5" name="Slide Number Placeholder 4"/>
+          <p:cNvSpPr>
+            <a:spLocks noGrp="1"/>
+          </p:cNvSpPr>
+          <p:nvPr>
+            <p:ph type="sldNum" sz="quarter" idx="11"/>
+          </p:nvPr>
+        </p:nvSpPr>
+        <p:spPr/>
+        <p:txBody>
+          <a:bodyPr/>
+          <a:lstStyle/>
+          <a:p>
+            <a:fld id="{FA2684D4-5C03-4A46-9CBF-D8F1FEEB2460}" type="slidenum">
+              <a:rPr lang="nl-NL" smtClean="0"/>
+              <a:pPr/>
+              <a:t>5</a:t>
+            </a:fld>
+            <a:endParaRPr lang="nl-NL"/>
+          </a:p>
+        </p:txBody>
+      </p:sp>
+    </p:spTree>
+    <p:extLst>
+      <p:ext uri="{BB962C8B-B14F-4D97-AF65-F5344CB8AC3E}">
+        <p14:creationId xmlns:p14="http://schemas.microsoft.com/office/powerpoint/2010/main" val="2258790035"/>
+      </p:ext>
+    </p:extLst>
+  </p:cSld>
+  <p:clrMapOvr>
+    <a:masterClrMapping/>
+  </p:clrMapOvr>
+</p:notes>
+</file>
+
+<file path=ppt/notesSlides/notesSlide4.xml><?xml version="1.0" encoding="utf-8"?>
+<p:notes xmlns:a="http://schemas.openxmlformats.org/drawingml/2006/main" xmlns:r="http://schemas.openxmlformats.org/officeDocument/2006/relationships" xmlns:p="http://schemas.openxmlformats.org/presentationml/2006/main">
+  <p:cSld>
+    <p:spTree>
+      <p:nvGrpSpPr>
+        <p:cNvPr id="1" name=""/>
+        <p:cNvGrpSpPr/>
+        <p:nvPr/>
+      </p:nvGrpSpPr>
+      <p:grpSpPr>
+        <a:xfrm>
+          <a:off x="0" y="0"/>
+          <a:ext cx="0" cy="0"/>
+          <a:chOff x="0" y="0"/>
+          <a:chExt cx="0" cy="0"/>
+        </a:xfrm>
+      </p:grpSpPr>
+      <p:sp>
+        <p:nvSpPr>
+          <p:cNvPr id="2" name="Slide Image Placeholder 1"/>
+          <p:cNvSpPr>
+            <a:spLocks noGrp="1" noRot="1" noChangeAspect="1"/>
+          </p:cNvSpPr>
+          <p:nvPr>
+            <p:ph type="sldImg"/>
+          </p:nvPr>
+        </p:nvSpPr>
+        <p:spPr/>
+      </p:sp>
+      <p:sp>
+        <p:nvSpPr>
+          <p:cNvPr id="3" name="Notes Placeholder 2"/>
+          <p:cNvSpPr>
+            <a:spLocks noGrp="1"/>
+          </p:cNvSpPr>
+          <p:nvPr>
+            <p:ph type="body" idx="1"/>
+          </p:nvPr>
+        </p:nvSpPr>
+        <p:spPr/>
+        <p:txBody>
+          <a:bodyPr/>
+          <a:lstStyle/>
+          <a:p>
             <a:endParaRPr lang="nl-NL" sz="900"/>
           </a:p>
         </p:txBody>
@@ -849,7 +4148,7 @@
           <a:p>
             <a:fld id="{8C03529F-F810-4FC9-BD64-0B4367090BD1}" type="datetimeFigureOut">
               <a:rPr lang="nl-NL" smtClean="0"/>
-              <a:t>5-11-2025</a:t>
+              <a:t>13-11-2025</a:t>
             </a:fld>
             <a:endParaRPr lang="nl-NL"/>
           </a:p>
@@ -1049,7 +4348,7 @@
           <a:p>
             <a:fld id="{8C03529F-F810-4FC9-BD64-0B4367090BD1}" type="datetimeFigureOut">
               <a:rPr lang="nl-NL" smtClean="0"/>
-              <a:t>5-11-2025</a:t>
+              <a:t>13-11-2025</a:t>
             </a:fld>
             <a:endParaRPr lang="nl-NL"/>
           </a:p>
@@ -1259,7 +4558,7 @@
           <a:p>
             <a:fld id="{8C03529F-F810-4FC9-BD64-0B4367090BD1}" type="datetimeFigureOut">
               <a:rPr lang="nl-NL" smtClean="0"/>
-              <a:t>5-11-2025</a:t>
+              <a:t>13-11-2025</a:t>
             </a:fld>
             <a:endParaRPr lang="nl-NL"/>
           </a:p>
@@ -1479,7 +4778,7 @@
           <a:p>
             <a:fld id="{2BE7F1A7-46C0-614C-8973-2677197B1A3C}" type="datetimeFigureOut">
               <a:rPr lang="en-US" smtClean="0"/>
-              <a:t>11/5/2025</a:t>
+              <a:t>11/13/2025</a:t>
             </a:fld>
             <a:endParaRPr lang="en-US"/>
           </a:p>
@@ -1677,7 +4976,7 @@
           <a:p>
             <a:fld id="{2BE7F1A7-46C0-614C-8973-2677197B1A3C}" type="datetimeFigureOut">
               <a:rPr lang="en-US" smtClean="0"/>
-              <a:t>11/5/2025</a:t>
+              <a:t>11/13/2025</a:t>
             </a:fld>
             <a:endParaRPr lang="en-US"/>
           </a:p>
@@ -1952,7 +5251,7 @@
           <a:p>
             <a:fld id="{2BE7F1A7-46C0-614C-8973-2677197B1A3C}" type="datetimeFigureOut">
               <a:rPr lang="en-US" smtClean="0"/>
-              <a:t>11/5/2025</a:t>
+              <a:t>11/13/2025</a:t>
             </a:fld>
             <a:endParaRPr lang="en-US"/>
           </a:p>
@@ -2217,7 +5516,7 @@
           <a:p>
             <a:fld id="{2BE7F1A7-46C0-614C-8973-2677197B1A3C}" type="datetimeFigureOut">
               <a:rPr lang="en-US" smtClean="0"/>
-              <a:t>11/5/2025</a:t>
+              <a:t>11/13/2025</a:t>
             </a:fld>
             <a:endParaRPr lang="en-US"/>
           </a:p>
@@ -2629,7 +5928,7 @@
           <a:p>
             <a:fld id="{2BE7F1A7-46C0-614C-8973-2677197B1A3C}" type="datetimeFigureOut">
               <a:rPr lang="en-US" smtClean="0"/>
-              <a:t>11/5/2025</a:t>
+              <a:t>11/13/2025</a:t>
             </a:fld>
             <a:endParaRPr lang="en-US"/>
           </a:p>
@@ -2770,7 +6069,7 @@
           <a:p>
             <a:fld id="{2BE7F1A7-46C0-614C-8973-2677197B1A3C}" type="datetimeFigureOut">
               <a:rPr lang="en-US" smtClean="0"/>
-              <a:t>11/5/2025</a:t>
+              <a:t>11/13/2025</a:t>
             </a:fld>
             <a:endParaRPr lang="en-US"/>
           </a:p>
@@ -2883,7 +6182,7 @@
           <a:p>
             <a:fld id="{2BE7F1A7-46C0-614C-8973-2677197B1A3C}" type="datetimeFigureOut">
               <a:rPr lang="en-US" smtClean="0"/>
-              <a:t>11/5/2025</a:t>
+              <a:t>11/13/2025</a:t>
             </a:fld>
             <a:endParaRPr lang="en-US"/>
           </a:p>
@@ -3194,7 +6493,7 @@
           <a:p>
             <a:fld id="{2BE7F1A7-46C0-614C-8973-2677197B1A3C}" type="datetimeFigureOut">
               <a:rPr lang="en-US" smtClean="0"/>
-              <a:t>11/5/2025</a:t>
+              <a:t>11/13/2025</a:t>
             </a:fld>
             <a:endParaRPr lang="en-US"/>
           </a:p>
@@ -3394,7 +6693,7 @@
           <a:p>
             <a:fld id="{8C03529F-F810-4FC9-BD64-0B4367090BD1}" type="datetimeFigureOut">
               <a:rPr lang="nl-NL" smtClean="0"/>
-              <a:t>5-11-2025</a:t>
+              <a:t>13-11-2025</a:t>
             </a:fld>
             <a:endParaRPr lang="nl-NL"/>
           </a:p>
@@ -3682,7 +6981,7 @@
           <a:p>
             <a:fld id="{2BE7F1A7-46C0-614C-8973-2677197B1A3C}" type="datetimeFigureOut">
               <a:rPr lang="en-US" smtClean="0"/>
-              <a:t>11/5/2025</a:t>
+              <a:t>11/13/2025</a:t>
             </a:fld>
             <a:endParaRPr lang="en-US"/>
           </a:p>
@@ -3880,7 +7179,7 @@
           <a:p>
             <a:fld id="{2BE7F1A7-46C0-614C-8973-2677197B1A3C}" type="datetimeFigureOut">
               <a:rPr lang="en-US" smtClean="0"/>
-              <a:t>11/5/2025</a:t>
+              <a:t>11/13/2025</a:t>
             </a:fld>
             <a:endParaRPr lang="en-US"/>
           </a:p>
@@ -4088,7 +7387,7 @@
           <a:p>
             <a:fld id="{2BE7F1A7-46C0-614C-8973-2677197B1A3C}" type="datetimeFigureOut">
               <a:rPr lang="en-US" smtClean="0"/>
-              <a:t>11/5/2025</a:t>
+              <a:t>11/13/2025</a:t>
             </a:fld>
             <a:endParaRPr lang="en-US"/>
           </a:p>
@@ -4394,7 +7693,7 @@
           <a:p>
             <a:fld id="{8C03529F-F810-4FC9-BD64-0B4367090BD1}" type="datetimeFigureOut">
               <a:rPr lang="nl-NL" smtClean="0"/>
-              <a:t>5-11-2025</a:t>
+              <a:t>13-11-2025</a:t>
             </a:fld>
             <a:endParaRPr lang="nl-NL"/>
           </a:p>
@@ -4662,7 +7961,7 @@
           <a:p>
             <a:fld id="{8C03529F-F810-4FC9-BD64-0B4367090BD1}" type="datetimeFigureOut">
               <a:rPr lang="nl-NL" smtClean="0"/>
-              <a:t>5-11-2025</a:t>
+              <a:t>13-11-2025</a:t>
             </a:fld>
             <a:endParaRPr lang="nl-NL"/>
           </a:p>
@@ -5077,7 +8376,7 @@
           <a:p>
             <a:fld id="{8C03529F-F810-4FC9-BD64-0B4367090BD1}" type="datetimeFigureOut">
               <a:rPr lang="nl-NL" smtClean="0"/>
-              <a:t>5-11-2025</a:t>
+              <a:t>13-11-2025</a:t>
             </a:fld>
             <a:endParaRPr lang="nl-NL"/>
           </a:p>
@@ -5219,7 +8518,7 @@
           <a:p>
             <a:fld id="{8C03529F-F810-4FC9-BD64-0B4367090BD1}" type="datetimeFigureOut">
               <a:rPr lang="nl-NL" smtClean="0"/>
-              <a:t>5-11-2025</a:t>
+              <a:t>13-11-2025</a:t>
             </a:fld>
             <a:endParaRPr lang="nl-NL"/>
           </a:p>
@@ -5332,7 +8631,7 @@
           <a:p>
             <a:fld id="{8C03529F-F810-4FC9-BD64-0B4367090BD1}" type="datetimeFigureOut">
               <a:rPr lang="nl-NL" smtClean="0"/>
-              <a:t>5-11-2025</a:t>
+              <a:t>13-11-2025</a:t>
             </a:fld>
             <a:endParaRPr lang="nl-NL"/>
           </a:p>
@@ -5645,7 +8944,7 @@
           <a:p>
             <a:fld id="{8C03529F-F810-4FC9-BD64-0B4367090BD1}" type="datetimeFigureOut">
               <a:rPr lang="nl-NL" smtClean="0"/>
-              <a:t>5-11-2025</a:t>
+              <a:t>13-11-2025</a:t>
             </a:fld>
             <a:endParaRPr lang="nl-NL"/>
           </a:p>
@@ -5934,7 +9233,7 @@
           <a:p>
             <a:fld id="{8C03529F-F810-4FC9-BD64-0B4367090BD1}" type="datetimeFigureOut">
               <a:rPr lang="nl-NL" smtClean="0"/>
-              <a:t>5-11-2025</a:t>
+              <a:t>13-11-2025</a:t>
             </a:fld>
             <a:endParaRPr lang="nl-NL"/>
           </a:p>
@@ -6177,7 +9476,7 @@
           <a:p>
             <a:fld id="{8C03529F-F810-4FC9-BD64-0B4367090BD1}" type="datetimeFigureOut">
               <a:rPr lang="nl-NL" smtClean="0"/>
-              <a:t>5-11-2025</a:t>
+              <a:t>13-11-2025</a:t>
             </a:fld>
             <a:endParaRPr lang="nl-NL"/>
           </a:p>
@@ -6745,7 +10044,7 @@
           <a:p>
             <a:fld id="{2BE7F1A7-46C0-614C-8973-2677197B1A3C}" type="datetimeFigureOut">
               <a:rPr lang="en-US" smtClean="0"/>
-              <a:t>11/5/2025</a:t>
+              <a:t>11/13/2025</a:t>
             </a:fld>
             <a:endParaRPr lang="en-US"/>
           </a:p>
@@ -8524,7 +11823,7 @@
           <p:nvPr/>
         </p:nvPicPr>
         <p:blipFill>
-          <a:blip r:embed="rId2">
+          <a:blip r:embed="rId3">
             <a:extLst>
               <a:ext uri="{28A0092B-C50C-407E-A947-70E740481C1C}">
                 <a14:useLocalDpi xmlns:a14="http://schemas.microsoft.com/office/drawing/2010/main" val="0"/>
@@ -8544,12 +11843,51 @@
           </a:prstGeom>
         </p:spPr>
       </p:pic>
-      <p:sp>
-        <p:nvSpPr>
-          <p:cNvPr id="2" name="Arrow: Right 1">
-            <a:extLst>
-              <a:ext uri="{FF2B5EF4-FFF2-40B4-BE49-F238E27FC236}">
-                <a16:creationId xmlns:a16="http://schemas.microsoft.com/office/drawing/2014/main" id="{F9983C15-F686-60C6-E649-37A5160E906C}"/>
+      <p:pic>
+        <p:nvPicPr>
+          <p:cNvPr id="2" name="Graphic 9" descr="Marker with solid fill">
+            <a:extLst>
+              <a:ext uri="{FF2B5EF4-FFF2-40B4-BE49-F238E27FC236}">
+                <a16:creationId xmlns:a16="http://schemas.microsoft.com/office/drawing/2014/main" id="{D83745E7-6699-D2DE-A9C8-FA2C6D433609}"/>
+              </a:ext>
+            </a:extLst>
+          </p:cNvPr>
+          <p:cNvPicPr>
+            <a:picLocks noChangeAspect="1"/>
+          </p:cNvPicPr>
+          <p:nvPr/>
+        </p:nvPicPr>
+        <p:blipFill>
+          <a:blip r:embed="rId4">
+            <a:extLst>
+              <a:ext uri="{28A0092B-C50C-407E-A947-70E740481C1C}">
+                <a14:useLocalDpi xmlns:a14="http://schemas.microsoft.com/office/drawing/2010/main" val="0"/>
+              </a:ext>
+              <a:ext uri="{96DAC541-7B7A-43D3-8B79-37D633B846F1}">
+                <asvg:svgBlip xmlns:asvg="http://schemas.microsoft.com/office/drawing/2016/SVG/main" r:embed="rId5"/>
+              </a:ext>
+            </a:extLst>
+          </a:blip>
+          <a:stretch>
+            <a:fillRect/>
+          </a:stretch>
+        </p:blipFill>
+        <p:spPr>
+          <a:xfrm>
+            <a:off x="5690316" y="2665926"/>
+            <a:ext cx="1146220" cy="1146220"/>
+          </a:xfrm>
+          <a:prstGeom prst="rect">
+            <a:avLst/>
+          </a:prstGeom>
+        </p:spPr>
+      </p:pic>
+      <p:sp>
+        <p:nvSpPr>
+          <p:cNvPr id="4" name="Oval 3">
+            <a:extLst>
+              <a:ext uri="{FF2B5EF4-FFF2-40B4-BE49-F238E27FC236}">
+                <a16:creationId xmlns:a16="http://schemas.microsoft.com/office/drawing/2014/main" id="{DA213C5D-FAA9-180B-C8E0-6FDA6C809BDF}"/>
               </a:ext>
             </a:extLst>
           </p:cNvPr>
@@ -8557,25 +11895,25 @@
           <p:nvPr/>
         </p:nvSpPr>
         <p:spPr>
-          <a:xfrm rot="12269173">
-            <a:off x="8145488" y="2903837"/>
-            <a:ext cx="1569308" cy="525162"/>
+          <a:xfrm>
+            <a:off x="6141077" y="2955701"/>
+            <a:ext cx="218940" cy="231819"/>
           </a:xfrm>
-          <a:prstGeom prst="rightArrow">
+          <a:prstGeom prst="ellipse">
             <a:avLst/>
           </a:prstGeom>
         </p:spPr>
         <p:style>
           <a:lnRef idx="2">
-            <a:schemeClr val="accent5">
+            <a:schemeClr val="accent1">
               <a:shade val="15000"/>
             </a:schemeClr>
           </a:lnRef>
           <a:fillRef idx="1">
-            <a:schemeClr val="accent5"/>
+            <a:schemeClr val="accent1"/>
           </a:fillRef>
           <a:effectRef idx="0">
-            <a:schemeClr val="accent5"/>
+            <a:schemeClr val="accent1"/>
           </a:effectRef>
           <a:fontRef idx="minor">
             <a:schemeClr val="lt1"/>
@@ -8586,16 +11924,20 @@
           <a:lstStyle/>
           <a:p>
             <a:pPr algn="ctr"/>
-            <a:endParaRPr lang="nl-NL"/>
-          </a:p>
-        </p:txBody>
-      </p:sp>
-      <p:sp>
-        <p:nvSpPr>
-          <p:cNvPr id="4" name="Arrow: Right 3">
-            <a:extLst>
-              <a:ext uri="{FF2B5EF4-FFF2-40B4-BE49-F238E27FC236}">
-                <a16:creationId xmlns:a16="http://schemas.microsoft.com/office/drawing/2014/main" id="{EBB46289-A1D9-E5FE-0E2B-22DB1E4F64A0}"/>
+            <a:r>
+              <a:rPr lang="en-GB" dirty="0"/>
+              <a:t>3</a:t>
+            </a:r>
+            <a:endParaRPr lang="nl-NL" dirty="0"/>
+          </a:p>
+        </p:txBody>
+      </p:sp>
+      <p:sp>
+        <p:nvSpPr>
+          <p:cNvPr id="5" name="Arc 4">
+            <a:extLst>
+              <a:ext uri="{FF2B5EF4-FFF2-40B4-BE49-F238E27FC236}">
+                <a16:creationId xmlns:a16="http://schemas.microsoft.com/office/drawing/2014/main" id="{A34D3F4C-79CB-8152-CDB6-0A37A5EB8898}"/>
               </a:ext>
             </a:extLst>
           </p:cNvPr>
@@ -8603,28 +11945,36 @@
           <p:nvPr/>
         </p:nvSpPr>
         <p:spPr>
-          <a:xfrm rot="18831412">
-            <a:off x="5159274" y="4093988"/>
-            <a:ext cx="1569308" cy="525162"/>
+          <a:xfrm>
+            <a:off x="6445876" y="3219716"/>
+            <a:ext cx="547352" cy="592430"/>
           </a:xfrm>
-          <a:prstGeom prst="rightArrow">
-            <a:avLst/>
+          <a:prstGeom prst="arc">
+            <a:avLst>
+              <a:gd name="adj1" fmla="val 12796491"/>
+              <a:gd name="adj2" fmla="val 222678"/>
+            </a:avLst>
           </a:prstGeom>
+          <a:ln w="57150">
+            <a:solidFill>
+              <a:srgbClr val="C00000"/>
+            </a:solidFill>
+            <a:headEnd type="triangle" w="med" len="med"/>
+            <a:tailEnd type="triangle" w="med" len="med"/>
+          </a:ln>
         </p:spPr>
         <p:style>
-          <a:lnRef idx="2">
-            <a:schemeClr val="accent6">
-              <a:shade val="15000"/>
-            </a:schemeClr>
+          <a:lnRef idx="1">
+            <a:schemeClr val="accent1"/>
           </a:lnRef>
-          <a:fillRef idx="1">
-            <a:schemeClr val="accent6"/>
+          <a:fillRef idx="0">
+            <a:schemeClr val="accent1"/>
           </a:fillRef>
           <a:effectRef idx="0">
-            <a:schemeClr val="accent6"/>
+            <a:schemeClr val="accent1"/>
           </a:effectRef>
           <a:fontRef idx="minor">
-            <a:schemeClr val="lt1"/>
+            <a:schemeClr val="tx1"/>
           </a:fontRef>
         </p:style>
         <p:txBody>
@@ -8639,7 +11989,7 @@
     </p:spTree>
     <p:extLst>
       <p:ext uri="{BB962C8B-B14F-4D97-AF65-F5344CB8AC3E}">
-        <p14:creationId xmlns:p14="http://schemas.microsoft.com/office/powerpoint/2010/main" val="4230317449"/>
+        <p14:creationId xmlns:p14="http://schemas.microsoft.com/office/powerpoint/2010/main" val="334941374"/>
       </p:ext>
     </p:extLst>
   </p:cSld>
@@ -8701,226 +12051,10 @@
           </a:prstGeom>
         </p:spPr>
       </p:pic>
-      <p:sp>
-        <p:nvSpPr>
-          <p:cNvPr id="2" name="Rectangle 1">
-            <a:extLst>
-              <a:ext uri="{FF2B5EF4-FFF2-40B4-BE49-F238E27FC236}">
-                <a16:creationId xmlns:a16="http://schemas.microsoft.com/office/drawing/2014/main" id="{5C4BAA4B-7116-8E46-E92B-FAB247E083CA}"/>
-              </a:ext>
-            </a:extLst>
-          </p:cNvPr>
-          <p:cNvSpPr/>
-          <p:nvPr/>
-        </p:nvSpPr>
-        <p:spPr>
-          <a:xfrm>
-            <a:off x="4508500" y="850900"/>
-            <a:ext cx="3175000" cy="2247900"/>
-          </a:xfrm>
-          <a:prstGeom prst="rect">
-            <a:avLst/>
-          </a:prstGeom>
-          <a:noFill/>
-          <a:ln w="38100" cap="flat" cmpd="sng" algn="ctr">
-            <a:solidFill>
-              <a:schemeClr val="accent2"/>
-            </a:solidFill>
-            <a:prstDash val="solid"/>
-            <a:round/>
-            <a:headEnd type="none" w="med" len="med"/>
-            <a:tailEnd type="none" w="med" len="med"/>
-          </a:ln>
-        </p:spPr>
-        <p:style>
-          <a:lnRef idx="0">
-            <a:scrgbClr r="0" g="0" b="0"/>
-          </a:lnRef>
-          <a:fillRef idx="0">
-            <a:scrgbClr r="0" g="0" b="0"/>
-          </a:fillRef>
-          <a:effectRef idx="0">
-            <a:scrgbClr r="0" g="0" b="0"/>
-          </a:effectRef>
-          <a:fontRef idx="minor">
-            <a:schemeClr val="accent2"/>
-          </a:fontRef>
-        </p:style>
-        <p:txBody>
-          <a:bodyPr rtlCol="0" anchor="ctr"/>
-          <a:lstStyle/>
-          <a:p>
-            <a:pPr algn="ctr"/>
-            <a:endParaRPr lang="nl-NL"/>
-          </a:p>
-        </p:txBody>
-      </p:sp>
-      <p:sp>
-        <p:nvSpPr>
-          <p:cNvPr id="3" name="Oval 2">
-            <a:extLst>
-              <a:ext uri="{FF2B5EF4-FFF2-40B4-BE49-F238E27FC236}">
-                <a16:creationId xmlns:a16="http://schemas.microsoft.com/office/drawing/2014/main" id="{55A3B7BF-BCC2-3F37-3D3E-07ACE1AB91F4}"/>
-              </a:ext>
-            </a:extLst>
-          </p:cNvPr>
-          <p:cNvSpPr/>
-          <p:nvPr/>
-        </p:nvSpPr>
-        <p:spPr>
-          <a:xfrm>
-            <a:off x="4330700" y="3314700"/>
-            <a:ext cx="965200" cy="939800"/>
-          </a:xfrm>
-          <a:prstGeom prst="ellipse">
-            <a:avLst/>
-          </a:prstGeom>
-          <a:noFill/>
-          <a:ln w="38100" cap="flat" cmpd="sng" algn="ctr">
-            <a:solidFill>
-              <a:srgbClr val="00B050"/>
-            </a:solidFill>
-            <a:prstDash val="solid"/>
-            <a:round/>
-            <a:headEnd type="none" w="med" len="med"/>
-            <a:tailEnd type="none" w="med" len="med"/>
-          </a:ln>
-        </p:spPr>
-        <p:style>
-          <a:lnRef idx="0">
-            <a:scrgbClr r="0" g="0" b="0"/>
-          </a:lnRef>
-          <a:fillRef idx="0">
-            <a:scrgbClr r="0" g="0" b="0"/>
-          </a:fillRef>
-          <a:effectRef idx="0">
-            <a:scrgbClr r="0" g="0" b="0"/>
-          </a:effectRef>
-          <a:fontRef idx="minor">
-            <a:schemeClr val="dk1"/>
-          </a:fontRef>
-        </p:style>
-        <p:txBody>
-          <a:bodyPr rtlCol="0" anchor="ctr"/>
-          <a:lstStyle/>
-          <a:p>
-            <a:pPr algn="ctr"/>
-            <a:endParaRPr lang="nl-NL"/>
-          </a:p>
-        </p:txBody>
-      </p:sp>
-      <p:sp>
-        <p:nvSpPr>
-          <p:cNvPr id="5" name="Oval 4">
-            <a:extLst>
-              <a:ext uri="{FF2B5EF4-FFF2-40B4-BE49-F238E27FC236}">
-                <a16:creationId xmlns:a16="http://schemas.microsoft.com/office/drawing/2014/main" id="{06B483B1-9207-DCB8-C7AC-754FAB3084BA}"/>
-              </a:ext>
-            </a:extLst>
-          </p:cNvPr>
-          <p:cNvSpPr/>
-          <p:nvPr/>
-        </p:nvSpPr>
-        <p:spPr>
-          <a:xfrm>
-            <a:off x="9359900" y="4851400"/>
-            <a:ext cx="965200" cy="939800"/>
-          </a:xfrm>
-          <a:prstGeom prst="ellipse">
-            <a:avLst/>
-          </a:prstGeom>
-          <a:noFill/>
-          <a:ln w="38100" cap="flat" cmpd="sng" algn="ctr">
-            <a:solidFill>
-              <a:srgbClr val="00B050"/>
-            </a:solidFill>
-            <a:prstDash val="solid"/>
-            <a:round/>
-            <a:headEnd type="none" w="med" len="med"/>
-            <a:tailEnd type="none" w="med" len="med"/>
-          </a:ln>
-        </p:spPr>
-        <p:style>
-          <a:lnRef idx="0">
-            <a:scrgbClr r="0" g="0" b="0"/>
-          </a:lnRef>
-          <a:fillRef idx="0">
-            <a:scrgbClr r="0" g="0" b="0"/>
-          </a:fillRef>
-          <a:effectRef idx="0">
-            <a:scrgbClr r="0" g="0" b="0"/>
-          </a:effectRef>
-          <a:fontRef idx="minor">
-            <a:schemeClr val="dk1"/>
-          </a:fontRef>
-        </p:style>
-        <p:txBody>
-          <a:bodyPr rtlCol="0" anchor="ctr"/>
-          <a:lstStyle/>
-          <a:p>
-            <a:pPr algn="ctr"/>
-            <a:endParaRPr lang="nl-NL"/>
-          </a:p>
-        </p:txBody>
-      </p:sp>
-      <p:sp>
-        <p:nvSpPr>
-          <p:cNvPr id="6" name="Oval 5">
-            <a:extLst>
-              <a:ext uri="{FF2B5EF4-FFF2-40B4-BE49-F238E27FC236}">
-                <a16:creationId xmlns:a16="http://schemas.microsoft.com/office/drawing/2014/main" id="{E3385604-096D-09B6-DD26-7B68105CDA51}"/>
-              </a:ext>
-            </a:extLst>
-          </p:cNvPr>
-          <p:cNvSpPr/>
-          <p:nvPr/>
-        </p:nvSpPr>
-        <p:spPr>
-          <a:xfrm>
-            <a:off x="10770032" y="4851400"/>
-            <a:ext cx="965200" cy="939800"/>
-          </a:xfrm>
-          <a:prstGeom prst="ellipse">
-            <a:avLst/>
-          </a:prstGeom>
-          <a:noFill/>
-          <a:ln w="38100" cap="flat" cmpd="sng" algn="ctr">
-            <a:solidFill>
-              <a:srgbClr val="00B050"/>
-            </a:solidFill>
-            <a:prstDash val="solid"/>
-            <a:round/>
-            <a:headEnd type="none" w="med" len="med"/>
-            <a:tailEnd type="none" w="med" len="med"/>
-          </a:ln>
-        </p:spPr>
-        <p:style>
-          <a:lnRef idx="0">
-            <a:scrgbClr r="0" g="0" b="0"/>
-          </a:lnRef>
-          <a:fillRef idx="0">
-            <a:scrgbClr r="0" g="0" b="0"/>
-          </a:fillRef>
-          <a:effectRef idx="0">
-            <a:scrgbClr r="0" g="0" b="0"/>
-          </a:effectRef>
-          <a:fontRef idx="minor">
-            <a:schemeClr val="dk1"/>
-          </a:fontRef>
-        </p:style>
-        <p:txBody>
-          <a:bodyPr rtlCol="0" anchor="ctr"/>
-          <a:lstStyle/>
-          <a:p>
-            <a:pPr algn="ctr"/>
-            <a:endParaRPr lang="nl-NL"/>
-          </a:p>
-        </p:txBody>
-      </p:sp>
     </p:spTree>
     <p:extLst>
       <p:ext uri="{BB962C8B-B14F-4D97-AF65-F5344CB8AC3E}">
-        <p14:creationId xmlns:p14="http://schemas.microsoft.com/office/powerpoint/2010/main" val="2162402361"/>
+        <p14:creationId xmlns:p14="http://schemas.microsoft.com/office/powerpoint/2010/main" val="2279286500"/>
       </p:ext>
     </p:extLst>
   </p:cSld>
@@ -9007,13 +12141,7 @@
       </p:grpSpPr>
       <p:sp>
         <p:nvSpPr>
-          <p:cNvPr id="2" name="Title 1">
-            <a:extLst>
-              <a:ext uri="{FF2B5EF4-FFF2-40B4-BE49-F238E27FC236}">
-                <a16:creationId xmlns:a16="http://schemas.microsoft.com/office/drawing/2014/main" id="{B3C21022-8E81-4D35-BB66-30F7C9847D88}"/>
-              </a:ext>
-            </a:extLst>
-          </p:cNvPr>
+          <p:cNvPr id="3" name="Title 2"/>
           <p:cNvSpPr>
             <a:spLocks noGrp="1"/>
           </p:cNvSpPr>
@@ -9028,7 +12156,100 @@
           <a:p>
             <a:r>
               <a:rPr lang="nl-NL" dirty="0" err="1"/>
-              <a:t>WiFi</a:t>
+              <a:t>Logistics</a:t>
+            </a:r>
+            <a:endParaRPr lang="en-GB" dirty="0"/>
+          </a:p>
+        </p:txBody>
+      </p:sp>
+      <p:graphicFrame>
+        <p:nvGraphicFramePr>
+          <p:cNvPr id="10" name="Content Placeholder 4">
+            <a:extLst>
+              <a:ext uri="{FF2B5EF4-FFF2-40B4-BE49-F238E27FC236}">
+                <a16:creationId xmlns:a16="http://schemas.microsoft.com/office/drawing/2014/main" id="{D0E904C1-D5E3-CFA9-FC5E-C50C075305D9}"/>
+              </a:ext>
+            </a:extLst>
+          </p:cNvPr>
+          <p:cNvGraphicFramePr>
+            <a:graphicFrameLocks/>
+          </p:cNvGraphicFramePr>
+          <p:nvPr>
+            <p:extLst>
+              <p:ext uri="{D42A27DB-BD31-4B8C-83A1-F6EECF244321}">
+                <p14:modId xmlns:p14="http://schemas.microsoft.com/office/powerpoint/2010/main" val="1236907169"/>
+              </p:ext>
+            </p:extLst>
+          </p:nvPr>
+        </p:nvGraphicFramePr>
+        <p:xfrm>
+          <a:off x="2130875" y="1465994"/>
+          <a:ext cx="8841925" cy="5175166"/>
+        </p:xfrm>
+        <a:graphic>
+          <a:graphicData uri="http://schemas.openxmlformats.org/drawingml/2006/diagram">
+            <dgm:relIds xmlns:dgm="http://schemas.openxmlformats.org/drawingml/2006/diagram" xmlns:r="http://schemas.openxmlformats.org/officeDocument/2006/relationships" r:dm="rId3" r:lo="rId4" r:qs="rId5" r:cs="rId6"/>
+          </a:graphicData>
+        </a:graphic>
+      </p:graphicFrame>
+    </p:spTree>
+    <p:extLst>
+      <p:ext uri="{BB962C8B-B14F-4D97-AF65-F5344CB8AC3E}">
+        <p14:creationId xmlns:p14="http://schemas.microsoft.com/office/powerpoint/2010/main" val="2640872054"/>
+      </p:ext>
+    </p:extLst>
+  </p:cSld>
+  <p:clrMapOvr>
+    <a:masterClrMapping/>
+  </p:clrMapOvr>
+</p:sld>
+</file>
+
+<file path=ppt/slides/slide6.xml><?xml version="1.0" encoding="utf-8"?>
+<p:sld xmlns:a="http://schemas.openxmlformats.org/drawingml/2006/main" xmlns:r="http://schemas.openxmlformats.org/officeDocument/2006/relationships" xmlns:p="http://schemas.openxmlformats.org/presentationml/2006/main">
+  <p:cSld>
+    <p:spTree>
+      <p:nvGrpSpPr>
+        <p:cNvPr id="1" name=""/>
+        <p:cNvGrpSpPr/>
+        <p:nvPr/>
+      </p:nvGrpSpPr>
+      <p:grpSpPr>
+        <a:xfrm>
+          <a:off x="0" y="0"/>
+          <a:ext cx="0" cy="0"/>
+          <a:chOff x="0" y="0"/>
+          <a:chExt cx="0" cy="0"/>
+        </a:xfrm>
+      </p:grpSpPr>
+      <p:sp>
+        <p:nvSpPr>
+          <p:cNvPr id="2" name="Title 1">
+            <a:extLst>
+              <a:ext uri="{FF2B5EF4-FFF2-40B4-BE49-F238E27FC236}">
+                <a16:creationId xmlns:a16="http://schemas.microsoft.com/office/drawing/2014/main" id="{B3C21022-8E81-4D35-BB66-30F7C9847D88}"/>
+              </a:ext>
+            </a:extLst>
+          </p:cNvPr>
+          <p:cNvSpPr>
+            <a:spLocks noGrp="1"/>
+          </p:cNvSpPr>
+          <p:nvPr>
+            <p:ph type="title"/>
+          </p:nvPr>
+        </p:nvSpPr>
+        <p:spPr/>
+        <p:txBody>
+          <a:bodyPr/>
+          <a:lstStyle/>
+          <a:p>
+            <a:r>
+              <a:rPr lang="nl-NL" dirty="0"/>
+              <a:t>Pre-class </a:t>
+            </a:r>
+            <a:r>
+              <a:rPr lang="nl-NL" dirty="0" err="1"/>
+              <a:t>installation</a:t>
             </a:r>
             <a:endParaRPr lang="nl-NL" dirty="0"/>
           </a:p>
@@ -9064,93 +12285,6 @@
           <a:p>
             <a:r>
               <a:rPr lang="nl-NL" sz="3200" dirty="0"/>
-              <a:t>See email sent (</a:t>
-            </a:r>
-            <a:r>
-              <a:rPr lang="nl-NL" sz="3200" dirty="0" err="1"/>
-              <a:t>Did</a:t>
-            </a:r>
-            <a:r>
-              <a:rPr lang="nl-NL" sz="3200" dirty="0"/>
-              <a:t> </a:t>
-            </a:r>
-            <a:r>
-              <a:rPr lang="nl-NL" sz="3200" dirty="0" err="1"/>
-              <a:t>everyone</a:t>
-            </a:r>
-            <a:r>
-              <a:rPr lang="nl-NL" sz="3200" dirty="0"/>
-              <a:t> get </a:t>
-            </a:r>
-            <a:r>
-              <a:rPr lang="nl-NL" sz="3200" dirty="0" err="1"/>
-              <a:t>it</a:t>
-            </a:r>
-            <a:r>
-              <a:rPr lang="nl-NL" sz="3200" dirty="0"/>
-              <a:t>?)</a:t>
-            </a:r>
-          </a:p>
-          <a:p>
-            <a:r>
-              <a:rPr lang="nl-NL" sz="3200" dirty="0"/>
-              <a:t>Or, scan </a:t>
-            </a:r>
-            <a:r>
-              <a:rPr lang="nl-NL" sz="3200" dirty="0" err="1"/>
-              <a:t>the</a:t>
-            </a:r>
-            <a:r>
-              <a:rPr lang="nl-NL" sz="3200" dirty="0"/>
-              <a:t> QR code</a:t>
-            </a:r>
-          </a:p>
-          <a:p>
-            <a:r>
-              <a:rPr lang="nl-NL" sz="3200" dirty="0"/>
-              <a:t>Or, go </a:t>
-            </a:r>
-            <a:r>
-              <a:rPr lang="nl-NL" sz="3200" dirty="0" err="1"/>
-              <a:t>to</a:t>
-            </a:r>
-            <a:r>
-              <a:rPr lang="nl-NL" sz="3200" dirty="0"/>
-              <a:t> eduroam.deltares.nl</a:t>
-            </a:r>
-          </a:p>
-          <a:p>
-            <a:endParaRPr lang="nl-NL" sz="4000" dirty="0"/>
-          </a:p>
-          <a:p>
-            <a:pPr marL="0" indent="0">
-              <a:buNone/>
-            </a:pPr>
-            <a:r>
-              <a:rPr lang="nl-NL" sz="4400" dirty="0">
-                <a:latin typeface="+mj-lt"/>
-                <a:ea typeface="+mj-ea"/>
-                <a:cs typeface="+mj-cs"/>
-              </a:rPr>
-              <a:t>Pre-class </a:t>
-            </a:r>
-            <a:r>
-              <a:rPr lang="nl-NL" sz="4400" dirty="0" err="1">
-                <a:latin typeface="+mj-lt"/>
-                <a:ea typeface="+mj-ea"/>
-                <a:cs typeface="+mj-cs"/>
-              </a:rPr>
-              <a:t>Installations</a:t>
-            </a:r>
-            <a:endParaRPr lang="nl-NL" sz="4400" dirty="0">
-              <a:latin typeface="+mj-lt"/>
-              <a:ea typeface="+mj-ea"/>
-              <a:cs typeface="+mj-cs"/>
-            </a:endParaRPr>
-          </a:p>
-          <a:p>
-            <a:r>
-              <a:rPr lang="nl-NL" sz="3200" dirty="0"/>
               <a:t>E-mail </a:t>
             </a:r>
             <a:r>
@@ -9159,7 +12293,7 @@
             </a:r>
             <a:r>
               <a:rPr lang="nl-NL" sz="3200" dirty="0"/>
-              <a:t> setup </a:t>
+              <a:t> setup? </a:t>
             </a:r>
           </a:p>
           <a:p>
@@ -9213,6 +12347,139 @@
               <a:buNone/>
             </a:pPr>
             <a:endParaRPr lang="nl-NL" sz="2800" dirty="0"/>
+          </a:p>
+        </p:txBody>
+      </p:sp>
+      <p:pic>
+        <p:nvPicPr>
+          <p:cNvPr id="4" name="Picture 3">
+            <a:extLst>
+              <a:ext uri="{FF2B5EF4-FFF2-40B4-BE49-F238E27FC236}">
+                <a16:creationId xmlns:a16="http://schemas.microsoft.com/office/drawing/2014/main" id="{F0556E37-DCB3-E8CC-CE28-6D839DA15CFD}"/>
+              </a:ext>
+            </a:extLst>
+          </p:cNvPr>
+          <p:cNvPicPr>
+            <a:picLocks noChangeAspect="1"/>
+          </p:cNvPicPr>
+          <p:nvPr/>
+        </p:nvPicPr>
+        <p:blipFill>
+          <a:blip r:embed="rId3"/>
+          <a:stretch>
+            <a:fillRect/>
+          </a:stretch>
+        </p:blipFill>
+        <p:spPr>
+          <a:xfrm>
+            <a:off x="1061160" y="4158501"/>
+            <a:ext cx="6879683" cy="473206"/>
+          </a:xfrm>
+          <a:prstGeom prst="rect">
+            <a:avLst/>
+          </a:prstGeom>
+        </p:spPr>
+      </p:pic>
+      <p:pic>
+        <p:nvPicPr>
+          <p:cNvPr id="7" name="Picture 6">
+            <a:extLst>
+              <a:ext uri="{FF2B5EF4-FFF2-40B4-BE49-F238E27FC236}">
+                <a16:creationId xmlns:a16="http://schemas.microsoft.com/office/drawing/2014/main" id="{8FF524BB-6DE5-BFF1-D5ED-398E4582EF31}"/>
+              </a:ext>
+            </a:extLst>
+          </p:cNvPr>
+          <p:cNvPicPr>
+            <a:picLocks noChangeAspect="1"/>
+          </p:cNvPicPr>
+          <p:nvPr/>
+        </p:nvPicPr>
+        <p:blipFill>
+          <a:blip r:embed="rId4"/>
+          <a:srcRect r="21776"/>
+          <a:stretch>
+            <a:fillRect/>
+          </a:stretch>
+        </p:blipFill>
+        <p:spPr>
+          <a:xfrm>
+            <a:off x="1061159" y="5490492"/>
+            <a:ext cx="6879683" cy="802901"/>
+          </a:xfrm>
+          <a:prstGeom prst="rect">
+            <a:avLst/>
+          </a:prstGeom>
+        </p:spPr>
+      </p:pic>
+      <p:sp>
+        <p:nvSpPr>
+          <p:cNvPr id="8" name="TextBox 7">
+            <a:extLst>
+              <a:ext uri="{FF2B5EF4-FFF2-40B4-BE49-F238E27FC236}">
+                <a16:creationId xmlns:a16="http://schemas.microsoft.com/office/drawing/2014/main" id="{FDECE4D0-4387-1939-89D6-49D7BCABE53D}"/>
+              </a:ext>
+            </a:extLst>
+          </p:cNvPr>
+          <p:cNvSpPr txBox="1"/>
+          <p:nvPr/>
+        </p:nvSpPr>
+        <p:spPr>
+          <a:xfrm>
+            <a:off x="1061159" y="4884825"/>
+            <a:ext cx="1112805" cy="369332"/>
+          </a:xfrm>
+          <a:prstGeom prst="rect">
+            <a:avLst/>
+          </a:prstGeom>
+          <a:noFill/>
+        </p:spPr>
+        <p:txBody>
+          <a:bodyPr wrap="none" rtlCol="0">
+            <a:spAutoFit/>
+          </a:bodyPr>
+          <a:lstStyle/>
+          <a:p>
+            <a:r>
+              <a:rPr lang="en-GB" dirty="0"/>
+              <a:t>And then:</a:t>
+            </a:r>
+            <a:endParaRPr lang="nl-NL" dirty="0"/>
+          </a:p>
+        </p:txBody>
+      </p:sp>
+      <p:sp>
+        <p:nvSpPr>
+          <p:cNvPr id="9" name="TextBox 8">
+            <a:extLst>
+              <a:ext uri="{FF2B5EF4-FFF2-40B4-BE49-F238E27FC236}">
+                <a16:creationId xmlns:a16="http://schemas.microsoft.com/office/drawing/2014/main" id="{B4DDD519-9CB4-1A5E-B53F-FA69AEACA178}"/>
+              </a:ext>
+            </a:extLst>
+          </p:cNvPr>
+          <p:cNvSpPr txBox="1"/>
+          <p:nvPr/>
+        </p:nvSpPr>
+        <p:spPr>
+          <a:xfrm>
+            <a:off x="1061158" y="3581090"/>
+            <a:ext cx="1164486" cy="369332"/>
+          </a:xfrm>
+          <a:prstGeom prst="rect">
+            <a:avLst/>
+          </a:prstGeom>
+          <a:noFill/>
+        </p:spPr>
+        <p:txBody>
+          <a:bodyPr wrap="none" rtlCol="0">
+            <a:spAutoFit/>
+          </a:bodyPr>
+          <a:lstStyle/>
+          <a:p>
+            <a:r>
+              <a:rPr lang="en-GB" dirty="0"/>
+              <a:t>Start with:</a:t>
+            </a:r>
+            <a:endParaRPr lang="nl-NL" dirty="0"/>
           </a:p>
         </p:txBody>
       </p:sp>
@@ -9329,33 +12596,15 @@
                                   </p:childTnLst>
                                 </p:cTn>
                               </p:par>
-                            </p:childTnLst>
-                          </p:cTn>
-                        </p:par>
-                      </p:childTnLst>
-                    </p:cTn>
-                  </p:par>
-                  <p:par>
-                    <p:cTn id="11" fill="hold">
-                      <p:stCondLst>
-                        <p:cond delay="indefinite"/>
-                      </p:stCondLst>
-                      <p:childTnLst>
-                        <p:par>
-                          <p:cTn id="12" fill="hold">
-                            <p:stCondLst>
-                              <p:cond delay="0"/>
-                            </p:stCondLst>
-                            <p:childTnLst>
                               <p:par>
-                                <p:cTn id="13" presetID="1" presetClass="entr" presetSubtype="0" fill="hold" grpId="0" nodeType="clickEffect">
+                                <p:cTn id="11" presetID="1" presetClass="entr" presetSubtype="0" fill="hold" grpId="0" nodeType="withEffect">
                                   <p:stCondLst>
                                     <p:cond delay="0"/>
                                   </p:stCondLst>
                                   <p:childTnLst>
                                     <p:set>
                                       <p:cBhvr>
-                                        <p:cTn id="14" dur="1" fill="hold">
+                                        <p:cTn id="12" dur="1" fill="hold">
                                           <p:stCondLst>
                                             <p:cond delay="0"/>
                                           </p:stCondLst>
@@ -9364,419 +12613,6 @@
                                           <p:spTgt spid="5">
                                             <p:txEl>
                                               <p:pRg st="2" end="2"/>
-                                            </p:txEl>
-                                          </p:spTgt>
-                                        </p:tgtEl>
-                                        <p:attrNameLst>
-                                          <p:attrName>style.visibility</p:attrName>
-                                        </p:attrNameLst>
-                                      </p:cBhvr>
-                                      <p:to>
-                                        <p:strVal val="visible"/>
-                                      </p:to>
-                                    </p:set>
-                                  </p:childTnLst>
-                                </p:cTn>
-                              </p:par>
-                            </p:childTnLst>
-                          </p:cTn>
-                        </p:par>
-                      </p:childTnLst>
-                    </p:cTn>
-                  </p:par>
-                  <p:par>
-                    <p:cTn id="15" fill="hold">
-                      <p:stCondLst>
-                        <p:cond delay="indefinite"/>
-                      </p:stCondLst>
-                      <p:childTnLst>
-                        <p:par>
-                          <p:cTn id="16" fill="hold">
-                            <p:stCondLst>
-                              <p:cond delay="0"/>
-                            </p:stCondLst>
-                            <p:childTnLst>
-                              <p:par>
-                                <p:cTn id="17" presetID="1" presetClass="entr" presetSubtype="0" fill="hold" grpId="0" nodeType="clickEffect">
-                                  <p:stCondLst>
-                                    <p:cond delay="0"/>
-                                  </p:stCondLst>
-                                  <p:childTnLst>
-                                    <p:set>
-                                      <p:cBhvr>
-                                        <p:cTn id="18" dur="1" fill="hold">
-                                          <p:stCondLst>
-                                            <p:cond delay="0"/>
-                                          </p:stCondLst>
-                                        </p:cTn>
-                                        <p:tgtEl>
-                                          <p:spTgt spid="5">
-                                            <p:txEl>
-                                              <p:pRg st="4" end="4"/>
-                                            </p:txEl>
-                                          </p:spTgt>
-                                        </p:tgtEl>
-                                        <p:attrNameLst>
-                                          <p:attrName>style.visibility</p:attrName>
-                                        </p:attrNameLst>
-                                      </p:cBhvr>
-                                      <p:to>
-                                        <p:strVal val="visible"/>
-                                      </p:to>
-                                    </p:set>
-                                  </p:childTnLst>
-                                </p:cTn>
-                              </p:par>
-                            </p:childTnLst>
-                          </p:cTn>
-                        </p:par>
-                      </p:childTnLst>
-                    </p:cTn>
-                  </p:par>
-                  <p:par>
-                    <p:cTn id="19" fill="hold">
-                      <p:stCondLst>
-                        <p:cond delay="indefinite"/>
-                      </p:stCondLst>
-                      <p:childTnLst>
-                        <p:par>
-                          <p:cTn id="20" fill="hold">
-                            <p:stCondLst>
-                              <p:cond delay="0"/>
-                            </p:stCondLst>
-                            <p:childTnLst>
-                              <p:par>
-                                <p:cTn id="21" presetID="1" presetClass="entr" presetSubtype="0" fill="hold" grpId="0" nodeType="clickEffect">
-                                  <p:stCondLst>
-                                    <p:cond delay="0"/>
-                                  </p:stCondLst>
-                                  <p:childTnLst>
-                                    <p:set>
-                                      <p:cBhvr>
-                                        <p:cTn id="22" dur="1" fill="hold">
-                                          <p:stCondLst>
-                                            <p:cond delay="0"/>
-                                          </p:stCondLst>
-                                        </p:cTn>
-                                        <p:tgtEl>
-                                          <p:spTgt spid="5">
-                                            <p:txEl>
-                                              <p:pRg st="5" end="5"/>
-                                            </p:txEl>
-                                          </p:spTgt>
-                                        </p:tgtEl>
-                                        <p:attrNameLst>
-                                          <p:attrName>style.visibility</p:attrName>
-                                        </p:attrNameLst>
-                                      </p:cBhvr>
-                                      <p:to>
-                                        <p:strVal val="visible"/>
-                                      </p:to>
-                                    </p:set>
-                                  </p:childTnLst>
-                                </p:cTn>
-                              </p:par>
-                            </p:childTnLst>
-                          </p:cTn>
-                        </p:par>
-                      </p:childTnLst>
-                    </p:cTn>
-                  </p:par>
-                  <p:par>
-                    <p:cTn id="23" fill="hold">
-                      <p:stCondLst>
-                        <p:cond delay="indefinite"/>
-                      </p:stCondLst>
-                      <p:childTnLst>
-                        <p:par>
-                          <p:cTn id="24" fill="hold">
-                            <p:stCondLst>
-                              <p:cond delay="0"/>
-                            </p:stCondLst>
-                            <p:childTnLst>
-                              <p:par>
-                                <p:cTn id="25" presetID="1" presetClass="entr" presetSubtype="0" fill="hold" grpId="0" nodeType="clickEffect">
-                                  <p:stCondLst>
-                                    <p:cond delay="0"/>
-                                  </p:stCondLst>
-                                  <p:childTnLst>
-                                    <p:set>
-                                      <p:cBhvr>
-                                        <p:cTn id="26" dur="1" fill="hold">
-                                          <p:stCondLst>
-                                            <p:cond delay="0"/>
-                                          </p:stCondLst>
-                                        </p:cTn>
-                                        <p:tgtEl>
-                                          <p:spTgt spid="5">
-                                            <p:txEl>
-                                              <p:pRg st="6" end="6"/>
-                                            </p:txEl>
-                                          </p:spTgt>
-                                        </p:tgtEl>
-                                        <p:attrNameLst>
-                                          <p:attrName>style.visibility</p:attrName>
-                                        </p:attrNameLst>
-                                      </p:cBhvr>
-                                      <p:to>
-                                        <p:strVal val="visible"/>
-                                      </p:to>
-                                    </p:set>
-                                  </p:childTnLst>
-                                </p:cTn>
-                              </p:par>
-                              <p:par>
-                                <p:cTn id="27" presetID="1" presetClass="entr" presetSubtype="0" fill="hold" grpId="0" nodeType="withEffect">
-                                  <p:stCondLst>
-                                    <p:cond delay="0"/>
-                                  </p:stCondLst>
-                                  <p:childTnLst>
-                                    <p:set>
-                                      <p:cBhvr>
-                                        <p:cTn id="28" dur="1" fill="hold">
-                                          <p:stCondLst>
-                                            <p:cond delay="0"/>
-                                          </p:stCondLst>
-                                        </p:cTn>
-                                        <p:tgtEl>
-                                          <p:spTgt spid="5">
-                                            <p:txEl>
-                                              <p:pRg st="7" end="7"/>
-                                            </p:txEl>
-                                          </p:spTgt>
-                                        </p:tgtEl>
-                                        <p:attrNameLst>
-                                          <p:attrName>style.visibility</p:attrName>
-                                        </p:attrNameLst>
-                                      </p:cBhvr>
-                                      <p:to>
-                                        <p:strVal val="visible"/>
-                                      </p:to>
-                                    </p:set>
-                                  </p:childTnLst>
-                                </p:cTn>
-                              </p:par>
-                            </p:childTnLst>
-                          </p:cTn>
-                        </p:par>
-                      </p:childTnLst>
-                    </p:cTn>
-                  </p:par>
-                </p:childTnLst>
-              </p:cTn>
-              <p:prevCondLst>
-                <p:cond evt="onPrev" delay="0">
-                  <p:tgtEl>
-                    <p:sldTgt/>
-                  </p:tgtEl>
-                </p:cond>
-              </p:prevCondLst>
-              <p:nextCondLst>
-                <p:cond evt="onNext" delay="0">
-                  <p:tgtEl>
-                    <p:sldTgt/>
-                  </p:tgtEl>
-                </p:cond>
-              </p:nextCondLst>
-            </p:seq>
-          </p:childTnLst>
-        </p:cTn>
-      </p:par>
-    </p:tnLst>
-    <p:bldLst>
-      <p:bldP spid="5" grpId="0" uiExpand="1" build="p"/>
-    </p:bldLst>
-  </p:timing>
-</p:sld>
-</file>
-
-<file path=ppt/slides/slide6.xml><?xml version="1.0" encoding="utf-8"?>
-<p:sld xmlns:a="http://schemas.openxmlformats.org/drawingml/2006/main" xmlns:r="http://schemas.openxmlformats.org/officeDocument/2006/relationships" xmlns:p="http://schemas.openxmlformats.org/presentationml/2006/main">
-  <p:cSld>
-    <p:spTree>
-      <p:nvGrpSpPr>
-        <p:cNvPr id="1" name=""/>
-        <p:cNvGrpSpPr/>
-        <p:nvPr/>
-      </p:nvGrpSpPr>
-      <p:grpSpPr>
-        <a:xfrm>
-          <a:off x="0" y="0"/>
-          <a:ext cx="0" cy="0"/>
-          <a:chOff x="0" y="0"/>
-          <a:chExt cx="0" cy="0"/>
-        </a:xfrm>
-      </p:grpSpPr>
-      <p:sp>
-        <p:nvSpPr>
-          <p:cNvPr id="2" name="Title 1">
-            <a:extLst>
-              <a:ext uri="{FF2B5EF4-FFF2-40B4-BE49-F238E27FC236}">
-                <a16:creationId xmlns:a16="http://schemas.microsoft.com/office/drawing/2014/main" id="{B3C21022-8E81-4D35-BB66-30F7C9847D88}"/>
-              </a:ext>
-            </a:extLst>
-          </p:cNvPr>
-          <p:cNvSpPr>
-            <a:spLocks noGrp="1"/>
-          </p:cNvSpPr>
-          <p:nvPr>
-            <p:ph type="title"/>
-          </p:nvPr>
-        </p:nvSpPr>
-        <p:spPr/>
-        <p:txBody>
-          <a:bodyPr/>
-          <a:lstStyle/>
-          <a:p>
-            <a:r>
-              <a:rPr lang="nl-NL"/>
-              <a:t>Badge</a:t>
-            </a:r>
-          </a:p>
-        </p:txBody>
-      </p:sp>
-      <p:sp>
-        <p:nvSpPr>
-          <p:cNvPr id="5" name="Content Placeholder 2">
-            <a:extLst>
-              <a:ext uri="{FF2B5EF4-FFF2-40B4-BE49-F238E27FC236}">
-                <a16:creationId xmlns:a16="http://schemas.microsoft.com/office/drawing/2014/main" id="{828CC53B-338A-1C99-14E1-44A2946E696E}"/>
-              </a:ext>
-            </a:extLst>
-          </p:cNvPr>
-          <p:cNvSpPr>
-            <a:spLocks noGrp="1"/>
-          </p:cNvSpPr>
-          <p:nvPr>
-            <p:ph idx="1"/>
-          </p:nvPr>
-        </p:nvSpPr>
-        <p:spPr>
-          <a:xfrm>
-            <a:off x="838200" y="1519881"/>
-            <a:ext cx="10515600" cy="5165124"/>
-          </a:xfrm>
-        </p:spPr>
-        <p:txBody>
-          <a:bodyPr>
-            <a:normAutofit/>
-          </a:bodyPr>
-          <a:lstStyle/>
-          <a:p>
-            <a:r>
-              <a:rPr lang="nl-NL" sz="3200" dirty="0" err="1"/>
-              <a:t>Please</a:t>
-            </a:r>
-            <a:r>
-              <a:rPr lang="nl-NL" sz="3200" dirty="0"/>
-              <a:t> </a:t>
-            </a:r>
-            <a:r>
-              <a:rPr lang="nl-NL" sz="3200" dirty="0" err="1"/>
-              <a:t>pick</a:t>
-            </a:r>
-            <a:r>
-              <a:rPr lang="nl-NL" sz="3200" dirty="0"/>
-              <a:t> up </a:t>
-            </a:r>
-            <a:r>
-              <a:rPr lang="nl-NL" sz="3200" dirty="0" err="1"/>
-              <a:t>your</a:t>
-            </a:r>
-            <a:r>
-              <a:rPr lang="nl-NL" sz="3200" dirty="0"/>
-              <a:t> badge in </a:t>
-            </a:r>
-            <a:r>
-              <a:rPr lang="nl-NL" sz="3200" dirty="0" err="1"/>
-              <a:t>the</a:t>
-            </a:r>
-            <a:r>
-              <a:rPr lang="nl-NL" sz="3200" dirty="0"/>
-              <a:t> coffee break, </a:t>
-            </a:r>
-            <a:r>
-              <a:rPr lang="nl-NL" sz="3200" dirty="0" err="1"/>
-              <a:t>if</a:t>
-            </a:r>
-            <a:r>
-              <a:rPr lang="nl-NL" sz="3200" dirty="0"/>
-              <a:t> </a:t>
-            </a:r>
-            <a:r>
-              <a:rPr lang="nl-NL" sz="3200" dirty="0" err="1"/>
-              <a:t>you</a:t>
-            </a:r>
-            <a:r>
-              <a:rPr lang="nl-NL" sz="3200" dirty="0"/>
-              <a:t> </a:t>
-            </a:r>
-            <a:r>
-              <a:rPr lang="nl-NL" sz="3200" dirty="0" err="1"/>
-              <a:t>haven’t</a:t>
-            </a:r>
-            <a:r>
-              <a:rPr lang="nl-NL" sz="3200" dirty="0"/>
-              <a:t> </a:t>
-            </a:r>
-            <a:r>
-              <a:rPr lang="nl-NL" sz="3200" dirty="0" err="1"/>
-              <a:t>already</a:t>
-            </a:r>
-            <a:endParaRPr lang="nl-NL" dirty="0"/>
-          </a:p>
-        </p:txBody>
-      </p:sp>
-    </p:spTree>
-    <p:extLst>
-      <p:ext uri="{BB962C8B-B14F-4D97-AF65-F5344CB8AC3E}">
-        <p14:creationId xmlns:p14="http://schemas.microsoft.com/office/powerpoint/2010/main" val="2311265782"/>
-      </p:ext>
-    </p:extLst>
-  </p:cSld>
-  <p:clrMapOvr>
-    <a:masterClrMapping/>
-  </p:clrMapOvr>
-  <p:timing>
-    <p:tnLst>
-      <p:par>
-        <p:cTn id="1" dur="indefinite" restart="never" nodeType="tmRoot">
-          <p:childTnLst>
-            <p:seq concurrent="1" nextAc="seek">
-              <p:cTn id="2" dur="indefinite" nodeType="mainSeq">
-                <p:childTnLst>
-                  <p:par>
-                    <p:cTn id="3" fill="hold">
-                      <p:stCondLst>
-                        <p:cond delay="indefinite"/>
-                        <p:cond evt="onBegin" delay="0">
-                          <p:tn val="2"/>
-                        </p:cond>
-                      </p:stCondLst>
-                      <p:childTnLst>
-                        <p:par>
-                          <p:cTn id="4" fill="hold">
-                            <p:stCondLst>
-                              <p:cond delay="0"/>
-                            </p:stCondLst>
-                            <p:childTnLst>
-                              <p:par>
-                                <p:cTn id="5" presetID="1" presetClass="entr" presetSubtype="0" fill="hold" grpId="0" nodeType="withEffect">
-                                  <p:stCondLst>
-                                    <p:cond delay="0"/>
-                                  </p:stCondLst>
-                                  <p:childTnLst>
-                                    <p:set>
-                                      <p:cBhvr>
-                                        <p:cTn id="6" dur="1" fill="hold">
-                                          <p:stCondLst>
-                                            <p:cond delay="0"/>
-                                          </p:stCondLst>
-                                        </p:cTn>
-                                        <p:tgtEl>
-                                          <p:spTgt spid="5">
-                                            <p:txEl>
-                                              <p:pRg st="0" end="0"/>
                                             </p:txEl>
                                           </p:spTgt>
                                         </p:tgtEl>

</xml_diff>